<commit_message>
Getting ready for the talk with tweaks and fixes to everything
</commit_message>
<xml_diff>
--- a/dotnet-core-foredrag.pptx
+++ b/dotnet-core-foredrag.pptx
@@ -8,21 +8,23 @@
     <p:sldId id="258" r:id="rId2"/>
     <p:sldId id="259" r:id="rId3"/>
     <p:sldId id="260" r:id="rId4"/>
-    <p:sldId id="264" r:id="rId5"/>
-    <p:sldId id="261" r:id="rId6"/>
-    <p:sldId id="262" r:id="rId7"/>
-    <p:sldId id="263" r:id="rId8"/>
-    <p:sldId id="265" r:id="rId9"/>
-    <p:sldId id="266" r:id="rId10"/>
-    <p:sldId id="273" r:id="rId11"/>
-    <p:sldId id="268" r:id="rId12"/>
-    <p:sldId id="272" r:id="rId13"/>
-    <p:sldId id="270" r:id="rId14"/>
-    <p:sldId id="271" r:id="rId15"/>
-    <p:sldId id="274" r:id="rId16"/>
-    <p:sldId id="278" r:id="rId17"/>
-    <p:sldId id="276" r:id="rId18"/>
-    <p:sldId id="277" r:id="rId19"/>
+    <p:sldId id="280" r:id="rId5"/>
+    <p:sldId id="264" r:id="rId6"/>
+    <p:sldId id="261" r:id="rId7"/>
+    <p:sldId id="262" r:id="rId8"/>
+    <p:sldId id="263" r:id="rId9"/>
+    <p:sldId id="265" r:id="rId10"/>
+    <p:sldId id="266" r:id="rId11"/>
+    <p:sldId id="273" r:id="rId12"/>
+    <p:sldId id="268" r:id="rId13"/>
+    <p:sldId id="272" r:id="rId14"/>
+    <p:sldId id="270" r:id="rId15"/>
+    <p:sldId id="271" r:id="rId16"/>
+    <p:sldId id="274" r:id="rId17"/>
+    <p:sldId id="278" r:id="rId18"/>
+    <p:sldId id="279" r:id="rId19"/>
+    <p:sldId id="276" r:id="rId20"/>
+    <p:sldId id="277" r:id="rId21"/>
   </p:sldIdLst>
   <p:sldSz cx="12192000" cy="6858000"/>
   <p:notesSz cx="6858000" cy="9144000"/>
@@ -3029,6 +3031,57 @@
 </inkml:ink>
 </file>
 
+<file path=ppt/ink/ink139.xml><?xml version="1.0" encoding="utf-8"?>
+<inkml:ink xmlns:inkml="http://www.w3.org/2003/InkML">
+  <inkml:definitions>
+    <inkml:context xml:id="ctx0">
+      <inkml:inkSource xml:id="inkSrc0">
+        <inkml:traceFormat>
+          <inkml:channel name="X" type="integer" min="-2.14748E9" max="2.14748E9" units="cm"/>
+          <inkml:channel name="Y" type="integer" min="-2.14748E9" max="2.14748E9" units="cm"/>
+          <inkml:channel name="F" type="integer" max="32767" units="dev"/>
+        </inkml:traceFormat>
+        <inkml:channelProperties>
+          <inkml:channelProperty channel="X" name="resolution" value="1000" units="1/cm"/>
+          <inkml:channelProperty channel="Y" name="resolution" value="1000" units="1/cm"/>
+          <inkml:channelProperty channel="F" name="resolution" value="0" units="1/dev"/>
+        </inkml:channelProperties>
+      </inkml:inkSource>
+      <inkml:timestamp xml:id="ts0" timeString="2016-11-15T13:12:30.471"/>
+    </inkml:context>
+    <inkml:brush xml:id="br0">
+      <inkml:brushProperty name="width" value="0.06667" units="cm"/>
+      <inkml:brushProperty name="height" value="0.06667" units="cm"/>
+    </inkml:brush>
+  </inkml:definitions>
+  <inkml:trace contextRef="#ctx0" brushRef="#br0">14088 11888 7552,'0'-4'2816,"0"4"-1536,0 7-576,0-3 1472,0 2-1248,0 5 511,0 2-895,0 8 64,0-1-352,-4 7-96,4 4-96,-6 5 224,1 2-160,-2 3 320,-1-4-256,-6 1 160,2-2-192,-12-2 64,9 0-128,-10-6 96,5-6-128,-7 0-32,8-6 0,-4-6-192,8 0 96,-4-10-736,8 0 416,-1-12-1728,4 0 1185,1-10-2817,7-2 2080,0-10-2944,4 6 2624</inkml:trace>
+  <inkml:trace contextRef="#ctx0" brushRef="#br0" timeOffset="1">14100 11698 6144,'17'-42'2368,"-17"42"-1280,14-26 0,-6 18 1824,-2 8-1568,-6-6 927,8 6-1375,-8-5 160,0 10-640,0-5-96,0 6-192,0-6-1504,0 8 768,0-2-5343,9 2 3295</inkml:trace>
+  <inkml:trace contextRef="#ctx0" brushRef="#br0" timeOffset="2">14688 12040 5760,'-8'-14'2176,"8"14"-1152,-8-9-480,4 6 1344,4 3-1056,-8-7 800,4 7-960,-7-3 640,4 6-768,-9-3 383,6 0-575,-10 0 192,4 2-320,-2 3 0,2 2-128,-2-2 0,6 9-32,-7 1-64,8 1 32,-5-3-32,10 4 0,-8 0-96,8 4 64,-2-4-32,4 3 0,0-4 128,4 1-32,0 0-96,8 0 32,0-3 32,3 0 0,0-8 64,1 5-32,3-8-32,0 0 32,5-6 32,2 0-32,-3-8-32,0 1 32,0-7-32,0 5 0,-3-5 0,2 3 0,-2-3 64,0 3-32,-1-3-32,-4 4 32,-4-4-32,2 6 0,-3-2 0,3 3 0,-6-1 0,5 5 0,-8 2 0,0 4 0,0 0 64,0 7-32,0 0 64,0 3-64,0 0-96,0 4 32,0-1 32,3 1 0,2 0 0,1-1 0,3-4 0,2 6 0,-4-8 0,6 2 0,-6-4 0,4-3 0,1-4 64,3 2-32,0-7-32,3 0 32,-2-3-32,4 3 0,-4-7 128,-2 4-64,-2-7-32,0 3 0,-10-6-128,6 6 64,-8-6 96,4 6-32,-8-6 64,0 6-64,-2-2 64,-3 6-64,-6-4 192,7 4-128,-7 3 256,4 4-224,-7 0 256,4 6-256,-8 0 96,6 8-128,-6 2-64,6 1 0,-2 3-32,7-1 0,-4 8-96,3 0 64,1 6 96,2 1-32,3 3-32,6-1 32,0 4-32,6-3 0,3-3 0,2-4 0,1 1 0,3-6 0,4-1-352,0-4 192,4-4-1792,-1 1 1088,0-7-5183,6 0 3359</inkml:trace>
+  <inkml:trace contextRef="#ctx0" brushRef="#br0" timeOffset="3">15266 12173 5888,'0'-7'2272,"0"7"-1216,-4 0-320,0 0 1472,8 7-1216,-8 0 512,4 5-928,-4 10 192,4-3-448,-7 5 159,3 3-255,-7 0 128,3 1-192,-4-1 128,5-1-160,-4-2 224,7 0-224,-4-7 448,4 3-320,-3-9 224,7-1-256,-4-10 64,8 3-160,-4-13 160,7 3-192,1-10 96,7 0-96,0-7 160,1 7-160,2-7 96,2 5-96,0-5 0,-2 7-32,2-7 96,2 11-96,-6-1 128,2 11-128,-2-4 128,3 3-128,0 1-32,3 3 0,-2 0 96,2 3-64,-2 1 32,2-1-32,-4 1-672,2 2 320,-4 1-2720,0 0 1696,-6-7-5183,4 3 3647</inkml:trace>
+  <inkml:trace contextRef="#ctx0" brushRef="#br0" timeOffset="4">15789 12458 6656,'-5'0'2464,"5"0"-1344,12 14-608,-8-11 1248,4 4-992,-1-5 480,5 5-736,3 1 288,1-1-480,-1-5 63,-1 5-255,6-4 0,-2 4-64,2-4 96,-2 1-96,-2-4 32,-1 3-32,1-6 32,-1 3-64,-4-7 128,1 4-96,-5-8-32,5 6 0,-9-10 96,1 8-64,-8-5 320,4-2-192,-7 0 160,3 4-192,-7 0 224,4 3-256,-9 0 384,5 4-288,-13-1 224,10 8-224,-10-1 128,6 7-192,-9-3 128,4 7-160,-3 10 0,2-5-64,5 5 32,8 0-64,7 0-96,4 3 32,4 0 32,7-1 0,5 3 0,2-3 0,2-2-352,2 0 192,1-4-2336,4-3 1376,-1-3-5247,1-4 3551</inkml:trace>
+  <inkml:trace contextRef="#ctx0" brushRef="#br0" timeOffset="5">14672 12976 6400,'0'0'2464,"0"0"-1344,4 3-544,-4 1 1440,0 3-1120,-4 6 544,4 4-864,-7 7 192,2 6-449,-5 4 161,-2 0-256,-8 7 64,5-2-160,-4 9 64,4-4-96,-3 4 0,5-4-32,-5 0 32,6-7-64,-3 1 192,8-9-128,-5-5 320,4 0-224,2-14 160,1 0-192,5-17 0,5 2-96,-3-23 224,10 5-160,0-18 256,2 3-256,10-6 32,-2 10-96,6-6-64,-2 9 32,1-3 32,2 11-32,3-5-32,-2 12 32,0-2 32,1 8-32,2 4 64,3 6-64,-2 4 64,-4 2-64,0 8-32,1 2 32,0 11-32,-4 2 0,-2 4 64,-1 4-32,-6 7 64,-2-4-64,-9 4-32,2-4 32,-9-2 96,0 0-64,-12 0 320,1-9-192,-13-5 256,1-3-256,-11-9 256,8 2-256,-8-6 256,3-2-256,-7-2-96,7-2-64,-3-2-128,4 0 64,-4-6-1312,7 2 736,4-6-4352,11 4 2785,0-14-4513,1 3 3808</inkml:trace>
+  <inkml:trace contextRef="#ctx0" brushRef="#br0" timeOffset="6">15380 13711 6400,'-14'10'2368,"14"-10"-1280,0 2-288,0 3 1152,3-3-1056,1 3 32,3 0-576,1-1 192,-1 3-288,5-7 352,0 3-353,2-3 161,2 0-256,-1 0 64,5 0-128,-2-3 96,2 3-128,-2-4 32,2 1-32,-6-6-64,2 2 32,-5-8 32,2 6-32,-6-5 64,0 8-64,-7-8 192,4 4-128,-8-7 384,1 0-256,-8 3 448,-2 7-384,-5 0 288,2 4-320,-2 0 192,2 6-224,-3 0 64,3 8-160,-2-1 0,2 4-64,-3 6 32,7 0-64,-2 1-96,2-2 32,0 3 32,5-3 0,-1 5 0,5 0 0,-1 0-96,8-4 64,-4 0 96,7 1-32,-3-4-512,3-3 256,2-5-2016,2 1 1248,4-7-5087,0 4 3391</inkml:trace>
+  <inkml:trace contextRef="#ctx0" brushRef="#br0" timeOffset="7">15979 13735 5632,'-3'-7'2176,"3"7"-1152,0-5 288,0 5 1760,0 5-1632,-4-3 639,4 5-1279,-5 0 352,5 3-672,-4 0 288,1 4-448,-5 6 256,8 1-320,-7 6 64,7 0-192,-7 4 0,3-5-64,-5 1 32,9 1-64,-3-8 128,3-3-96,-4-7-32,8 1 0,-4-11-32,3 0 0,1-14 0,8 0 0,-4-10 0,3 7 0,1-6 0,3 7 0,1-8 64,2 7-32,-3 0 128,4 6-96,-4 1 32,1 7-32,-5-1 96,0 4-96,0 4 32,2 3-32,-6 3 32,0 2-64,-3 2 64,3 3-64,-2-3-96,-1-1 32,0-6 32,-1 3 0,1-6 0,3-1 0,2-10 0,2 4 0,4-11 0,4 1 0,0-3 0,4 6 0,-1-9 0,5 10 0,-4-1 0,-4 3 0,1 0 128,-2 4-64,-2 0 384,-1 6-224,-3 4 384,-1 6-352,-7 3 160,3 8-256,-3 5 128,-1-3-160,-3 1 0,4-3-64,-4 0-128,0-4 32,0-4-672,0 1 384,0-10-2496,0 0 1568,0-11-5855,0 1 3935</inkml:trace>
+  <inkml:trace contextRef="#ctx0" brushRef="#br0" timeOffset="8">16958 14039 5376,'-8'-10'2016,"8"10"-1088,-7-7 256,2 4 1824,5 6-1632,-6-3 992,-3 0-1441,-5 0 929,5 4-1056,-9-1 480,6 7-736,-11 4 128,8 5-384,-8 3-32,8 0-160,-4-1-64,8 3 0,-1 0-128,4-1 64,4 5-32,8-1 0,0-4 0,8-3 0,-1-3 0,8-3 0,5-4 0,-2 0 0,4-13 64,2 3 0,-2-10-96,-4 3 64,1-10 96,1 0-32,-5-7 320,-4 8-160,-8-8 608,5 4-448,-12-1 448,4 4-448,-12-3 32,4 3-224,-12-4-32,6 4-64,-9-2-1024,4 4 512,-1 3-3488,5 1 2176,2 1-5343,9 7 3967</inkml:trace>
+  <inkml:trace contextRef="#ctx0" brushRef="#br0" timeOffset="9">17266 14231 11392,'-4'0'4224,"4"0"-2305,9 9-1663,-7-4 1344,7 2-960,2-4 416,0 4-640,5 0 256,-1-2-384,-1 3 256,6-2-288,-4 2 128,2 2-224,2-4-352,-2 2 96,-5-6-2720,1 6 1536,-6-12-5727,3 4 3903</inkml:trace>
+  <inkml:trace contextRef="#ctx0" brushRef="#br0" timeOffset="10">18394 14014 5120,'-4'-6'2016,"4"6"-1088,-4-10-32,1 7 1632,6 3-1376,-6-7 1088,3 4-1344,-4-4 831,-1 7-1023,-1-7 640,-2 7-800,-4-3 384,0 3-576,-10 0 320,6 6-384,-10 5 192,8 2-256,-14 3 0,6 2-128,-12 6 0,7 0-32,-7 6-64,11 0 32,-7 4 32,8-4-32,-4 12 64,6-9-64,-3 4-32,13-3 32,-1 6-128,3-2 64,0 3 32,9-2 0,3 3-96,3-2 64,5-6-32,8 0 0,6-3-96,0-4 96,6-11-32,2 2 32,0-8-96,5 0 96,-1-6-256,0 2 192,1-10-32,-1 4 96,-8-6 64,2 0 0,-6-4 0,-2 6 0,-5-10 64,-1 8-32,-5-11 256,-3 7-160,-6-7 448,5 3-320,-12-7 224,3 8-256,-8-3 0,4 6-128,-6-8-64,6 8 0,-8-4-832,9 5 448,-4-6-2368,2 6 1472,2-6-5407,3 9 3711</inkml:trace>
+  <inkml:trace contextRef="#ctx0" brushRef="#br0" timeOffset="11">18752 14638 4736,'0'-7'1824,"0"7"-960,-3 0-160,-1 0 1344,8 0-1088,-4 0 640,0 3-928,-4 1 544,4 3-704,-4-1 320,0 1-512,-3 7 415,2 0-447,-10-1 288,8 4-320,-9 0 128,5 4-224,-4-1 0,8-1-96,-9 5 32,9-3-64,-4-4 64,7 3-64,-5-3 64,6 0-64,-5 0 64,8 0-64,-3-3-32,3 3 32,0-3-128,7-2 64,0 2 96,9-1-32,-1-2-32,1-1 32,-1-7-32,3 4 0,-2-7 128,6 4-64,-6-4 128,-1 0-128,1-4-32,2 4 0,-2-3 32,3-1-32,-5-3 64,2 4-64,-5-7-32,5 3 32,-5-7 96,4 4-64,-3-7 128,-1 8-128,2-6 128,-2 6-128,0-4 128,0 6-128,1-7 32,-1 4-32,-3-4 32,4 4-64,-5-4-32,4 4 32,-3-3 32,-1 6-32,0-3-736,2 3 416,-5 0-3424,-1 0 2049,1 5-4513,0 2 3488</inkml:trace>
+  <inkml:trace contextRef="#ctx0" brushRef="#br0" timeOffset="12">19464 14983 6400,'0'-13'2464,"0"13"-1344,-18-4-256,10 1 1696,8 6-1408,-12-3 1023,5 0-1311,-8 0 608,8 4-832,-17-1 416,8 7-608,-9 0 96,5 4-288,-7 3 32,5 2-160,-1 3-128,3 1-32,2-3-128,5 4 96,2-4 32,8 4 32,-1-3 0,8-4 0,3-5-160,5 2 96,3-11-896,1 4 544,-1-7-3008,3 0 1921,2-7-4449,-2 2 3360</inkml:trace>
+  <inkml:trace contextRef="#ctx0" brushRef="#br0" timeOffset="13">19998 14390 6784,'-5'4'2624,"5"-4"-1408,-2 17-576,-3-14 1408,10 4-1152,-10 0 640,5 3-896,-7 4 607,3-1-703,-4 8 576,1-1-640,-9 6 512,5 3-544,-7 0 256,2 5-416,-8 0 352,6-1-384,-9 5 384,5-1-384,-9 1 288,8 3-288,-11-2 352,7 2-352,-4 4 96,9-1-224,-9 4 160,8-2-192,-3-2 32,3-6-64,-4-2-64,8-5 32,0-7-896,4 0 480,-1-11-2944,5 1 1856,0-7-5855,7 0 4095</inkml:trace>
+  <inkml:trace contextRef="#ctx0" brushRef="#br0" timeOffset="14">13490 11479 6272,'0'-14'2368,"0"14"-1280,0-17-224,0 14 1568,0 3-1344,-2 0 672,2 3-1057,-4 4 321,4 3-576,-9 11 160,2 1-352,-9 16 64,10-1-192,-14 14 64,8 1-96,-6 4 0,3 2-32,-8 4 32,3-2-64,-2 1-32,6-6 32,-3-5-384,8-3 192,-3-9-1568,5-4 960,2-10-3039,3-7 2111,4-15-3040,4-2 2720</inkml:trace>
+  <inkml:trace contextRef="#ctx0" brushRef="#br0" timeOffset="15">13887 11540 6656,'-4'-17'2528,"4"17"-1344,-7 0-256,3 0 1472,4 3-1344,-8 1 512,5 3-993,-9-1 129,1 5-416,-4 2 32,3 1-192,-7 5 160,3 2-192,-2-1 96,2 4-96,-6-3 160,2 2-160,-7-2 192,12-1-192,-3-4-32,2 6-32,-3-6-128,7 1 64,1-4 32,4 1 0,-4-4 0,6 4 0,1-1 64,4-2-32,0-1 320,4 0-160,1 0 256,2-1-256,1 5 160,3 1-192,1-3 0,3 2-96,-1 0 32,2-1-64,3 1 64,8-1-64,-8-2 128,0-1-96,0-3-448,0 0 192,-3-4-1184,2 0 768,-2-3-2496,-1 0 1761,-4-3-4257,1 3 3136</inkml:trace>
+  <inkml:trace contextRef="#ctx0" brushRef="#br0" timeOffset="16">13316 13162 4992,'0'-8'1824,"0"8"-960,16-12-96,-5 4 1472,0 8-1216,7-14 864,6 4-1152,3-14 704,2 5-832,3-15 223,-6 11-479,4-11-128,1 7-128,3-7 64,-3 6-96,3-1-576,0 5 256,-4-8-3615,2 12 2111,-6-6-3616,-4 5 3040</inkml:trace>
+  <inkml:trace contextRef="#ctx0" brushRef="#br0" timeOffset="17">12514 14216 6656,'-5'-1'2464,"5"1"-1344,0 1-608,0-1 1248,2 3-992,-1 0 640,4 1-864,0 2 448,3-1-577,3 4 257,1 3-384,3 4 0,3 2-192,1 1-64,0 0 0,0 3-32,-2 0 0,1 2 0,0 2 0,0-1 64,1-3-32,0-1 128,0-3-96,-2-1 320,3-3-192,-7-2 256,1-2-256,-1-1 160,-2-3-192,-2-2 224,1 0-256,-2-4 384,0-4-288,2-6 224,0 0-224,1-10 224,1 3-256,3-10 32,1 5-128,5-10 0,0 7-32,1-6-64,-2 7 32,2-3 96,-2 6-64,-3-1-928,-1 4 448,-2 0-4544,-1 6 2721,-1-1-4545,-2 3 3872</inkml:trace>
+  <inkml:trace contextRef="#ctx0" brushRef="#br0" timeOffset="18">11971 15450 5376,'-4'-14'2016,"4"14"-1088,4 7-256,-4-7 1568,3 4-1248,-3-8 896,4 4-1152,1-7 640,-3 4-833,3-6 513,3-1-608,-1-11 320,0 8-448,2-11 320,2 7-352,0-11 352,5 5-384,-1-10 288,-1 4-288,2-7 352,3 5-352,-3-6 288,2 10-288,2-11 128,-2 5-224,2-11 128,2 10-160,-2-7 224,3 8-224,-5-11 96,2 6-128,-5-6 160,4 6-160,-4-5 256,5 9-224,-6-7 96,1 12-128,-3-10 96,-1 9-128,1-4 32,0 7-32,-5-4-64,1 11 32,-1-6 32,0 9-32,2-4-928,-2 8 480,-3-1-2944,0 4 1888,-1 0-5919,1 3 4127</inkml:trace>
+  <inkml:trace contextRef="#ctx0" brushRef="#br0" timeOffset="19">12546 14267 5888,'-8'-3'2176,"8"3"-1152,-5 4 0,5-1 1440,1 1-1344,-1 3 320,4 3-896,0 3-32,4 3-320,3 5-33,3 0-95,3 7 96,1 0-96,0 7 480,2 1-320,0 6 128,0-1-224,2 6-192,0-2 0,1 5 32,-1-4 32,0 3 0,0-8 0,-1 4 0,-3-6 0,1-2 0,-4-4 0,0-3 64,-1-5-32,-1-1-32,-1-3 32,-1-3 160,0-3-96,-2-6 320,1-2-224,-3-10 256,3-1-256,1-17 160,0 0-192,3-17 224,0 4-256,4-17 256,2 4-256,2-15 320,0 11-256,1-9 160,1 9-192,1-8 64,-1 9-128,0-3 0,-4 11-32,1 1-896,-4 7 448,-1-1-4352,-2 11 2625,-4-2-4545,0 7 3776</inkml:trace>
+  <inkml:trace contextRef="#ctx0" brushRef="#br0" timeOffset="20">13330 14272 4736,'-9'-2'1760,"9"2"-960,0-7-32,0 1 1184,4 2-1056,0-9 544,3 1-864,0-7 480,2 1-608,2-4 192,0 3-384,0-1 0,2 7-160,-1-2 288,-1 5-192,0 0 319,0 4-287,-2 5 160,0 2-224,-3 8 288,-1 2-256,-4 7 160,0 0-192,-2 5 0,1 3-96,-3 2-832,0-2 416,-2 2-3935,1-3 2367,-4-4-3552,3-3 3104</inkml:trace>
+  <inkml:trace contextRef="#ctx0" brushRef="#br0" timeOffset="21">12599 13354 5504,'-18'0'2112,"18"0"-1152,-19 3-352,13-1 1440,5-1-1120,-8 0 832,5 2-1056,-7 0 576,3 1-768,-6 2 447,2 1-543,-7 1 192,3 2-352,-6 2 64,5 1-192,-5 5 64,3-1-96,1 4-64,3 0 0,-1 3-32,4 1 0,-1 5-96,4-4 64,-2 6 32,3-3 0,1 8 0,3-5 0,1 2 0,3-1 0,0 0-96,3-3 64,2 3-32,3-2 0,3-1 64,3-4 0,1 2 0,3-2 0,2-2 64,-1-2-32,3-1-96,-2-2 32,2-2 32,0-3 0,5-2 0,-2-4 0,3-4-96,-1-1 64,0-7 32,-3-2 0,3-6 64,-2 0-32,2-5-32,-2 1 32,0-6-32,-1 1 0,-1-6 0,-1 1 0,-4-6 64,0 6-32,-4-7 64,0 3-64,-3-5-32,-2 6 32,-2-7 96,-3 5-64,-4-5 32,0 5-32,-7-6 160,-1 7-128,-8-1 256,2 4-224,-5 0 384,2 6-288,-8 4 224,3 4-224,-8 2 0,4 4-128,-9 0-64,7 4 0,-5 0-608,5 2 320,-3-3-3840,7 2 2241,1 0-4705,5 2 3712</inkml:trace>
+  <inkml:trace contextRef="#ctx0" brushRef="#br0" timeOffset="22">12674 13710 5888,'-3'0'2176,"3"0"-1152,2-2-640,-1 1 1024,0 2-800,1-1 608,1 0-704,1 0 512,2 2-576,0-2 256,2 3-416,1-1 0,2 3-192,2-1-64,0 1 0,3 1 32,2-1-32,1 1-32,1 0 32,-1-2-2720,0 2 1472,-2-2-3872,0 2 2848</inkml:trace>
+  <inkml:trace contextRef="#ctx0" brushRef="#br0" timeOffset="23">12640 13962 3200,'-2'-3'1216,"2"3"-640,3 2 96,-3-2 1120,2 1-992,-1 0 480,3 2-768,-3 0 288,2 1-480,0 1 192,2 0-288,-1-1 0,3 2-128,1-1 224,-1 2-192,2-1 32,0-1-96,0-1-192,0 1 64,2-4-2848,2 2 1568,-1-2-2880,1 0 2400</inkml:trace>
+  <inkml:trace contextRef="#ctx0" brushRef="#br0" timeOffset="24">12830 13728 2176,'0'0'864,"0"0"-448,0 0 128,0 0 1152,0 0-896,0 0 672,0 0-864,-2-2 448,2 2-608,-2-2 608,0 0-608,-1-1 480,2 2-512,-4-2 320,2 2-416,-1-3 256,-2 2-320,0-3 192,2 2-224,-2-4 0,0 3-128,0-6 0,3 5-32,-3-2 32,3 2-64,-2-3-32,3 4 32,-1-1-32,1 0 0,0 1-1280,2 1 704,-2 2-3424,4 1 2208</inkml:trace>
+</inkml:ink>
+</file>
+
 <file path=ppt/ink/ink14.xml><?xml version="1.0" encoding="utf-8"?>
 <inkml:ink xmlns:inkml="http://www.w3.org/2003/InkML">
   <inkml:definitions>
@@ -3066,6 +3119,60 @@
     </inkml:annotationXML>
     <inkml:trace contextRef="#ctx0" brushRef="#br0">7083 11390 6016,'0'0'2272,"0"-3"-1216,0 3-192,0 0 928,0 0-96,2-4 128,2 1-481,4-3-95,2-5-704,2-8 160,6-5 160,2-10-192,4-4-64,7 1 64,3 0 96,3-7-256,0-10-64,1 2-128,0 0-32,-8-2-32,0 6 0,-2 6-64,-5 3 32,1 6-128,-4 9 0,-2-4 32,-6 10 0,0 6-864,-6 0-288,-2-4-3168</inkml:trace>
   </inkml:traceGroup>
+</inkml:ink>
+</file>
+
+<file path=ppt/ink/ink140.xml><?xml version="1.0" encoding="utf-8"?>
+<inkml:ink xmlns:inkml="http://www.w3.org/2003/InkML">
+  <inkml:definitions>
+    <inkml:context xml:id="ctx0">
+      <inkml:inkSource xml:id="inkSrc0">
+        <inkml:traceFormat>
+          <inkml:channel name="X" type="integer" min="-2.14748E9" max="2.14748E9" units="cm"/>
+          <inkml:channel name="Y" type="integer" min="-2.14748E9" max="2.14748E9" units="cm"/>
+          <inkml:channel name="F" type="integer" max="32767" units="dev"/>
+        </inkml:traceFormat>
+        <inkml:channelProperties>
+          <inkml:channelProperty channel="X" name="resolution" value="1000" units="1/cm"/>
+          <inkml:channelProperty channel="Y" name="resolution" value="1000" units="1/cm"/>
+          <inkml:channelProperty channel="F" name="resolution" value="0" units="1/dev"/>
+        </inkml:channelProperties>
+      </inkml:inkSource>
+      <inkml:timestamp xml:id="ts0" timeString="2016-11-15T13:12:30.496"/>
+    </inkml:context>
+    <inkml:brush xml:id="br0">
+      <inkml:brushProperty name="width" value="0.06667" units="cm"/>
+      <inkml:brushProperty name="height" value="0.06667" units="cm"/>
+    </inkml:brush>
+  </inkml:definitions>
+  <inkml:trace contextRef="#ctx0" brushRef="#br0">13181 14216 7296,'-3'-6'2720,"3"6"-1472,3-12-1120,-1 4 960,2 2-672,1-6 416,0-2-480,0-3 320,1 4-384,2-5 192,1 2-256,0-2 64,1 3-160,-1-3 64,3 2-97,-1-1 1,0 5-32,0 0 384,-2 4-256,0 3 416,0 5-352,-4 5 160,1 3-256,-5 6 128,0 2-160,-2 6 64,1 1-96,-3 4 0,1-3-32,-1 4-64,1 0 32,-2 0-32,0-4 0,0 0-448,3-4 256,-3-5-1024,3-4 640,-1-7-1183,2 0 959,0-8-2400,2 0 1792,-1-2-2752,3-2 2368</inkml:trace>
+</inkml:ink>
+</file>
+
+<file path=ppt/ink/ink141.xml><?xml version="1.0" encoding="utf-8"?>
+<inkml:ink xmlns:inkml="http://www.w3.org/2003/InkML">
+  <inkml:definitions>
+    <inkml:context xml:id="ctx0">
+      <inkml:inkSource xml:id="inkSrc0">
+        <inkml:traceFormat>
+          <inkml:channel name="X" type="integer" min="-2.14748E9" max="2.14748E9" units="cm"/>
+          <inkml:channel name="Y" type="integer" min="-2.14748E9" max="2.14748E9" units="cm"/>
+          <inkml:channel name="F" type="integer" max="32767" units="dev"/>
+        </inkml:traceFormat>
+        <inkml:channelProperties>
+          <inkml:channelProperty channel="X" name="resolution" value="1000" units="1/cm"/>
+          <inkml:channelProperty channel="Y" name="resolution" value="1000" units="1/cm"/>
+          <inkml:channelProperty channel="F" name="resolution" value="0" units="1/dev"/>
+        </inkml:channelProperties>
+      </inkml:inkSource>
+      <inkml:timestamp xml:id="ts0" timeString="2016-11-15T13:12:30.497"/>
+    </inkml:context>
+    <inkml:brush xml:id="br0">
+      <inkml:brushProperty name="width" value="0.06667" units="cm"/>
+      <inkml:brushProperty name="height" value="0.06667" units="cm"/>
+    </inkml:brush>
+  </inkml:definitions>
+  <inkml:trace contextRef="#ctx0" brushRef="#br0">10901 16327 6912,'-12'3'2624,"12"-3"-1408,0 7-448,0-7 1568,4 0-1280,1 0 735,6 0-1055,0 0 608,5 0-800,6 0 448,1 0-576,8 0 192,-2 0-352,9-3 64,0-1-192,9-1 160,-2-2-192,13-8 192,-5 8-192,12-5 256,-5 2-224,5-7 160,-7 6-160,2-2 64,1 2-96,4-2-64,-8 6 0,12-3 32,-4 6-32,7-2-32,-7 2 32,-1-3 96,-3 7-64,1-6 192,-6 6-160,9-7 96,-7 7-96,2-7 0,-2 7-32,3-2 32,-4 4-64,-3-2 64,-5 3-64,0-3 128,-6 4-96,-3-4-32,-2 0 0,2 0-32,-2 0 0,0 0 64,-4 0-32,-3 0 64,-2 0-64,-2 0 128,0 0-96,-5 0-32,-2 0 0,-2 0-32,2 0 0,-5 0 0,1 0 0,-5 0 0,0 0 0,-4 0 64,5 0-32,-4 0 64,3 0-64,-4 0-32,2 0 32,-2 0-32,1 0 0,-5 0 0,1 0 0,1 0 0,-3 0 0,-2 0 0,0 0 0,0 0 0,0 0 0,0 0-96,0 0 64,-2 0 96,2 0-32,-5 0 64,1 0-64,-3-4-32,7 4 32,-4-3-128,4 3 64,-7-2 96,3 2-32,-3-5-32,2 5 32,-6-2-32,3-3 0,-4 0 0,5 0 0,-8-4 0,4-1 0,-9-4 0,6 4 0,-6-4 0,5 7 0,-4-6 64,4 6-32,-5-7-32,9 4 32,-7-3-128,6 2 64,-7-6 32,7 7 0,-10-4 0,6 4 0,-6-6 64,2 6-32,-2-4-32,2 8 32,-10-8 32,6 4-32,-1-4 128,1 7-96,-5-6-32,5 6 0,-6-7 32,3 7-32,-8-6-32,13 4 32,-8-6 32,10 8-32,-11-5-32,13 1 32,-9-2-32,8 6 0,-4-7 64,5 7-32,-6-6-96,6 6 32,-5-7 32,3 8 0,-2-8 128,2 7-64,-7-6 32,9 6-32,-9-2-128,8 2 32,-4-3 32,5 5 0,-6-4 64,5 6-32,-7-4-32,3 3 32,-4-4-128,8 8 64,-4-5 32,4 5 0,-4-7 0,7 7 0,-2-7-96,7 7 64,-9-7 96,9 7-32,-5-7-32,9 7 32,-4-6-32,7 6 0,-7-7-96,6 3 64,-2-2 32,3 2 0,-3-3-448,7 7 256,-8-6-1664,8 6 1024,-3-7-6784,3 7 4225</inkml:trace>
 </inkml:ink>
 </file>
 
@@ -5730,10 +5837,10 @@
         </emma:interpretation>
       </emma:emma>
     </inkml:annotationXML>
-    <inkml:trace contextRef="#ctx0" brushRef="#br0">7288 11883 5120,'-19'0'2016,"19"0"-1088,-5 7 192,5-2 928,5-5-544,0 0-192,1-5-224,-3 2 0,7-4-577,-1-1 1,15-4 0,18 2 32,10 2-32,14 1-192,8 7-128,14 4 96,6-4 128,24 0-32,33-8 96,9 1-128,18-4-32,42-8-128,0 7 32,42-7 0,15 13 32,29-2 0,7 8 0,39 4-128,0 10-96,41 9 0,3 3 32,21 4-32,15-7 64,-1-5-128,29-7 0,3 5 160,-22-2 160,24 9-96,-25-1 64,-8 1-448,-23-2-96,-16 13-1568,-36-1-672,-10-7-3455</inkml:trace>
-    <inkml:trace contextRef="#ctx0" brushRef="#br0" timeOffset="-719">7269 11932 4992,'-5'-26'1824,"5"26"-960,5-11 128,-5 11 832,5 2 96,1 2 96,3 19-192,-1-4-1,2 33-1023,-1-8 320,-3 65 160,-2-22 32,-4 80 0,0-27-512,-10 83-160,7-35-320,-13 46-128,8-27-96,-1 5-96,-2-29-64,2-26 32,-1-20-832,1-32-352,1-16-1440,-2-49-640,1-5-2463</inkml:trace>
-    <inkml:trace contextRef="#ctx0" brushRef="#br0" timeOffset="783">7123 14247 7296,'0'7'2720,"25"1"-1472,3 3-896,-10-3 672,10-1 0,10-4 192,18-3-192,24-3-65,27-1-511,11 1-64,23-5-32,37-3-128,15 8 32,23-2 32,41 3 64,15-3-160,32 1-64,26 2-64,16-3 32,40 1 128,15-3 128,28-9-64,19 2 64,9-9-128,12 5-64,4-1-64,-33 0 0,-135 5-288,169-4-32,-10 2-736,-60 9-256,-14-1-992,-44 12-351,-12 7-1985</inkml:trace>
-    <inkml:trace contextRef="#ctx0" brushRef="#br0" timeOffset="1983">16724 12017 6784,'-3'8'2528,"3"-8"-1344,28 11-608,-23-8 800,22 1-128,-5 0-32,26 3-480,-5 4-192,23-4-320,-10-1-33,3 5 129,-6-4-192,13 4 0,-11-3 0,7 3 0,-11 0-64,1-4 32,-9 1 0,-6-2 32,-4 2-64,-10-4 32,-5 0 128,-3-1 128,-6 1-64,-3 4 64,-3-1-192,-3 16-32,0-5 0,-3 30 64,-3-6-96,6 33 0,0-12 96,6 30 32,-3-15-32,2 27-32,0-20-96,4 19-64,-4-14 32,1 22 32,-3-14-32,2 9-32,0-10 32,-5-5 32,0-12-32,0 3 64,0-13-64,-5-8 64,5-6 64,-8 1 128,2-13 224,-13 4 64,5-10-96,-13-4-32,2-5-128,-8-3-32,5-2 96,-13-11 96,8 3 96,-33-5 32,9-3 32,-41-1 64,14 1-256,-43-5-32,20 1-96,-38 3-32,18 1-96,-15-1 32,20 1-128,-9 3 0,23 0-256,6-3-64,17 0-2048,19-8-896,10 0-4320</inkml:trace>
+    <inkml:trace contextRef="#ctx0" brushRef="#br0">7227 11876 5120,'-12'0'2016,"12"0"-1088,-3 7 192,3-2 928,3-5-544,0 0-192,1-5-224,-2 2 0,4-4-577,0 0 1,9-5 0,11 3 32,7 1-32,8 2-192,6 6-128,8 4 96,4-4 128,16 0-32,20-8 96,5 1-128,12-3-32,27-8-128,-1 6 32,27-6 0,9 13 32,19-3 0,3 8 0,26 4-128,-1 9-96,27 9 0,1 3 32,13 3-32,10-6 64,-1-5-128,18-6 0,2 4 160,-13-2 160,14 9-96,-15-1 64,-5 1-448,-15-2-96,-10 12-1568,-22-1-672,-7-6-3455</inkml:trace>
+    <inkml:trace contextRef="#ctx0" brushRef="#br0" timeOffset="-719">7215 11923 4992,'-3'-25'1824,"3"25"-960,3-10 128,-3 10 832,3 2 96,1 1 96,1 19-192,0-4-1,2 32-1023,-2-8 320,-1 61 160,-1-20 32,-3 75 0,0-25-512,-7 79-160,6-33-320,-10 43-128,6-25-96,0 4-96,-2-27-64,1-25 32,0-19-832,0-30-352,1-15-1440,-1-47-640,0-5-2463</inkml:trace>
+    <inkml:trace contextRef="#ctx0" brushRef="#br0" timeOffset="783">7123 14122 7296,'0'7'2720,"16"0"-1472,1 4-896,-5-3 672,5-2 0,7-3 192,11-3-192,16-3-65,16-1-511,7 2-64,15-6-32,23-3-128,9 9 32,15-3 32,26 3 64,9-3-160,20 1-64,17 3-64,9-4 32,26 1 128,10-3 128,16-8-64,13 2 64,6-9-128,7 5-64,2-1-64,-20 0 0,-85 4-288,106-3-32,-6 2-736,-38 9-256,-9-2-992,-27 12-351,-8 6-1985</inkml:trace>
+    <inkml:trace contextRef="#ctx0" brushRef="#br0" timeOffset="1983">13163 12004 6784,'-2'7'2528,"2"-7"-1344,17 11-608,-13-8 800,12 0-128,-2 1-32,17 3-480,-4 3-192,14-3-320,-6-1-33,2 4 129,-3-3-192,7 3 0,-6-2 0,4 2 0,-7 1-64,1-5 32,-6 2 0,-4-2 32,-2 1-64,-7-3 32,-2 0 128,-3-1 128,-3 0-64,-3 5 64,-1-1-192,-2 15-32,0-5 0,-2 28 64,-1-5-96,3 31 0,0-11 96,3 29 32,-1-15-32,1 25-32,1-18-96,1 18-64,-2-13 32,1 20 32,-2-13-32,1 9-32,0-10 32,-3-5 32,0-11-32,0 3 64,0-12-64,-3-8 64,3-6 64,-5 1 128,1-12 224,-8 3 64,4-9-96,-9-3-32,1-6-128,-5-2-32,4-2 96,-9-11 96,5 3 96,-20-4 32,5-4 32,-26 0 64,9 1-256,-27-6-32,13 2-96,-24 3-32,11 0-96,-9 0 32,12 1-128,-6 2 0,15 1-256,4-4-64,11 1-2048,11-8-896,7 0-4320</inkml:trace>
   </inkml:traceGroup>
 </inkml:ink>
 </file>
@@ -5807,7 +5914,7 @@
         </emma:interpretation>
       </emma:emma>
     </inkml:annotationXML>
-    <inkml:trace contextRef="#ctx0" brushRef="#br0">7207 16575 3712,'-18'5'1472,"9"-2"-768,-1 1 160,7 1 672,3-2-256,0 2-32,0 4-288,0-3-64,3 3-480,2-4 320,14 2 416,-1 1-288,1-3-129,3-2-159,10-3-128,13 4 32,14 1-64,18-2 0,14 2-224,5-1-64,14-4 0,22 0 64,23-4-96,-5-1-64,18-3 128,24-4 32,-2 0 128,25-5 128,31-3 32,-5 5 0,28-5-224,-2 6-160,40-1-64,-8 10 32,34-7-32,-15 9 64,37-9 64,-17 7 64,31-3-32,-19 4 32,28 1-64,-20-2 0,21 2-96,-16-9-64,2 3 224,-15 1 160,5 3-192,-35 5-96,-2 8-64,33-8-32,-33 5 64,-40-1 96,-32 4-64,-137-11-64,-18-2-160,10 5-64,-15 0-2240,-4 20-928,-9-3-2687</inkml:trace>
+    <inkml:trace contextRef="#ctx0" brushRef="#br0">7192 16568 3712,'-11'5'1472,"5"-2"-768,0 0 160,4 2 672,2-2-256,0 2-32,0 3-288,0-2-64,2 2-480,1-3 320,9 2 416,-1 0-288,1-2-129,2-2-159,6-3-128,9 4 32,8 1-64,11-3 0,9 3-224,4-1-64,8-4 0,14 0 64,14-4-96,-2-1-64,10-2 128,16-5 32,-1 1 128,15-5 128,20-3 32,-4 5 0,19-5-224,-2 5-160,25 0-64,-5 9 32,21-6-32,-9 8 64,24-8 64,-12 6 64,20-2-32,-12 3 32,18 1-64,-13-2 0,14 2-96,-11-8-64,2 2 224,-10 2 160,3 2-192,-21 5-96,-2 8-64,20-8-32,-20 4 64,-25 0 96,-20 4-64,-86-11-64,-12-2-160,6 5-64,-9 0-2240,-2 19-928,-6-3-2687</inkml:trace>
   </inkml:traceGroup>
 </inkml:ink>
 </file>
@@ -5846,8 +5953,8 @@
         </emma:interpretation>
       </emma:emma>
     </inkml:annotationXML>
-    <inkml:trace contextRef="#ctx0" brushRef="#br0">7292 16718 4992,'-4'-12'1920,"4"12"-1024,0-8-64,0 8 800,0-4-160,0 4-64,0 0-192,0 0 32,0 4-672,0 1 159,0 18 33,0-3-128,0 29-32,0-3-224,0 34-64,0-11-192,0 24-96,0-16 192,0 19 96,0-15-32,-5 16 64,0-11-128,2 3-64,-2-13 0,-5 1-32,6-16-64,-6-4-64,2-8 32,-1-14 32,4-1 32,0-7 96,0-2-32,2-10 0,-2 2-96,5-5-64,0 0-64,5 1 32,-2-6 32,7 1 64,-1 1-32,9-1-32,1 1 32,21-6-32,-3 2-96,27-5 64,-10 0-32,23-5 0,-13 2 64,32-3 64,-13 3 32,39 3 32,-12 0 0,16 9 0,93-1 0,-1 4 0,-26-4 64,13-1 32,14 1 448,-10-3 192,14-1-416,13 0-256,-7-4-64,30 0-32,0-8 32,-3 3 0,16-3 0,-13-4 64,29-3 32,-7-10 32,2 1-128,8-1-96,-17 5 64,8 0 0,50 4 32,-28 0 0,3 4 0,-48 0 64,0-5-32,0 0 0,-27 2-96,5-2 32,-5 1 0,-18 9 96,-31 2-96,2-4-64,-11 3 0,-78 6 32,-19 0-32,10 6-32,-14-1 96,4-1 0,-9 1 32,-5-2 0,-7 1-160,-11 1-32,-4-2-480,-4 2-192,-10-2-672,0-3-256,-4 0-1024,-1 4-352,2-4-3039</inkml:trace>
-    <inkml:trace contextRef="#ctx0" brushRef="#br0" timeOffset="3001">7182 18126 4736,'10'-3'1824,"-2"11"-960,21 0 32,-16 1 800,1 3-96,0 3 96,-1 10-320,0 15-64,-3-8-737,-1-3 161,0 31 32,-5-2-32,2 17 0,-3-9 32,-3 38 0,0-15-224,-3 29-64,-3-17-96,2 17 0,0-17 0,-6 5 64,2-14-160,-2-8-96,1-10-32,0-5 32,-1-8-160,2-9-32,3-8 64,0 1 32,1-8 32,0-5 64,-2-8-96,-2 1 0,3-5-32,0 0 32,1-4-64,0 0 64,-2-4-64,4 0-32,-4-4 32,1 1-32,0-1-96,5 1 0,0-6 128,0 0 32,0 2 0,5-1 32,0 0-64,3-4 64,6 0-128,1 0 0,-2 0 32,19 0 0,-4 0-96,22-4 64,-4 0 32,20-4 0,-6 0 0,14-4 64,44-8-96,10 3 0,2 2 96,-2 6 96,-5 9 0,-14 0 0,6 4-32,16-4 64,15 5 192,-4-2 128,2-6-320,30-6-128,12-3-32,-7-1 32,24-2 32,16-2 96,-5-7-96,33-1 0,-7-7-32,6 0 32,14 0-64,-18 12-32,16 0 32,2 7 32,-18 6-32,12 7-32,5 0 96,-16 3 0,7 1 32,-4 4 64,-19 4-160,14 5-32,1 3 0,-28 3 64,9-3-32,-1-6 64,-21 1-128,-1-1 0,-4-8 96,36 8 96,-36-3-64,-18-2-64,-2-2 64,-10-7 64,-8 5-128,-22-2-32,-16-3 64,-54 0 32,-5 0-32,16-3 32,-9-2-128,14 1 0,-14 4 32,9-8 0,-13-1 64,0 9 32,-9 0-32,-6 0 32,-2 0-64,-1-3 64,-11 0-64,-8-2 64,1 1 0,-9-1 32,-6 2-64,1-6 32,-6 6-128,2-5 0,-6-1 32,1 1 64,0-1-32,-5 3-32,0-3 32,0 1-32,0-4-96,0 7 64,0 2 32,0-6 64,0 6-32,4-5-32,-4-1-64,0-3-32,0 1 128,0-10 32,0 5-96,0-8 32,0 4 0,0-21 0,0 4 0,0-11 64,0 4-32,-4-22-32,-1 14 32,0-20-32,1 6 0,0-18 64,-2 7-32,3-12-32,-2 16 32,5-13-32,0 14-96,-5-9 64,5 12 32,-5-8 64,5 13-96,0-10 0,0 18 32,-4-1 64,4 8-32,0 6-32,0 6 32,0 5-32,0 3-96,0 6 64,0 2-192,0 5-96,0-1-800,4 10-384,1-1-4160,-14 11-1887</inkml:trace>
+    <inkml:trace contextRef="#ctx0" brushRef="#br0">7251 16717 4992,'-2'-12'1920,"2"12"-1024,0-7-64,0 7 800,0-4-160,0 4-64,0 0-192,0 0 32,0 4-672,0 1 159,0 16 33,0-2-128,0 28-32,0-3-224,0 32-64,0-11-192,0 24-96,0-16 192,0 18 96,0-14-32,-3 15 64,-1-10-128,3 2-64,-3-11 0,-2 0-32,4-15-64,-5-4-64,2-8 32,0-12 32,1-2 32,1-6 96,0-3-32,1-8 0,-1 1-96,3-5-64,0 1-64,3 0 32,-1-5 32,4 0 64,0 2-32,5-2-32,1 2 32,14-6-32,-3 2-96,17-5 64,-6 0-32,14-5 0,-7 2 64,19-3 64,-8 3 32,25 3 32,-8 0 0,11 9 0,57-1 0,0 3 0,-16-3 64,8-2 32,9 2 448,-7-3 192,10-2-416,7 1-256,-4-4-64,19 0-32,0-7 32,-2 2 0,10-3 0,-8-3 64,18-3 32,-4-10 32,1 1-128,5-1-96,-10 5 64,4 0 0,32 4 32,-18 0 0,2 3 0,-30 1 64,0-5-32,0 0 0,-17 1-96,3-1 32,-3 1 0,-11 8 96,-20 3-96,1-5-64,-7 3 0,-48 6 32,-13 0-32,7 6-32,-9-1 96,2-1 0,-5 0 32,-3-1 0,-5 1-160,-7 1-32,-2-2-480,-3 1-192,-6-1-672,0-3-256,-2 0-1024,-1 4-352,1-4-3039</inkml:trace>
+    <inkml:trace contextRef="#ctx0" brushRef="#br0" timeOffset="3001">7182 18055 4736,'6'-3'1824,"-1"10"-960,14 1 32,-11 1 800,1 2-96,-1 3 96,1 10-320,-1 14-64,-2-8-737,0-2 161,-1 29 32,-2-2-32,1 16 0,-2-8 32,-2 36 0,0-15-224,-2 29-64,-2-17-96,1 16 0,1-16 0,-4 4 64,0-12-160,0-8-96,1-10-32,-1-5 32,0-7-160,1-8-32,1-8 64,1 0 32,1-6 32,-1-6 64,-1-7-96,-1 0 0,2-4-32,0 0 32,1-3-64,-1-1 64,-1-4-64,3 1-32,-3-5 32,1 2-32,0-2-96,3 2 0,0-6 128,0 0 32,0 1 0,3 0 32,0 0-64,2-4 64,4 0-128,1 0 0,-2 0 32,12 0 0,-3 0-96,15-4 64,-3 0 32,12-3 0,-3-1 0,9-3 64,27-8-96,6 3 0,2 1 96,-1 7 96,-4 8 0,-8 0 0,3 4-32,10-4 64,10 4 192,-2-1 128,0-6-320,20-5-128,7-4-32,-5 0 32,16-2 32,10-2 96,-4-7-96,22-1 0,-5-6-32,3-1 32,10 1-64,-12 11-32,11 0 32,0 7 32,-11 5-32,8 7-32,3 0 96,-10 3 0,4 1 32,-2 3 64,-12 5-160,8 4-32,2 3 0,-19 3 64,6-3-32,0-6 64,-13 1-128,-2-1 0,-1-7 96,22 7 96,-23-2-64,-11-3-64,-1-1 64,-7-7 64,-5 5-128,-13-2-32,-11-3 64,-33 0 32,-4 0-32,11-3 32,-6-2-128,8 1 0,-8 4 32,5-7 0,-7-2 64,-1 9 32,-6 0-32,-3 0 32,-1 0-64,-1-3 64,-7 0-64,-5-1 64,0 0 0,-5-1 32,-3 2-64,-1-5 32,-3 5-128,2-5 0,-5 0 32,1 0 64,0 0-32,-3 2-32,0-3 32,0 2-32,0-5-96,0 8 64,0 1 32,0-6 64,0 6-32,3-4-32,-3-2-64,0-2-32,0 0 128,0-9 32,0 5-96,0-8 32,0 4 0,0-20 0,0 4 0,0-10 64,0 3-32,-3-21-32,0 14 32,0-20-32,1 7 0,-1-18 64,-1 7-32,2-12-32,-1 16 32,3-13-32,0 14-96,-3-9 64,3 11 32,-3-7 64,3 12-96,0-9 0,0 17 32,-2-2 64,2 9-32,0 5-32,0 6 32,0 4-32,0 4-96,0 5 64,0 2-192,0 5-96,0-1-800,2 9-384,1-1-4160,-8 11-1887</inkml:trace>
   </inkml:traceGroup>
 </inkml:ink>
 </file>
@@ -5924,11 +6031,11 @@
               </emma:one-of>
             </emma:emma>
           </inkml:annotationXML>
-          <inkml:trace contextRef="#ctx0" brushRef="#br0">14004 14274 7296,'-9'3'2816,"9"-3"-1536,13 5-576,-9-5 832,1 4-160,-5-1 32,0 2-129,0-1-95,5 4-640,0-5 32,-2 11 64,-3-7 0,6 13 0,-2-3 32,0 11-32,0-4 0,-4 36 0,0-6-160,0 27 32,0-12-160,-4 23-32,0-14-64,0 31 0,-2-20-224,3 7 0,-2-15-32,0 8 64,0-12-32,1 4-32,0-12-64,-2 4-32,6-16-448,0-14-192,0-6-832,0-25-288,0-4-1184,6-19-479,-2-1-1665</inkml:trace>
-          <inkml:trace contextRef="#ctx0" brushRef="#br0" timeOffset="567">13730 15507 5376,'-13'-15'2112,"13"15"-1152,-5 0-416,5 0 704,0 0-64,0 0 64,5 3-32,-2 0-64,7 6-608,-2 0 383,1 2 161,1 2 128,3 11 64,-4-4-288,6 24-64,-7-10-160,6 21-96,-6-6-224,2 17-128,-1-14-96,4 5 0,-3-8-128,-1 3-64,1-8 64,3-4 0,1-3-32,0-8-64,-6-6 32,10-11-32,-4 1 0,0-13 64,0 0 96,3-4 64,2 0 160,7-24 96,-2 4-64,0-30 0,-2 10-160,1-24 0,-6 6-160,1-3 0,-4 10 32,0-3 0,0 10-1120,-5 4-448,0 7-5216,-5 0-3071,2 1 4127</inkml:trace>
-          <inkml:trace contextRef="#ctx0" brushRef="#br0" timeOffset="1569">14777 16200 4736,'0'4'1824,"0"-4"-960,0 4-96,0 0 704,0-4-32,0 0 0,0 0-160,0 0-64,5 0-672,-5 0 160,4 0 63,0 0 97,-4-8 32,0 4 64,6-32 32,-2 7-96,5-35 0,-4 10-160,3-27-64,-2 13-224,2-42-32,2 22-128,-2-38 0,1 20-160,1-14-96,-5 15 0,-1-10-32,0 19 64,2 8 32,-3 7-32,2 0 32,0 12-64,-5 8 64,0 7-288,0 14-32,0 5-992,0 15-416,0 3-1504,5 9-639,-1 4-1601</inkml:trace>
-          <inkml:trace contextRef="#ctx0" brushRef="#br0" timeOffset="1922">14713 14730 9216,'-22'13'3520,"22"-13"-1920,-5 4-960,5-4 959,5-4-319,-1-1 64,9-18-224,-3 3-32,12-17-608,-4 5 64,6-12 96,-2 7-160,1-9 64,-4 11-128,-2-2 0,1 5-160,1 7 0,-6 5-96,11 13 64,-6-1 0,9 19 96,-5-2-32,7 14 0,-7-3-160,4 14-32,-2-7-32,-2 13 32,6-6-480,-11 1-224,-2-6-2240,2-4-896,-2-5-2687</inkml:trace>
-          <inkml:trace contextRef="#ctx0" brushRef="#br0" timeOffset="49208">16562 14370 4608,'8'-12'1760,"-8"9"-960,-4-6-32,-5 6 768,-10-2-288,-15 2 0,-17 3-416,-22 0-224,-19 0-320,-21 0 0,-14 3 128,-10 5-96,-12-4 64,-21 1-96,6 4 0,1-3-96,-2-6-32,-8 5-32,10-2 0,-1 3 127,13-3 97,20-3-192,8 0-96,8 3-32,11 3 32,14-4-32,16 7-32,20-9 32,8 0 32,14 0-32,14-3 64,13-3-64,28-2 64,17 2-64,20-3-32,14 1-64,25-1 32,37 1 32,15 8 0,7 0-96,30 0 64,3 8 32,4 1 64,15-6-32,-9 5-32,-10 4 32,-13-6-32,3 2 0,-8-8 64,-18 3-32,0 0-32,-9-6 32,-1 0-32,-4-3 0,-21 6 0,-30 0-1919,-26 0-833,-28-2-1600</inkml:trace>
+          <inkml:trace contextRef="#ctx0" brushRef="#br0">13875 14274 7296,'-5'3'2816,"5"-3"-1536,8 5-576,-6-5 832,1 3-160,-3 0 32,0 2-129,0-1-95,4 3-640,-1-4 32,-1 11 64,-2-8 0,3 13 0,0-3 32,-1 11-32,1-4 0,-3 34 0,0-6-160,0 26 32,0-11-160,-3 21-32,1-13-64,-1 30 0,0-20-224,1 8 0,-1-16-32,-1 9 64,1-12-32,1 4-32,-1-11-64,-1 3-32,4-15-448,0-13-192,0-6-832,0-23-288,0-5-1184,4-17-479,-1-2-1665</inkml:trace>
+          <inkml:trace contextRef="#ctx0" brushRef="#br0" timeOffset="567">13703 15446 5376,'-8'-15'2112,"8"15"-1152,-3 0-416,3 0 704,0 0-64,0 0 64,3 3-32,-1 0-64,4 6-608,-1-1 383,1 3 161,0 1 128,2 11 64,-2-4-288,3 23-64,-4-10-160,4 20-96,-4-5-224,1 15-128,0-12-96,2 4 0,-2-7-128,0 2-64,0-7 64,3-4 0,-1-3-32,1-8-64,-4-5 32,7-10-32,-4 0 0,1-12 64,0 0 96,2-4 64,1 0 160,4-22 96,-1 3-64,0-28 0,-1 9-160,0-23 0,-3 6-160,0-2 0,-2 8 32,0-2 0,0 10-1120,-3 3-448,-1 7-5216,-2 0-3071,0 0 4127</inkml:trace>
+          <inkml:trace contextRef="#ctx0" brushRef="#br0" timeOffset="1569">14361 16104 4736,'0'4'1824,"0"-4"-960,0 4-96,0-1 704,0-3-32,0 0 0,0 0-160,0 0-64,4 0-672,-4 0 160,2 0 63,1 0 97,-3-7 32,0 3 64,3-30 32,0 6-96,3-33 0,-3 10-160,2-26-64,-1 13-224,1-41-32,1 21-128,-1-35 0,1 18-160,0-13-96,-3 14 0,-1-9-32,1 18 64,1 7 32,-2 7-32,1 0 32,0 12-64,-3 7 64,0 6-288,0 14-32,0 5-992,0 14-416,0 3-1504,3 8-639,0 5-1601</inkml:trace>
+          <inkml:trace contextRef="#ctx0" brushRef="#br0" timeOffset="1922">14321 14707 9216,'-14'13'3520,"14"-13"-1920,-3 3-960,3-3 959,3-3-319,0-2 64,5-17-224,-2 3-32,8-16-608,-3 4 64,5-10 96,-3 5-160,2-7 64,-3 10-128,-1-3 0,0 6-160,1 6 0,-4 5-96,7 13 64,-4-2 0,6 18 96,-3-1-32,4 13 0,-4-3-160,3 13-32,-2-6-32,-1 12 32,3-6-480,-6 1-224,-2-5-2240,2-4-896,-2-5-2687</inkml:trace>
+          <inkml:trace contextRef="#ctx0" brushRef="#br0" timeOffset="49208">15484 14365 4608,'5'-11'1760,"-5"8"-960,-2-6-32,-4 7 768,-6-3-288,-9 2 0,-11 3-416,-14 0-224,-12 0-320,-13 0 0,-9 3 128,-6 4-96,-8-3 64,-13 1-96,4 4 0,0-4-96,0-5-32,-6 5-32,6-2 0,0 3 127,8-4 97,13-2-192,4 0-96,6 3-32,7 3 32,8-4-32,10 6-32,14-8 32,4 0 32,8 0-32,10-2 64,8-4-64,17-2 64,12 3-64,11-4-32,10 1-64,15 0 32,24 0 32,9 8 0,4 0-96,19 0 64,2 8 32,3 0 64,9-5-32,-5 5-32,-7 3 32,-8-5-32,2 2 0,-6-8 64,-10 2-32,-1 1-32,-5-6 32,-1 1-32,-2-4 0,-14 6 0,-18 0-1919,-17 0-833,-17-2-1600</inkml:trace>
         </inkml:traceGroup>
       </inkml:traceGroup>
     </inkml:traceGroup>
@@ -6010,18 +6117,18 @@
               </emma:one-of>
             </emma:emma>
           </inkml:annotationXML>
-          <inkml:trace contextRef="#ctx0" brushRef="#br0">9268 12482 6400,'-10'-8'2464,"15"4"-1344,0 4 224,-5 0 1184,0 0-384,0 0-129,0 0-383,0 0-96,6 8-832,-6 1 288,0 26 128,0-6-64,-6 28 32,6-8-352,-5 23-32,0-8-288,2 31-96,-2-15-160,5 4-64,0-10-32,0 22-64,0-15 32,5 13 32,-2-18-96,2 6 0,0-18-480,-5-19-192,0-9-1056,0-28-480,0-20-1280,0-16-575,6-12-1345</inkml:trace>
-          <inkml:trace contextRef="#ctx0" brushRef="#br0" timeOffset="601">10014 12542 7168,'18'0'2720,"-18"5"-1472,-18-2 32,14 1 1120,-2 1-449,2-2-159,-10 11-320,-13 9-96,0-2-736,3-1 256,-20 3 96,8-2-96,-20 7-64,11-3-192,-6-2 0,6-2-160,4 8 32,5-9-160,-4 3-32,8-2-128,0 3-32,4-3-192,5-1 32,4-3-64,11 7 0,3-4 64,5 3 0,0-1 64,10-2 32,-1-5 96,27 11 32,-4-6 32,22 12 64,-8-4-96,22 8-64,-8-2 0,4-3-32,-10-2-64,10-1-64,-9-4 32,-2 0-32,-2-4 0,-10-4 64,-5 2-608,-8-12-256,-5 2-1280,-10-2-512,1-12-3168,0-8-1375,-4-7 1951</inkml:trace>
-          <inkml:trace contextRef="#ctx0" brushRef="#br0" timeOffset="1233">10529 12473 9216,'-4'0'3520,"4"0"-1920,-5 0-800,5 0 1055,0 9-223,0-1 0,0 16-352,0-4-160,-5 22-608,5-7 160,-8 22 96,-2-13-128,1 16 32,1-2-256,-2 2 0,1-8-192,-1 14 32,7-14-160,-2 6 0,0-10 32,1-4 0,-1-4-64,5-3-64,0-5 32,0-7 32,0-1-32,9-4 64,1-3 0,7-2 32,-2 2 192,12-6 128,-5-2-32,15-6 64,-11 3-192,17-3-32,-8 0 0,20 3 0,-9-4-128,13-2-96,-9 0 0,4 0-32,-9 0-96,1-2 0,-4-4-640,-7 3-320,-3 0-1376,-5-3-576</inkml:trace>
-          <inkml:trace contextRef="#ctx0" brushRef="#br0" timeOffset="1665">11531 12888 7296,'3'-6'2720,"7"-6"-1472,-10 12-608,5 0 864,-1-3 128,1-2 191,-5 5 1,0 0 32,5 17 0,-2-6-64,2 1-416,0 17-192,-2-4-320,-3 15-160,6 24-320,-1 6-96,0-5-96,-2-24 32,2-9-128,0 3 0,-2 14 32,-3-9 0,0-3-224,6 0 0,-6-1-256,0-12-32,0-3-480,0-6-256,0-1-1088,0-14-448,0-6-864,0-2-255,5-16-1217</inkml:trace>
-          <inkml:trace contextRef="#ctx0" brushRef="#br0" timeOffset="2303">11575 12425 12416,'-17'-23'4639,"17"23"-2495,0 0-800,0 0 1440,0 0-928,0 0-320,10 0-832,-10 0-320,7-17-288,3 17-160,6 7-2944,15-14-1248,-14 0-2591</inkml:trace>
-          <inkml:trace contextRef="#ctx0" brushRef="#br0" timeOffset="3120">12255 12426 10368,'-9'-14'3936,"13"6"-2112,-4 13-993,0-5 1089,5 9-480,0 2-32,-2 6-256,2-5-64,0 28-608,-2 24 64,-3 14 96,-3 8-160,-2-31 0,5-3-160,-5 5 32,-3 24-192,3-29-32,1-7-64,-1 5 32,0-10-64,5 0 64,0-3-128,0-5 0,0-3 32,0-6 64,0-2 32,5-1 96,0-4 32,4-4 32,-1 0-64,11 0 32,-1-4 64,14 0 64,-5 1-96,15 0 0,-7-3-96,11-1 0,-4-2-32,3-3 0,-9 0-64,1 0 32,-5 0-64,-6-3-32,11-6-480,-10 1-224,-8 5-1216,-6-6-448,-8 1-2208,-10 0-927,-8-4-193</inkml:trace>
-          <inkml:trace contextRef="#ctx0" brushRef="#br0" timeOffset="3405">12268 13012 9856,'-32'-16'3680,"27"2"-1984,1-9-704,4 23 1183,4-9-383,6-5 0,-2 0-192,2 8-32,17-8-864,-5 2 96,15 9-32,-10-2-256,15 5-64,-7 0-256,7 5-64,-6-2-64,1-3 32,3 0-576,5-3-1344,-8-10-224,-18 1-736,-11 0-192,-3-5-2943</inkml:trace>
-          <inkml:trace contextRef="#ctx0" brushRef="#br0" timeOffset="3636">12236 12442 12800,'-22'-4'4831,"22"-1"-2623,0 5-1152,0 0 1408,8-3-704,1-1-224,19-9-384,-6 4-96,20-3-608,-12 4-192,17 2-96,-6-3-96,4 12-64,24 3-128,-15 0-64,-3 11-1248,-6 0-480,0 3-2720,-4 0-1151,1 0-65</inkml:trace>
-          <inkml:trace contextRef="#ctx0" brushRef="#br0" timeOffset="4137">13675 12482 11136,'-9'-4'4224,"9"-1"-2305,0 5-767,0 0 1312,3 5-480,3 7-96,-1 0-544,0 0-128,-2 21-672,7 19 160,-2 5 160,3 15-416,-8-22-160,2-7-96,0 31-64,-2 39 0,2-15 0,-5-18-64,0-4-64,0-10-256,0-14-96,0-15-864,-5-14-352,2-17-1632,3-15-672,3-8-2783</inkml:trace>
-          <inkml:trace contextRef="#ctx0" brushRef="#br0" timeOffset="4637">13770 12620 12288,'5'-18'4575,"-1"18"-2495,1 0-1376,0 6 1184,3 2-224,2 12 128,4 4-512,4 12-192,-4-12-640,-6-4-224,11 38 0,8 14-64,5 0 64,0 6-192,0-1-96,-6-8 32,-7-25 64,-1-7-64,9 6-64,5 11 128,0-10 32,-8-12 0,-11-24-64,4-8 96,-2 0-64,-1-28-32,8-28 224,-4 2 96,-4 11-256,4-26 0,-4 11 288,4-6 160,9-33-192,-8 8-96,-1 0-224,-10 40-64,3 9 32,-3 0 0,0-10-320,-3 15-96,-5 6-1056,-5 13-448,2 4-3712,-2 20-1663,0 4 1695</inkml:trace>
-          <inkml:trace contextRef="#ctx0" brushRef="#br0" timeOffset="5538">14945 12559 9216,'-32'-12'3424,"32"12"-1856,-4-20-128,4 20 1247,0-8-191,0 3 32,4-2-416,1 2-224,3-4-1024,2 6 32,17 0 32,-3-2-160,30 1-64,-9-1-256,32 10-128,-13-1-96,5 7-64,-10 3-96,19 1-64,-15-3 32,10 1-32,-9-1-224,-5-4-96,-9 1-672,-1-2-320,-7 1-3968,-7 0-1696</inkml:trace>
-          <inkml:trace contextRef="#ctx0" brushRef="#br0" timeOffset="5206">15249 12527 12288,'5'-17'4575,"-5"17"-2495,5 4-1312,0-4 1216,-2 8-384,7 12 0,-1 5-352,-4-4-32,8 27-704,-4-8 64,4 30 64,6 42-224,-9 6-64,-2-8-192,2-50-64,-1-8-32,-1 8-64,-3 26-64,0-45-32,-2-9-288,3 8-160,-1 4-768,-5-19-288,0-17-864,0-21-288,-5-7-1983,-1-15-801,3-6 1152</inkml:trace>
+          <inkml:trace contextRef="#ctx0" brushRef="#br0">8541 12476 6400,'-7'-7'2464,"10"3"-1344,1 4 224,-4 0 1184,0 0-384,0 0-129,0 0-383,0 0-96,3 8-832,-3 0 288,0 25 128,0-5-64,-3 26 32,3-7-352,-4 21-32,1-7-288,1 29-96,-1-14-160,3 4-64,0-10-32,0 21-64,0-14 32,3 13 32,-1-18-96,1 6 0,1-17-480,-4-19-192,0-7-1056,0-28-480,0-18-1280,0-16-575,3-11-1345</inkml:trace>
+          <inkml:trace contextRef="#ctx0" brushRef="#br0" timeOffset="601">9010 12533 7168,'11'0'2720,"-11"5"-1472,-11-2 32,8 1 1120,0 1-449,0-3-159,-6 12-320,-8 8-96,0-3-736,2 0 256,-13 3 96,6-2-96,-13 7-64,6-3-192,-3-2 0,4-3-160,2 9 32,3-9-160,-2 3-32,5-2-128,0 3-32,2-3-192,4-1 32,2-3-64,7 7 0,2-4 64,3 2 0,0 0 64,6-2 32,0-4 96,16 9 32,-1-5 32,13 12 64,-6-5-96,15 8-64,-5-1 0,2-4-32,-6-1-64,6-2-64,-5-3 32,-2 0-32,-1-4 0,-6-4 64,-3 2-608,-5-11-256,-4 2-1280,-6-3-512,1-10-3168,0-9-1375,-3-6 1951</inkml:trace>
+          <inkml:trace contextRef="#ctx0" brushRef="#br0" timeOffset="1233">9334 12468 9216,'-3'0'3520,"3"0"-1920,-3 0-800,3 0 1055,0 8-223,0 0 0,0 15-352,0-4-160,-3 21-608,3-7 160,-5 21 96,-1-12-128,0 15 32,1-2-256,-1 2 0,0-8-192,0 14 32,4-13-160,-1 5 0,0-10 32,0-3 0,0-4-64,3-3-64,0-4 32,0-8 32,0 0-32,6-4 64,0-3 0,5-1 32,-2 1 192,8-6 128,-3-1-32,9-6 64,-7 2-192,11-2-32,-5 0 0,13 3 0,-6-4-128,8-2-96,-5 0 0,2 0-32,-6 0-96,1-2 0,-3-4-640,-4 3-320,-2 0-1376,-3-2-576</inkml:trace>
+          <inkml:trace contextRef="#ctx0" brushRef="#br0" timeOffset="1665">9964 12862 7296,'2'-6'2720,"4"-5"-1472,-6 11-608,3 0 864,0-3 128,0-2 191,-3 5 1,0 0 32,3 17 0,-1-7-64,1 1-416,0 17-192,-1-4-320,-2 14-160,4 23-320,-1 5-96,0-4-96,-1-23 32,1-9-128,0 3 0,-1 14 32,-2-9 0,0-3-224,4 0 0,-4 0-256,0-13-32,0-2-480,0-5-256,0-2-1088,0-13-448,0-6-864,0-1-255,3-16-1217</inkml:trace>
+          <inkml:trace contextRef="#ctx0" brushRef="#br0" timeOffset="2303">9992 12422 12416,'-11'-22'4639,"11"22"-2495,0 0-800,0 0 1440,0 0-928,0 0-320,6 0-832,-6 0-320,5-16-288,1 16-160,4 7-2944,10-14-1248,-10 1-2591</inkml:trace>
+          <inkml:trace contextRef="#ctx0" brushRef="#br0" timeOffset="3120">10419 12423 10368,'-5'-13'3936,"7"5"-2112,-2 13-993,0-5 1089,3 9-480,1 1-32,-2 6-256,1-4-64,0 26-608,-1 22 64,-2 14 96,-2 8-160,-1-30 0,3-2-160,-3 4 32,-3 23-192,3-28-32,1-6-64,-1 5 32,0-10-64,3 0 64,0-3-128,0-5 0,0-2 32,0-6 64,0-2 32,3-1 96,0-4 32,2-4 32,1 1-64,5-1 32,1-3 64,8-1 64,-3 2-96,9-1 0,-4-2-96,7-1 0,-2-2-32,1-3 0,-5 0-64,0 0 32,-3 0-64,-4-3-32,8-6-480,-7 2-224,-5 4-1216,-4-6-448,-5 2-2208,-6-1-927,-5-3-193</inkml:trace>
+          <inkml:trace contextRef="#ctx0" brushRef="#br0" timeOffset="3405">10428 12980 9856,'-20'-15'3680,"16"1"-1984,2-7-704,2 21 1183,2-9-383,5-4 0,-2-1-192,1 9-32,11-9-864,-3 3 96,9 8-32,-6-2-256,9 5-64,-3 0-256,3 5-64,-3-2-64,0-3 32,2 0-576,3-3-1344,-4-9-224,-12 0-736,-7 1-192,-2-5-2943</inkml:trace>
+          <inkml:trace contextRef="#ctx0" brushRef="#br0" timeOffset="3636">10408 12438 12800,'-14'-3'4831,"14"-2"-2623,0 5-1152,0 0 1408,5-3-704,0-1-224,13-8-384,-4 3-96,12-2-608,-7 3-192,11 3-96,-5-4-96,4 12-64,14 3-128,-9-1-64,-2 11-1248,-3 1-480,-1 2-2720,-2 0-1151,0 0-65</inkml:trace>
+          <inkml:trace contextRef="#ctx0" brushRef="#br0" timeOffset="4137">11313 12476 11136,'-6'-3'4224,"6"-2"-2305,0 5-767,0 0 1312,2 5-480,2 6-96,-1 0-544,0 1-128,-1 19-672,4 19 160,-1 4 160,2 14-416,-5-20-160,1-8-96,0 31-64,-1 36 0,1-14 0,-3-17-64,0-4-64,0-9-256,0-13-96,0-15-864,-3-13-352,1-17-1632,2-13-672,2-8-2783</inkml:trace>
+          <inkml:trace contextRef="#ctx0" brushRef="#br0" timeOffset="4637">11372 12607 12288,'4'-17'4575,"-2"17"-2495,1 0-1376,0 6 1184,2 2-224,2 11 128,2 3-512,2 13-192,-2-13-640,-4-2-224,7 35 0,5 13-64,3 0 64,0 7-192,0-2-96,-4-8 32,-4-23 64,0-7-64,5 6-64,3 10 128,0-9 32,-5-11 0,-7-24-64,3-7 96,-2 0-64,0-26-32,5-28 224,-3 3 96,-2 10-256,2-24 0,-2 10 288,3-6 160,5-31-192,-6 7-96,1 0-224,-7 39-64,2 8 32,-2 0 0,0-10-320,-2 15-96,-3 6-1056,-3 11-448,1 5-3712,-1 19-1663,0 3 1695</inkml:trace>
+          <inkml:trace contextRef="#ctx0" brushRef="#br0" timeOffset="5538">12112 12550 9216,'-21'-12'3424,"21"12"-1856,-2-19-128,2 19 1247,0-7-191,0 2 32,2-2-416,2 2-224,1-3-1024,1 5 32,11 0 32,-2-2-160,19 2-64,-6-2-256,21 10-128,-9-2-96,3 8-64,-5 2-96,11 1-64,-10-2 32,7 0-32,-6 0-224,-3-5-96,-5 2-672,-1-3-320,-5 2-3968,-4 0-1696</inkml:trace>
+          <inkml:trace contextRef="#ctx0" brushRef="#br0" timeOffset="5206">12303 12519 12288,'3'-16'4575,"-3"16"-2495,3 4-1312,0-4 1216,-1 7-384,4 12 0,0 5-352,-3-4-32,5 26-704,-2-8 64,2 28 64,4 41-224,-5 5-64,-2-8-192,1-47-64,-1-7-32,1 7-64,-3 24-64,0-42-32,-1-8-288,1 7-160,1 4-768,-4-19-288,0-15-864,0-20-288,-4-7-1983,1-15-801,1-5 1152</inkml:trace>
         </inkml:traceGroup>
       </inkml:traceGroup>
     </inkml:traceGroup>
@@ -6066,10 +6173,10 @@
               </emma:one-of>
             </emma:emma>
           </inkml:annotationXML>
-          <inkml:trace contextRef="#ctx0" brushRef="#br0" timeOffset="8771">8854 15869 6656,'0'-7'2464,"0"2"-1344,0 5-192,0 0 896,0 0-288,0 0-32,0 0-449,0 0-95,0 5-544,0-2 96,0 21 64,0-4 96,0 20 128,0-3-224,0 12-96,0-8-192,0 24-32,0-13-96,3 4 0,3-2-32,2 1 0,-3-6-160,5 0 32,-7-4-64,8-9 0,-3-4 128,0-7 32,2-5-32,-1-12-64,1 1 96,-2-23 64,2 8 128,4-23 64,-1 4-32,6-19-32,-2 4-32,1-14 64,-4 10-160,4-20-32,-4 2-64,-1 6 32,2 8 0,-6 2 96,4 11-448,-8 3-224,-1 3-1312,1 9-512,0-5-2048,8 10-831,-5 6 607</inkml:trace>
-          <inkml:trace contextRef="#ctx0" brushRef="#br0" timeOffset="7525">9168 14391 5120,'-4'5'1920,"4"-2"-1024,0-3 64,0 9 896,0-9-96,0 0 0,-5 8-480,-5 4-225,1 0-607,-4 1-64,4-1 32,-1-3-96,6 6 64,0-4-160,-1 15 32,0-6-32,10 17 96,-5-5 128,5 12 32,-5-4 0,0 21 32,0-8-64,-5 8-32,0-6-96,1 26 32,0-12-128,-2 17-64,2-13-64,0 24 0,-1-13-64,0 26-32,1-13 32,0-7 32,-2-18-96,3-6 0,-2-11-32,0-10 0,0-8-992,-3-13-416,-6 0-3839,0-11-2561,-4-10 3232</inkml:trace>
-          <inkml:trace contextRef="#ctx0" brushRef="#br0" timeOffset="9643">9428 16472 6784,'-5'9'2528,"5"-3"-1344,0-33-896,0 22 704,0 14-416,0 2-64,0 1 64,0-3 64,0-4-320,0-2 32,0 0 64,0-3 128,0 0 64,0 0 31,0-6 65,0 1-192,0 10-32,0-5-160,0 0-32,0 0-160,0-9-32,0 4-32,0-1 32,0-3 128,0 1 128,0-1-64,0 1 64,0-1-192,0 3-32,0-3-64,0 9-64,0 0 96,0-16 128,0-8 128,0 4-64,5 0 64,-5-1 0,4-4 96,-4 2 64,4-18-32,-4 4-96,6-27 0,-3 10-160,2-26-64,0 11 0,4-24-32,1 12 0,3-11 0,-4 6-64,4-11-64,0 12 96,1-7 0,-4 15-32,4-9 32,-6 13 0,2-4 96,-2 13-96,2-2 0,-6 14-32,0 4 32,2 7-64,-3 6-32,2 6 32,0 4-32,0 5-288,-1 8-128,-4 0-832,0 12-416,0 0-1152,0 12-480,0 5-2335</inkml:trace>
-          <inkml:trace contextRef="#ctx0" brushRef="#br0" timeOffset="10092">9372 14840 5888,'-13'-3'2272,"22"0"-1216,-5 3 160,2 0 1088,-3-6-416,2 3-65,5-9-255,-6-1-128,14-14-768,-4 2-64,9-12 64,-1 5-96,10-4 32,-5 8-192,5-9-96,-4 5-32,4 0-32,-5 7 0,0 4 0,-3 6-64,-2 2-32,-4 6-32,0 11 0,1-4 64,-2 11 32,-2 1-32,2 25-32,-3-8-96,4 14 32,-5-6-64,6 4-32,-6-9-1184,0 0-480,16 13-3104,-20-16-1311,-9-6 1087</inkml:trace>
+          <inkml:trace contextRef="#ctx0" brushRef="#br0" timeOffset="8771">8280 15694 6656,'0'-6'2464,"0"1"-1344,0 5-192,0 0 896,0 0-288,0 0-32,0 0-449,0 0-95,0 5-544,0-2 96,0 19 64,0-3 96,0 19 128,0-2-224,0 10-96,0-7-192,0 23-32,0-13-96,2 5 0,2-3-32,1 1 0,-2-5-160,3-1 32,-4-3-64,5-9 0,-2-3 128,0-8 32,1-4-32,0-11-64,0 0 96,-1-21 64,2 7 128,1-21 64,1 3-32,3-18-32,-2 4-32,2-13 64,-4 9-160,4-19-32,-3 3-64,-1 4 32,1 9 0,-3 1 96,2 11-448,-5 2-224,0 4-1312,0 8-512,0-5-2048,5 10-831,-3 5 607</inkml:trace>
+          <inkml:trace contextRef="#ctx0" brushRef="#br0" timeOffset="7525">8478 14290 5120,'-3'5'1920,"3"-2"-1024,0-3 64,0 8 896,0-8-96,0 0 0,-3 8-480,-3 3-225,0 1-607,-2 0-64,2-1 32,0-2-96,3 5 64,1-3-160,-1 13 32,0-5-32,6 17 96,-3-6 128,3 12 32,-3-4 0,0 20 32,0-8-64,-3 8-32,0-6-96,0 25 32,1-11-128,-2 16-64,1-13-64,1 23 0,-1-12-64,-1 24-32,2-11 32,-1-8 32,0-16-96,1-7 0,-1-10-32,-1-9 0,1-8-992,-2-12-416,-4 0-3839,1-11-2561,-4-9 3232</inkml:trace>
+          <inkml:trace contextRef="#ctx0" brushRef="#br0" timeOffset="9643">8641 16267 6784,'-3'9'2528,"3"-3"-1344,0-32-896,0 21 704,0 14-416,0 1-64,0 2 64,0-4 64,0-3-320,0-2 32,0 0 64,0-3 128,0 0 64,0 0 31,0-6 65,0 1-192,0 10-32,0-5-160,0 0-32,0 0-160,0-9-32,0 5-32,0-2 32,0-3 128,0 2 128,0-2-64,0 2 64,0-2-192,0 3-32,0-2-64,0 8-64,0 0 96,0-15 128,0-8 128,0 4-64,3 0 64,-3-1 0,3-4 96,-3 2 64,2-17-32,-2 4-96,4-26 0,-2 10-160,1-25-64,0 10 0,3-22-32,0 11 0,2-10 0,-2 5-64,2-10-64,0 11 96,1-6 0,-3 14-32,3-9 32,-4 12 0,2-3 96,-2 12-96,1-1 0,-4 12-32,1 5 32,1 6-64,-2 6-32,1 5 32,0 4-32,0 5-288,0 8-128,-3-1-832,0 12-416,0 0-1152,0 12-480,0 4-2335</inkml:trace>
+          <inkml:trace contextRef="#ctx0" brushRef="#br0" timeOffset="10092">8606 14717 5888,'-8'-3'2272,"13"0"-1216,-2 3 160,1 0 1088,-2-6-416,1 4-65,3-10-255,-3 0-128,8-14-768,-2 2-64,5-11 64,0 5-96,6-4 32,-3 7-192,3-8-96,-2 4-32,2 1-32,-3 6 0,0 4 0,-2 6-64,-1 2-32,-3 5-32,1 11 0,-1-4 64,0 10 32,-1 2-32,0 23-32,-1-8-96,2 14 32,-2-6-64,3 4-32,-4-8-1184,0-1-480,10 13-3104,-12-15-1311,-6-7 1087</inkml:trace>
         </inkml:traceGroup>
       </inkml:traceGroup>
     </inkml:traceGroup>
@@ -6116,15 +6223,15 @@
               </emma:one-of>
             </emma:emma>
           </inkml:annotationXML>
-          <inkml:trace contextRef="#ctx0" brushRef="#br0" timeOffset="-12852">8790 16986 8064,'-10'-15'3072,"7"6"-1664,-2-16-448,5 18 1088,0-1-513,0 3-95,8-2-480,-2 2-192,7-3-448,0-1 64,14-3 128,-3 4-128,7-4-64,-3 4-32,14 1 32,-7 2-160,10 5-32,-3 0-64,-1 5-64,0-2 160,-10 6 32,-4-1-64,2 12-32,-8-4 32,-2 12 0,-6-3 0,-3 2 0,-1 2-64,-4 8-64,-1-8 32,-4-1 32,0-4 96,-9-1 64,4 2-32,-13-1-32,0-4-32,-10 0 0,6-3-64,-10 0-64,6-5 96,-6 0 0,0-4 32,4 0 0,5-1 0,4 2 64,1-4-32,4 1 0,6-1-192,3 4 32,0-2 0,5 6 64,0-5 96,5 4 64,0 0-32,3 8 32,2-3-64,12 7 0,-3-4-32,4 0 0,-1-3-64,10 6-64,-8-3 32,3 12 32,-6-3-32,3 0-32,-5-6 32,0 6 32,-7-9-448,2-3-160,0 0-832,-1 3-416,6 3-1600,-6-2-704,6-10-1567</inkml:trace>
-          <inkml:trace contextRef="#ctx0" brushRef="#br0" timeOffset="-13584">8794 16856 5888,'-9'-3'2272,"9"3"-1216,-5 12 96,5-4 960,0-5-288,0 2-96,0 16-289,0-6-63,0 22-736,0-5 192,0 25 64,0-13 64,0 25 64,0-9-352,0 21-160,0-12-160,0 12 0,0-12-192,0 11-96,0-11-32,5 9-32,-5-18 0,5-7 0,-1-8-864,0-25-288,2-12-896,-2-16-416,0-4-2047,6-16-2209,-2-9 2272</inkml:trace>
-          <inkml:trace contextRef="#ctx0" brushRef="#br0" timeOffset="-12251">9604 16925 7552,'-5'-29'2816,"5"29"-1536,-3 25-576,3-25 896,0 0-192,0 0 31,3 9-255,2-3 0,0 0-672,-5-3 64,4 9 64,1 1-160,0 19 0,0-8-160,-2 16-32,-3-6-96,0 18 32,0-8-64,0 9 0,0-9-32,0 5 64,0-8-96,0 3 0,0-4 32,0-3 0,0-5-64,0-4 32,0-2-64,0-6 64,0 0 0,5-5 32,0-3 0,4 1 0,-4-6 64,8 2 32,1-1 32,9 0 64,-6-8-96,12-8 32,-2 8-96,5-8 0,-5 4-96,5-4-64,-5-1 96,0 6 0,-4-2-128,1 2-32,-7-1-1024,-4 4-480,2 0-1120,-1 0-384,-1-5-2751</inkml:trace>
-          <inkml:trace contextRef="#ctx0" brushRef="#br0" timeOffset="-11932">9642 17233 8704,'-14'-4'3328,"14"-1"-1792,0 2-960,0 3 992,4 0-161,0 0 129,10-5-160,-4 1-64,12-1-704,-4 2 192,10 3 96,-2 0-352,6 0-64,-3 0-224,2 0-96,-3 0-64,4 0 0,-6 0-288,2 3-96,4-3-832,-6 0-320,-2 0-960,-6 0-384</inkml:trace>
-          <inkml:trace contextRef="#ctx0" brushRef="#br0" timeOffset="-11612">9687 16893 8064,'-32'-5'2976,"27"-2"-1600,-3-6-352,8 13 1056,0 0-257,0 0 33,0-3-256,0 3-64,3-4-832,2 4 288,5 0 128,-1 0-192,9 7-64,-4-2-352,13-2-160,0 2-288,10-5-32,-5 0-32,5-5 64,-10 2-32,-1-2 64,1 2-480,2 3-224,1-4-1600,-1 4-640,-2 0-3967</inkml:trace>
-          <inkml:trace contextRef="#ctx0" brushRef="#br0" timeOffset="-11049">10797 16752 8448,'0'-17'3168,"-5"14"-1728,2-6-192,-2 9 1119,0 0-159,0 0-32,-12 9-448,3-6-128,-14 9-896,6 1 0,-5 8 64,3-6-224,-2 1-64,2-4-256,6 0-96,1 0-128,2 1-32,7-1 32,8 8 64,0-3-96,13 10 0,-3-2 32,17 7 0,-5-3 0,6 3 0,-6-4 0,10 13 0,-5-9 0,5 16 64,-5-7-32,-4 8 64,-4-9 0,-6-3 32,-4-5 0,-9 5 0,0-5-64,-14 0-64,6-7 96,-24-1 64,5-4-64,-24-3 0,11-6-32,-10-2-64,5-2-192,-1-2-128,4-2-960,10 3-352,-3-6-1344,11-18-608,16-5-2591</inkml:trace>
-          <inkml:trace contextRef="#ctx0" brushRef="#br0" timeOffset="-10295">11011 16853 9344,'-22'0'3520,"22"0"-1920,3-5-544,-3 5 1215,10 5-415,4-5-32,0 0-64,-1 0 64,14 0-992,-3 0 160,12 0 32,-5 0-288,16 3 0,-11 3-384,22 0-128,-8 0-128,20-4-96,-12 4 32,20-3 32,-14 0-608,0 3-192,22 2-1888,-18-8-832,-18 12-3711</inkml:trace>
-          <inkml:trace contextRef="#ctx0" brushRef="#br0" timeOffset="-10595">11380 16816 8448,'0'-9'3232,"0"6"-1728,0-9-128,0 12 1215,5 0-511,0 0-160,-2 9-544,2-6-160,0 9-672,0 0 96,4 25 32,-4-9 0,-2 33-32,2-9-192,0 22-128,0-10-96,-1 5-64,1-12-96,0 10 32,-2-9-128,2 2 0,0-11 32,-1 8 64,-4 4-896,0-26-352,0-22-1184,-9-29-512,-4-8-3263,-1-13-1825,-4-3 3840</inkml:trace>
-          <inkml:trace contextRef="#ctx0" brushRef="#br0" timeOffset="-17721">7307 17434 2816,'0'-23'1120,"0"14"-576,0-2 416,3 6 672,2 5-256,-5 0 0,5 8 0,-1 9 0,1-2-736,0-1 320,-2 21 160,2 39-128,0-22 63,-5-8-255,0 45-32,0-17-224,0 34-64,0-16-160,-5 39-32,5-20-96,-5 16-32,5-16-32,0 13 0,0-20-64,5 8-64,5 39-2016,7-32-959,2-29-2305</inkml:trace>
+          <inkml:trace contextRef="#ctx0" brushRef="#br0" timeOffset="-12852">8240 16756 8064,'-6'-14'3072,"4"5"-1664,-1-15-448,3 18 1088,0-2-513,0 3-95,5-1-480,-2 1-192,6-3-448,-1 0 64,9-4 128,-2 5-128,4-5-64,-1 5-32,8 0 32,-4 2-160,7 5-32,-3 0-64,0 5-64,0-2 160,-7 5 32,-2 0-64,1 11-32,-4-4 32,-2 12 0,-4-3 0,-2 1 0,0 3-64,-3 7-64,-1-8 32,-2 0 32,0-4 96,-5-1 64,2 2-32,-9-2-32,1-3-32,-7 0 0,4-3-64,-6 1-64,4-6 96,-4 0 0,0-3 32,2 0 0,4-2 0,2 3 64,0-4-32,4 0 0,2 0-192,3 4 32,0-3 0,3 7 64,0-6 96,3 5 64,0-1-32,3 8 32,0-3-64,8 7 0,-2-4-32,2 0 0,0-3-64,6 6-64,-5-3 32,2 11 32,-4-2-32,2-1-32,-3-5 32,0 6 32,-4-9-448,1-3-160,-1 0-832,1 3-416,3 3-1600,-4-2-704,4-10-1567</inkml:trace>
+          <inkml:trace contextRef="#ctx0" brushRef="#br0" timeOffset="-13584">8242 16632 5888,'-5'-3'2272,"5"3"-1216,-3 12 96,3-5 960,0-4-288,0 2-96,0 15-289,0-6-63,0 21-736,0-4 192,0 23 64,0-12 64,0 23 64,0-8-352,0 20-160,0-11-160,0 11 0,0-12-192,0 11-96,0-10-32,3 8-32,-3-17 0,3-7 0,-1-7-864,1-24-288,1-11-896,-2-16-416,1-3-2047,3-16-2209,-1-8 2272</inkml:trace>
+          <inkml:trace contextRef="#ctx0" brushRef="#br0" timeOffset="-12251">8752 16698 7552,'-3'-28'2816,"3"28"-1536,-2 24-576,2-24 896,0 0-192,0 0 31,2 9-255,1-4 0,0 1-672,-3-3 64,3 8 64,0 2-160,0 17 0,0-7-160,-1 15-32,-2-6-96,0 18 32,0-9-64,0 10 0,0-10-32,0 6 64,0-8-96,0 3 0,0-4 32,0-3 0,0-5-64,0-3 32,0-2-64,0-6 64,0 0 0,3-5 32,0-3 0,3 2 0,-3-7 64,5 3 32,1-2 32,5 1 64,-3-8-96,7-8 32,-1 8-96,3-7 0,-3 3-96,4-4-64,-4 0 96,0 5 0,-3-2-128,1 2-32,-4 0-1024,-3 3-480,1 0-1120,0 0-384,-1-5-2751</inkml:trace>
+          <inkml:trace contextRef="#ctx0" brushRef="#br0" timeOffset="-11932">8776 16990 8704,'-9'-3'3328,"9"-2"-1792,0 2-960,0 3 992,3 0-161,-1 0 129,7-5-160,-3 2-64,8-2-704,-3 2 192,7 3 96,-2 0-352,4 0-64,-1 0-224,0 0-96,-1 0-64,2 0 0,-4 0-288,2 3-96,2-3-832,-4 0-320,-1 0-960,-3 0-384</inkml:trace>
+          <inkml:trace contextRef="#ctx0" brushRef="#br0" timeOffset="-11612">8804 16667 8064,'-20'-4'2976,"17"-3"-1600,-2-5-352,5 12 1056,0 0-257,0 0 33,0-3-256,0 3-64,2-4-832,1 4 288,3 0 128,0 0-192,5 7-64,-2-3-352,8-1-160,0 2-288,6-5-32,-3 0-32,4-5 64,-7 2-32,-1-1 64,1 1-480,1 3-224,1-4-1600,-1 4-640,-1 0-3967</inkml:trace>
+          <inkml:trace contextRef="#ctx0" brushRef="#br0" timeOffset="-11049">9502 16533 8448,'0'-16'3168,"-3"13"-1728,1-5-192,-1 8 1119,0 0-159,0 0-32,-8 8-448,2-5-128,-8 9-896,3 0 0,-3 8 64,2-6-224,-2 1-64,2-3-256,4-1-96,0 1-128,2 0-32,4-1 32,5 8 64,0-2-96,8 8 0,-2-1 32,11 6 0,-3-2 0,4 2 0,-4-3 0,6 12 0,-3-9 0,3 16 64,-3-7-32,-3 7 64,-2-8 0,-4-2 32,-2-6 0,-6 5 0,0-4-64,-9-1-64,4-6 96,-15-1 64,3-4-64,-15-3 0,7-6-32,-7-1-64,4-3-192,-1-1-128,3-2-960,6 3-352,-2-6-1344,7-17-608,10-5-2591</inkml:trace>
+          <inkml:trace contextRef="#ctx0" brushRef="#br0" timeOffset="-10295">9637 16629 9344,'-14'0'3520,"14"0"-1920,2-4-544,-2 4 1215,6 4-415,3-4-32,0 0-64,-1 0 64,9 0-992,-2 0 160,8 0 32,-4 0-288,11 3 0,-7 3-384,13 0-128,-5-1-128,13-3-96,-7 4 32,12-3 32,-9 0-608,1 2-192,13 3-1888,-12-8-832,-10 11-3711</inkml:trace>
+          <inkml:trace contextRef="#ctx0" brushRef="#br0" timeOffset="-10595">9869 16594 8448,'0'-8'3232,"0"5"-1728,0-9-128,0 12 1215,3 0-511,0 0-160,-1 9-544,1-6-160,1 8-672,-1 1 96,2 23 32,-2-9 0,-1 32-32,2-8-192,-1 20-128,0-9-96,-1 4-64,1-10-96,1 8 32,-2-8-128,1 2 0,0-10 32,-1 7 64,-2 4-896,0-25-352,0-20-1184,-5-29-512,-4-6-3263,1-13-1825,-4-3 3840</inkml:trace>
+          <inkml:trace contextRef="#ctx0" brushRef="#br0" timeOffset="-17721">7307 17181 2816,'0'-21'1120,"0"12"-576,0-1 416,2 5 672,1 5-256,-3 0 0,3 7 0,0 10 0,0-3-736,0-1 320,-1 20 160,1 38-128,0-22 63,-3-7-255,0 42-32,0-15-224,0 32-64,0-16-160,-3 38-32,3-20-96,-3 16-32,3-15-32,0 12 0,0-20-64,3 9-64,3 37-2016,5-31-959,1-28-2305</inkml:trace>
         </inkml:traceGroup>
         <inkml:traceGroup>
           <inkml:annotationXML>
@@ -6151,16 +6258,16 @@
               </emma:one-of>
             </emma:emma>
           </inkml:annotationXML>
-          <inkml:trace contextRef="#ctx0" brushRef="#br0" timeOffset="-9177">13429 17529 9984,'-5'0'3680,"5"0"-1984,13 4-992,-8-1 991,5-3-351,-1 0 32,4 0-320,1 0-96,4-12-512,-4 4 64,13-28 128,-4 3-64,14-23 32,-5 7-192,4-16-96,-5 9-160,1 2-64,-5 11-32,10-1 32,-10 7 0,0 0 32,-3 2-64,-2 6 32,-4 4 0,11 1 96,-12 4-96,1 3 0,-4 5 96,-1 12 32,2 0-32,-1 9-32,-1-1-32,6 19 0,-6-2 64,0 24 32,-4 0-192,4 20 0,1-14-32,-4 11 64,-2-14-32,2 0-32,-1-6 32,-4-2 32,0-7-256,-2-14-96,2 2-832,-10-10-320,5 2-896,-3-5-288,3-3-1824,8-1-831,1 0 799</inkml:trace>
-          <inkml:trace contextRef="#ctx0" brushRef="#br0" timeOffset="-8846">13719 17103 9856,'-26'0'3680,"26"0"-1984,-9 8-576,9-5 1279,0 3-703,0-3-256,9 6-64,-1-1 32,15-5-736,-4 0 128,13-6 64,-5 3-288,10-3 0,-5-3-256,13 6-64,-4 0-128,-1 9-96,-3 0-576,0 5-192,-5 0-2272,3-2-896,-3-4-2847</inkml:trace>
-          <inkml:trace contextRef="#ctx0" brushRef="#br0" timeOffset="-8008">14731 16954 11648,'-14'-37'4288,"14"37"-2305,8-12-895,-2 12 1280,2-3-512,2-2-32,3-4-576,-4 3-192,9-8-608,-4 2-64,9-2 32,-4 0-160,8-2 0,-5 5-128,20 2-32,-7 1-32,11 8-64,-4 0 32,3 12 32,-5-4 32,2 9 32,-10-5-160,-5 8-32,-5-5-64,-17 14 96,0-4 0,-18 11 32,-2-3 0,-21 8 0,4-15 192,-13 0 128,8-3-160,-3-6-32,3 0-128,-4-10-32,9 1-320,0 0-96,5-4-1472,9-4-576,4 0-3936,9-7-2783,5 2 3647</inkml:trace>
-          <inkml:trace contextRef="#ctx0" brushRef="#br0" timeOffset="-8446">14757 16873 12544,'-8'3'4735,"8"-3"-2559,0 8-1536,0-4 1120,0 12-480,0-4-32,5 22-160,-2-7-32,8 34-576,-8-13-64,7 22-64,-2-14-192,2 2-96,-1-11 32,-1 7 0,2-11-192,-1-2-64,1-9-1152,-7-15-480,2-5-1344,0-16-576,-5-1-2175</inkml:trace>
-          <inkml:trace contextRef="#ctx0" brushRef="#br0" timeOffset="-7044">15537 16856 16000,'8'-8'5983,"-8"8"-3263,37-7-2112,-28 7 1440,14 0-832,-4 0-128,21 3-512,-8 1-128,24 4-256,-11 0-64,14 4 0,-9 0-416,9-4-128,-10 0-1792,7 10-704,-11-6-4832</inkml:trace>
-          <inkml:trace contextRef="#ctx0" brushRef="#br0" timeOffset="-7345">15546 17507 13056,'-9'9'4927,"9"-9"-2687,13 5-1472,-7-2 1280,7-6-352,0 3 32,6 0-480,0 0-128,7 0-640,-4 0-64,20 0-64,-6 0-128,9 3 32,-3 2-224,9-1-32,-11-1-416,0 2-160,-2-2-800,-6-3-352,-6 0-1472,-2-8-672,-8 1-2463</inkml:trace>
-          <inkml:trace contextRef="#ctx0" brushRef="#br0" timeOffset="-7592">15777 16812 11392,'0'-8'4224,"0"8"-2305,5 3-1247,-5-3 1120,6 9-128,-6-1 64,2 12-192,4-3 0,-2 24-864,2-9-160,-6 28-64,0-3-192,3 7-64,2-12-96,0 5-96,-2-11-672,3-6-288,-2-8-1344,-4-8-608,0 1-2847,0-14-2241,0 1 3232</inkml:trace>
-          <inkml:trace contextRef="#ctx0" brushRef="#br0" timeOffset="-20843">17626 17273 8320,'0'3'3072,"0"-3"-1664,-4 26-928,4-23 832,0 14-352,0-2-65,0 14-159,0-4 0,0 10-416,0-1 96,0 6 96,0-8-128,0 12 32,0-7-256,-4 4-96,-1-9 32,0 4 64,0-7-64,2-6 0,-3-3 160,2 1 160,0-4-96,-6-1 0,5-4-64,-4 0 64,-4 0-32,5 0 64,-3-4 0,-2-3 32,5-2 352,-15-3 160,4 0-32,-16-8 32,3 4-160,-19 0-64,6 0-288,-11 4-96,10 0-224,-12 0-64,8 0-224,-10 8-96,10 1-2144,18-18-992,5 5-3807</inkml:trace>
-          <inkml:trace contextRef="#ctx0" brushRef="#br0" timeOffset="-23210">17571 16432 6272,'0'4'2368,"0"-4"-1280,10 16-64,-5-12 960,-2 13 96,2-2 191,0 30-415,-5-9-96,-5 29-992,0-8 192,-8 39 32,-1-15-384,-7 28-96,2-11-192,-5 11-32,6-16-256,-4 9 0,4-17-800,-1-16-384,6-12-2016,4-46-895,-1 1-1409</inkml:trace>
-          <inkml:trace contextRef="#ctx0" brushRef="#br0" timeOffset="-16588">17607 16722 3456,'0'-20'1312,"0"20"-704,5-4 256,-5 4 672,5 0 256,-1 0 160,1 8-224,-5 0-32,0 12-928,0-3 255,0 24 97,0-9-64,0 28 32,0-8-352,-5 46-32,1-21 0,-11 32 32,7-16-32,-6 36-64,4-19-192,2 11-128,-6-12-160,6 17-64,-2-16 32,5 23 0,2-20-64,-3-7 32,1-9-128,5 4 0,0-17 32,0-3 64,0-12 32,0-9 32,0-10-160,-3-10-32,3-8 32,0-12 0,0-4-64,0-16 64,0 0-32,0-11 0,0-1 64,0-37 64,0 9-32,0-46-32,0 14-64,0-38-32,0 18-32,0-46 96,0 17 0,0-29 96,0 24 32,0-24 96,0 25-32,-5-21 64,0 25-192,0-17-32,2 21 0,-8 4 64,3 15-1088,-5 3-512,2 17-3232,-2 6-1439,0 6 1087</inkml:trace>
+          <inkml:trace contextRef="#ctx0" brushRef="#br0" timeOffset="-9177">11158 17272 9984,'-3'0'3680,"3"0"-1984,8 4-992,-5-2 991,3-2-351,0 0 32,2 0-320,1 0-96,2-11-512,-2 3 64,8-26 128,-2 3-64,8-22 32,-3 6-192,3-15-96,-4 9-160,1 2-64,-3 10-32,7-1 32,-7 7 0,0 0 32,-2 2-64,-1 5 32,-3 4 0,7 1 96,-7 4-96,0 3 0,-2 5 96,-1 11 32,2 0-32,-2 8-32,0 0-32,4 18 0,-3-3 64,-1 24 32,-3 0-192,4 18 0,-1-13-32,-1 11 64,-2-14-32,1 1-32,0-6 32,-3-3 32,0-5-256,-1-15-96,1 3-832,-6-10-320,3 3-896,-2-6-288,2-2-1824,5-2-831,1 1 799</inkml:trace>
+          <inkml:trace contextRef="#ctx0" brushRef="#br0" timeOffset="-8846">11340 16867 9856,'-16'0'3680,"16"0"-1984,-6 8-576,6-6 1279,0 4-703,0-3-256,6 6-64,-1-2 32,10-4-736,-4 0 128,10-6 64,-4 3-288,6-3 0,-3-3-256,8 6-64,-2 0-128,-1 9-96,-1 0-576,-1 4-192,-3 0-2272,2-1-896,-2-5-2847</inkml:trace>
+          <inkml:trace contextRef="#ctx0" brushRef="#br0" timeOffset="-8008">11977 16725 11648,'-9'-35'4288,"9"35"-2305,5-11-895,-1 11 1280,1-3-512,1-2-32,2-3-576,-2 2-192,5-7-608,-2 1-64,6-1 32,-3 0-160,5-3 0,-3 6-128,12 1-32,-4 2-32,7 7-64,-3 0 32,3 11 32,-4-3 32,1 8 32,-6-5-160,-3 8-32,-3-4-64,-11 12 96,0-3 0,-11 10 32,-1-2 0,-14 6 0,3-13 192,-8 0 128,4-3-160,-1-6-32,2 0-128,-3-9-32,6 0-320,0 1-96,3-4-1472,6-4-576,2 0-3936,6-7-2783,3 2 3647</inkml:trace>
+          <inkml:trace contextRef="#ctx0" brushRef="#br0" timeOffset="-8446">11993 16648 12544,'-5'3'4735,"5"-3"-2559,0 8-1536,0-4 1120,0 11-480,0-4-32,3 22-160,-1-8-32,5 33-576,-5-12-64,4 20-64,-1-12-192,2 1-96,-2-11 32,0 8 0,2-12-192,-2-1-64,2-8-1152,-5-15-480,1-5-1344,0-14-576,-3-2-2175</inkml:trace>
+          <inkml:trace contextRef="#ctx0" brushRef="#br0" timeOffset="-7044">12484 16632 16000,'5'-7'5983,"-5"7"-3263,23-7-2112,-17 7 1440,8 0-832,-2 0-128,14 3-512,-6 1-128,15 3-256,-7 1-64,9 3 0,-5 1-416,5-5-128,-6 1-1792,4 9-704,-7-6-4832</inkml:trace>
+          <inkml:trace contextRef="#ctx0" brushRef="#br0" timeOffset="-7345">12490 17251 13056,'-6'8'4927,"6"-8"-2687,8 5-1472,-4-2 1280,4-6-352,0 3 32,4 0-480,0 0-128,5 0-640,-4 0-64,14 0-64,-5 0-128,7 3 32,-3 2-224,6-1-32,-7-2-416,1 3-160,-3-2-800,-2-3-352,-5 0-1472,-1-8-672,-5 2-2463</inkml:trace>
+          <inkml:trace contextRef="#ctx0" brushRef="#br0" timeOffset="-7592">12635 16590 11392,'0'-7'4224,"0"7"-2305,3 3-1247,-3-3 1120,4 8-128,-4 0 64,1 11-192,3-3 0,-2 23-864,2-9-160,-4 27-64,0-2-192,2 5-64,1-10-96,0 4-96,-1-10-672,2-6-288,-1-8-1344,-3-7-608,0 1-2847,0-14-2241,0 1 3232</inkml:trace>
+          <inkml:trace contextRef="#ctx0" brushRef="#br0" timeOffset="-20843">13798 17028 8320,'0'3'3072,"0"-3"-1664,-2 25-928,2-22 832,0 13-352,0-2-65,0 14-159,0-4 0,0 9-416,0-1 96,0 6 96,0-7-128,0 10 32,0-5-256,-3 2-96,0-7 32,0 3 64,0-6-64,1-7 0,-2-2 160,1 1 160,1-3-96,-4-2 0,2-4-64,-1 1 64,-3-1-32,3 0 64,-2-3 0,-2-3 32,4-2 352,-9-3 160,2 0-32,-10-8 32,2 4-160,-12 0-64,3 1-288,-6 3-96,6 0-224,-7 0-64,4 0-224,-5 7-96,5 2-2144,12-18-992,3 5-3807</inkml:trace>
+          <inkml:trace contextRef="#ctx0" brushRef="#br0" timeOffset="-23210">13763 16229 6272,'0'4'2368,"0"-4"-1280,7 15-64,-4-11 960,-1 12 96,1-1 191,0 27-415,-3-7-96,-3 26-992,0-7 192,-5 38 32,-1-15-384,-4 26-96,1-10-192,-3 11-32,3-16-256,-2 9 0,3-16-800,-1-15-384,4-12-2016,2-44-895,0 2-1409</inkml:trace>
+          <inkml:trace contextRef="#ctx0" brushRef="#br0" timeOffset="-16588">13786 16505 3456,'0'-19'1312,"0"19"-704,3-4 256,-3 4 672,3 0 256,0 0 160,0 8-224,-3-1-32,0 12-928,0-3 255,0 23 97,0-8-64,0 26 32,0-8-352,-3 44-32,0-19 0,-6 29 32,4-15-32,-4 35-64,3-18-192,1 10-128,-4-12-160,4 17-64,-1-16 32,3 23 0,1-20-64,-2-6 32,1-9-128,3 4 0,0-16 32,0-3 64,0-12 32,0-8 32,0-9-160,-2-10-32,2-8 32,0-11 0,0-4-64,0-15 64,0 0-32,0-10 0,0-1 64,0-36 64,0 9-32,0-44-32,0 14-64,0-37-32,0 18-32,0-44 96,0 16 0,0-28 96,0 24 32,0-24 96,0 24-32,-3-19 64,0 23-192,-1-17-32,2 21 0,-4 4 64,1 14-1088,-4 3-512,2 15-3232,-1 7-1439,0 5 1087</inkml:trace>
         </inkml:traceGroup>
       </inkml:traceGroup>
       <inkml:traceGroup>
@@ -6198,18 +6305,18 @@
               </emma:one-of>
             </emma:emma>
           </inkml:annotationXML>
-          <inkml:trace contextRef="#ctx0" brushRef="#br0" timeOffset="-6074">9832 18467 10880,'-27'-25'4032,"-5"17"-2177,-19-8-895,29 12 1184,-14 0-160,-10 4 0,0 8-384,2 16-192,-2-8-800,0 5-160,20-6 0,2-1-256,2 18-32,-2 16-160,20-12-32,0-3-128,18 2 32,-6-3 64,38 6 32,-4-10 32,25 21 0,42 26-96,-40-37 0,-15-6-32,1 22 96,9 34 128,-15-4 96,-12-6 0,-19-6-32,-18-11-32,-10-16 64,2-9 192,-29 9 128,5-4-128,-40-9 32,13-4-192,-13-8-64,8-4-160,-14-12 0,-36-12-288,23 0-64,14-4-864,18 0-416,14-4-1824,31 0-832,22-18-2239</inkml:trace>
-          <inkml:trace contextRef="#ctx0" brushRef="#br0" timeOffset="-4973">10280 18604 11008,'-30'-9'4128,"28"2"-2241,-9-6-863,11 10 1280,5-6-288,3 0-96,3-2-288,-3-1-160,11-5-800,-6 5 32,14 4-32,1 4-160,13 2-32,-9-4-288,13 3-128,-7-2-32,2 13 32,14 4-608,-4 2-192,-4-8-1440,-1 8-672,0-2-3264,-3 2-1343</inkml:trace>
-          <inkml:trace contextRef="#ctx0" brushRef="#br0" timeOffset="-5505">10255 18572 8448,'-8'-12'3168,"8"7"-1728,3 2-288,-3 3 1151,0 0-447,11 0-32,-3 3-288,2 11-96,-2 6-768,-2 20 224,-3 16 160,-3 4-352,0 18-64,0 3-256,0-28-64,0-9-192,-3 8-32,-3 26 32,6-35 0,0-2-64,0 4-64,0 7 32,0-20 32,0-3-32,6-4 64,-3-5 0,10-4 32,-3 0-64,17-4 32,-8 0 128,13 1 192,-5-6-288,13 2-64,-8-1-64,10-4 64,17-4 32,-5 0 32,-4 0-64,-8 0-64,-6-4-320,-9-4-128,-4-4-1344,-9 0-480,-6-5-2304,-3 2-927</inkml:trace>
-          <inkml:trace contextRef="#ctx0" brushRef="#br0" timeOffset="-5224">10352 19090 12032,'-19'-8'4575,"28"-4"-2495,-4-28-1440,-5 35 1184,10 1-64,3-4 96,4-4-352,12 9-224,-7-2-704,-4 1-64,9-1 0,-3 2-256,11 0-64,-6-2-128,3 1-64,-6-1-128,1 2 0,10-6-704,-5 1-256,-10 1-1216,-3-1-448,-6-1-2240,-3 1-927</inkml:trace>
-          <inkml:trace contextRef="#ctx0" brushRef="#br0" timeOffset="-4157">11476 18618 12544,'-19'-9'4639,"6"1"-2495,4 3-864,9 5 1408,0 5-1024,0-5-352,5 17-544,-1 15-160,0 8-352,2 9 32,-3 11 64,2 16-128,-5 1 32,0-5-160,0-18-64,0-5 0,0 3 32,-5 20-32,2-14-32,-3-15-64,2-6 32,0-8-32,4-9 0,0-11 0,0-15 0,0 3 64,0-22 0,-5-24 64,5-15 32,0-13-32,5 1-64,-1-6 32,0-2 32,5-2-32,1 10-32,3 2 96,6 14 0,-6 13 32,25-2 0,10-20 0,-16 29 0,-5 6 0,15 10 64,-7 1-32,7 38 0,12 10-32,-8 11 64,-9 12-96,-14-11-64,-6-5 0,-4 9-32,3-9 0,-13 5 64,-3 12-32,-8-9-32,-11-8 32,-3-20-32,-1 1 0,-9-1 0,-19 0-96,6-1 64,10-2-32,11-9 0,6 0 64,-1 3 64,2 2-96,2-1-64,12 4 192,6-5 96,2-3 32,13 5 96,1-2-32,16 17 64,-3-3-192,14 15-32,-4-3-64,8 15-64,18 21 32,-4-4-32,-9-4 0,-20-22 0,-3-1-160,0-2-32,-4-3-1056,-5-6-352,9 2-4544,-13-13-2047</inkml:trace>
-          <inkml:trace contextRef="#ctx0" brushRef="#br0" timeOffset="-3204">12386 18514 8448,'-4'0'3168,"4"0"-1728,4 0-544,-4 0 1024,10 0-161,-2 6 1,6-3-256,-1 2-96,10-1-768,5 4 128,-2 4 96,6 12 0,0 18 64,0 10-256,0 3-64,0-1-352,0 10-96,-5 1-96,2 5 32,-13-6 0,3-8 96,-6 0-160,-3-2-32,-1-10 64,-4-4 32,0-8-32,-2-12-64,3-3-64,-2-6 32,0 1 32,1-6 0,0-12 64,0-6 32,-2-8 32,3-8 64,-2 4 32,5-20 96,10-24-96,3-2-64,1-15 0,-2 21 32,-2 10-96,10-1-64,6-17 64,-12 18 64,-4 4-64,-2 7 0,-3 6-96,4 9-32,10-8-192,-6 8-96,-3-1-512,0 14-224,-6 1-1248,0 31-6368</inkml:trace>
-          <inkml:trace contextRef="#ctx0" brushRef="#br0" timeOffset="-2601">13514 18632 8960,'0'-3'3328,"5"3"-1792,-5 0-672,10 0 1023,-7 3-287,-3-3 0,6 9-256,-2 2-64,0 10-704,1 11 224,-5 8 96,0 14-128,0 1 0,-5 11-224,1-2 0,4-4-320,-4 3-128,4-16-64,0 2 32,0-4-96,0-5 0,4-4 96,-4 1 32,4-5 96,1-7 32,0-5-32,0-4-32,-2-3 32,7-10 96,4-3 0,4 0 64,4-3-64,10-2 64,6-3-128,-4 1-64,4-2-64,-2 1 0,10 0-64,-10-1 64,-4-2-128,0-1-64,-14 0-448,0-5-192,1 0-896,-10 2-320,-5 3-1952,-4-1-768</inkml:trace>
-          <inkml:trace contextRef="#ctx0" brushRef="#br0" timeOffset="-2087">13575 18632 12032,'-13'-12'4575,"13"4"-2495,0 0-1216,0 4 1184,3 0-192,7-3 96,-1-6-448,-1 1-224,16 8-704,16-4 128,5 4 64,11-4-256,-24 0-128,-6 4-224,6 4-128,14 7-224,-9 2-128,-2 2-1920,-6 6-864,-7 3-4736</inkml:trace>
-          <inkml:trace contextRef="#ctx0" brushRef="#br0" timeOffset="-2356">13602 18891 14592,'-5'0'5439,"10"4"-2943,3-4-2048,2 0 1152,9-4-352,3-4 64,4 0-544,6-4-192,0 3-352,0 6-96,5 3 64,-10 0-96,5 0-64,-5 3-576,-3 6-288,-2-4-1120,-9-5-416,1 0-1600,-9-5-671,-5-4-641</inkml:trace>
-          <inkml:trace contextRef="#ctx0" brushRef="#br0" timeOffset="-15486">17567 17155 4992,'0'-32'1824,"0"32"-960,3 0 384,3 0 1024,-2 17-384,2-5-128,-3 23-288,2-2-161,0 28-703,-2-9 192,7 41 160,-1-13-320,-4 35-32,0-14-160,-2 32-32,3-19-32,-2 31 64,-4-19-32,0 18 64,0-14 32,-4 5 64,4-22-320,-6 5-128,3-18-32,-2-7 64,0-12-128,-4-16-32,5-8-928,-5-25-416,-1-3-1984,7-22-895,-3-3-1249</inkml:trace>
-          <inkml:trace contextRef="#ctx0" brushRef="#br0" timeOffset="-1570">14854 18442 9472,'-5'-3'3520,"5"3"-1920,0-5-544,0 5 1215,5 12-191,-5 4 32,0 1-352,5-5-128,-5 11-896,3 18 64,7 21 64,-1 5-192,1 19-64,-1 15-96,-5-12 0,-4 0-256,6 1-96,-3-15-160,2-9-96,0-17-160,-2-14 0,3-10-1216,-6-17-448,0-21-1440,0-14-512,0 2-2463</inkml:trace>
-          <inkml:trace contextRef="#ctx0" brushRef="#br0" timeOffset="-1099">14846 18590 13952,'-14'-34'5183,"14"34"-2815,8-44-1632,-2 40 1280,2-12-576,0-1-96,11-6-416,-6 2-192,19-4-416,-3-2 0,16 7 32,-4 3-288,18 9 0,-4 4-64,4 16 0,-9-4 0,-4 24 64,-6-3 32,-2 14 32,-12-5-64,-4 6-64,-4-8-128,-7 2 0,-8-6 0,-17-4 64,6-4-32,-28 1 32,4-5 64,-9 0 0,4 1 128,1-1 64,4-6 0,9 7-32,4-1 96,25 25 160,20 19-160,16-6 0,12-6 64,-13-7 32,-10-13-96,15 17-96,-9-9-64,14 9-96,21 15 32,-8-10-32,-10-11-448,-12-5-160,-7-12-1888,-12-6-736</inkml:trace>
+          <inkml:trace contextRef="#ctx0" brushRef="#br0" timeOffset="-6074">8895 18163 10880,'-17'-24'4032,"-3"17"-2177,-12-9-895,18 13 1184,-8-1-160,-7 4 0,0 7-384,1 16-192,-1-8-800,0 5-160,13-5 0,1-2-256,1 17-32,-1 16-160,12-12-32,1-3-128,11 3 32,-4-4 64,24 6 32,-3-9 32,16 19 0,27 26-96,-26-36 0,-9-6-32,1 21 96,5 33 128,-9-4 96,-8-6 0,-12-6-32,-11-10-32,-6-15 64,1-9 192,-18 9 128,3-4-128,-26-9 32,9-3-192,-8-8-64,5-4-160,-9-11 0,-23-12-288,15 1-64,8-5-864,12 1-416,9-4-1824,19 0-832,14-18-2239</inkml:trace>
+          <inkml:trace contextRef="#ctx0" brushRef="#br0" timeOffset="-4973">9177 18293 11008,'-19'-8'4128,"18"1"-2241,-6-5-863,7 9 1280,3-6-288,2 1-96,2-3-288,-2 0-160,7-5-800,-4 4 32,9 5-32,1 3-160,8 2-32,-6-4-288,8 3-128,-4-1-32,1 11 32,9 5-608,-2 1-192,-3-7-1440,-1 7-672,0-2-3264,-1 3-1343</inkml:trace>
+          <inkml:trace contextRef="#ctx0" brushRef="#br0" timeOffset="-5505">9161 18263 8448,'-5'-12'3168,"5"8"-1728,2 1-288,-2 3 1151,0 0-447,7 0-32,-2 3-288,2 10-96,-2 6-768,-2 19 224,-1 15 160,-2 4-352,0 17-64,0 3-256,0-26-64,0-10-192,-2 9-32,-1 24 32,3-33 0,0-2-64,0 3-64,0 8 32,0-20 32,0-2-32,3-4 64,-1-5 0,6-4 32,-1 0-64,10-4 32,-5 1 128,8 0 192,-3-5-288,8 1-64,-5 0-64,6-4 64,12-4 32,-4 0 32,-3 0-64,-5 0-64,-3-4-320,-6-4-128,-3-3-1344,-5-1-480,-4-4-2304,-2 2-927</inkml:trace>
+          <inkml:trace contextRef="#ctx0" brushRef="#br0" timeOffset="-5224">9222 18755 12032,'-12'-8'4575,"18"-3"-2495,-3-27-1440,-3 33 1184,7 1-64,1-3 96,2-5-352,9 9-224,-5-1-704,-3 0-64,6-1 0,-2 2-256,7 0-64,-4-1-128,2 0-64,-3-1-128,0 2 0,6-5-704,-3 0-256,-6 1-1216,-2 0-448,-4-2-2240,-2 2-927</inkml:trace>
+          <inkml:trace contextRef="#ctx0" brushRef="#br0" timeOffset="-4157">9929 18306 12544,'-11'-8'4639,"2"0"-2495,4 4-864,5 4 1408,0 4-1024,0-4-352,3 16-544,-1 15-160,1 7-352,1 8 32,-2 11 64,1 16-128,-3 0 32,0-5-160,0-17-64,0-4 0,0 2 32,-3 20-32,1-14-32,-2-14-64,1-6 32,1-7-32,2-9 0,0-11 0,0-14 0,0 4 64,0-22 0,-3-23 64,3-14 32,0-12-32,3 1-64,-1-6 32,1-2 32,3-1-32,0 8-32,2 3 96,4 13 0,-4 12 32,16-1 0,6-20 0,-10 28 0,-3 6 0,10 9 64,-5 1-32,4 37 0,8 8-32,-5 12 64,-6 10-96,-8-10-64,-4-4 0,-3 8-32,2-9 0,-8 5 64,-2 12-32,-5-9-32,-7-8 32,-2-18-32,-1 0 0,-5-1 0,-12 1-96,4-2 64,6-1-32,7-9 0,3 0 64,0 3 64,2 1-96,0 0-64,8 4 192,4-5 96,1-3 32,9 4 96,0-1-32,10 16 64,-2-3-192,9 15-32,-3-4-64,6 15-64,10 20 32,-1-4-32,-7-4 0,-12-21 0,-2 0-160,1-3-32,-4-2-1056,-2-7-352,5 3-4544,-8-12-2047</inkml:trace>
+          <inkml:trace contextRef="#ctx0" brushRef="#br0" timeOffset="-3204">10502 18208 8448,'-3'0'3168,"3"0"-1728,3 0-544,-3 0 1024,6 0-161,-1 5 1,4-2-256,-1 2-96,7-1-768,2 3 128,0 5 96,3 10 0,0 18 64,0 10-256,0 2-64,0-1-352,0 10-96,-3 1-96,2 4 32,-9-5 0,2-8 96,-4 1-160,-2-3-32,0-9 64,-3-4 32,0-8-32,-1-11-64,2-3-64,-2-5 32,1 0 32,0-5 0,0-12 64,0-5 32,-1-8 32,2-8 64,-2 4 32,4-18 96,6-24-96,2-2-64,0-13 0,0 19 32,-3 10-96,8-2-64,3-15 64,-8 17 64,-2 3-64,-1 7 0,-2 6-96,2 8-32,7-7-192,-5 8-96,-1-2-512,0 14-224,-4 1-1248,1 29-6368</inkml:trace>
+          <inkml:trace contextRef="#ctx0" brushRef="#br0" timeOffset="-2601">11211 18320 8960,'0'-3'3328,"4"3"-1792,-4 0-672,6 0 1023,-4 3-287,-2-3 0,4 8-256,-2 3-64,1 9-704,0 10 224,-3 8 96,0 13-128,0 2 0,-3 9-224,0-1 0,3-4-320,-2 3-128,2-15-64,0 1 32,0-3-96,0-5 0,2-4 96,-2 1 32,3-4 96,0-7 32,0-5-32,0-4-32,-1-3 32,4-9 96,3-3 0,2 0 64,3-3-64,6-2 64,4-2-128,-2 0-64,1-1-64,0 0 0,6 0-64,-6 0 64,-3-3-128,0 0-64,-9 0-448,1-6-192,0 1-896,-7 2-320,-2 3-1952,-3-2-768</inkml:trace>
+          <inkml:trace contextRef="#ctx0" brushRef="#br0" timeOffset="-2087">11250 18320 12032,'-8'-12'4575,"8"5"-2495,0-1-1216,0 4 1184,2 1-192,4-4 96,-1-6-448,1 2-224,9 7-704,10-3 128,3 3 64,7-4-256,-15 1-128,-3 3-224,3 4-128,9 7-224,-6 1-128,-1 3-1920,-4 5-864,-4 3-4736</inkml:trace>
+          <inkml:trace contextRef="#ctx0" brushRef="#br0" timeOffset="-2356">11267 18566 14592,'-3'0'5439,"6"4"-2943,2-4-2048,1 0 1152,6-4-352,2-4 64,2 1-544,4-5-192,1 4-352,-1 5-96,3 3 64,-6 0-96,3 0-64,-3 3-576,-2 5-288,-1-3-1120,-6-5-416,1 0-1600,-6-5-671,-3-3-641</inkml:trace>
+          <inkml:trace contextRef="#ctx0" brushRef="#br0" timeOffset="-15486">13761 16916 4992,'0'-30'1824,"0"30"-960,2 0 384,2 0 1024,-2 16-384,2-4-128,-2 21-288,1-2-161,0 27-703,-1-9 192,4 40 160,0-13-320,-3 33-32,0-13-160,-1 30-32,2-17-32,-2 29 64,-2-19-32,0 18 64,0-13 32,-2 4 64,2-21-320,-4 5-128,2-17-32,-1-6 64,0-12-128,-3-16-32,4-6-928,-4-25-416,0-2-1984,4-22-895,-2-2-1249</inkml:trace>
+          <inkml:trace contextRef="#ctx0" brushRef="#br0" timeOffset="-1570">12054 18139 9472,'-3'-3'3520,"3"3"-1920,0-4-544,0 4 1215,3 11-191,-3 4 32,0 1-352,3-4-128,-3 10-896,2 17 64,5 19 64,-2 6-192,2 18-64,-2 14-96,-2-12 0,-3 1-256,4 0-96,-3-13-160,3-10-96,-1-15-160,-1-14 0,1-9-1216,-3-16-448,0-21-1440,0-12-512,0 1-2463</inkml:trace>
+          <inkml:trace contextRef="#ctx0" brushRef="#br0" timeOffset="-1099">12049 18280 13952,'-8'-33'5183,"8"33"-2815,5-41-1632,-2 37 1280,2-11-576,0-1-96,7-6-416,-3 2-192,11-4-416,-2-2 0,10 7 32,-2 3-288,11 9 0,-2 3-64,2 15 0,-6-3 0,-2 22 64,-4-2 32,-1 13 32,-7-5-64,-4 5-64,-1-6-128,-5 1 0,-5-6 0,-11-3 64,4-4-32,-18 0 32,3-4 64,-6 0 0,3 1 128,0-1 64,3-5 0,6 6-32,2-1 96,15 23 160,14 19-160,9-6 0,8-5 64,-8-8 32,-6-11-96,8 15-96,-4-8-64,8 9-96,13 14 32,-5-10-32,-6-10-448,-7-5-160,-5-11-1888,-8-6-736</inkml:trace>
         </inkml:traceGroup>
       </inkml:traceGroup>
     </inkml:traceGroup>
@@ -6289,14 +6396,14 @@
               </emma:one-of>
             </emma:emma>
           </inkml:annotationXML>
-          <inkml:trace contextRef="#ctx0" brushRef="#br0">6104 14938 8064,'-5'-4'2976,"5"-4"-1600,0-24-608,0 24 928,5 8-224,-5 0-65,10 11-191,-2 6-32,1-8-640,-4-3 224,5 28 128,-2-10-224,1 16-32,1 29-256,-1 0-64,1-5-288,-2-27 0,-3-5-32,-2-4 64,3 4-96,-2-6 0,-4-11-480,0-15-192,0-7-992,0-10-448,-4-3-2879,14-5-2145</inkml:trace>
-          <inkml:trace contextRef="#ctx0" brushRef="#br0" timeOffset="485">6141 14929 10880,'-10'-32'4032,"10"9"-2177,0 6-1311,5 14 1056,0-6-416,0 1 32,3-4-320,1 0-160,9-4-416,-4-1-64,14 5-32,-6 4-32,10 4 32,-5 4-64,10 4 0,-5 1-96,0 3 32,-5-1 0,-3 1 32,-3 1 0,-2 7 0,-6-4-64,-4 8 32,-4-5 0,-14 22 32,-14 0-160,-4-8-32,0-5 96,4-24 32,4 0-160,-3 8 0,-5 7 32,4-6 96,9-1 64,6-16 320,8 8-32,0 0 32,8 0 32,1 0-32,9 8 0,1-5-32,4 11 0,-1-2-128,5-1-96,-3 1-64,-3 5 0,-2-5 64,4 5 64,-4-6-384,3 6-192,5 3-896,-4-4-320,-1-5-1600,-8-6-608,1-10-2527</inkml:trace>
-          <inkml:trace contextRef="#ctx0" brushRef="#br0" timeOffset="931">6810 14814 8704,'-10'-9'3232,"10"12"-1728,0-3-352,0 0 1151,0 0-383,6 9-64,-2 0-288,4-1-128,1 12-768,6 7 160,-1 15 64,-1-1-224,-4-21-32,1 0-256,-2 12-64,10 16-192,-9-12-32,1-8-32,-1 4 32,4 10-64,-8-18 64,0-4-352,4-8-64,-1 0-544,2-8-256,-2-8-800,2-8-384,-1-3-992,0-6-383,5 1-1345</inkml:trace>
-          <inkml:trace contextRef="#ctx0" brushRef="#br0" timeOffset="1617">6843 14753 7552,'-16'-5'2816,"16"5"-1536,-3 0-448,3 0 992,0 0-256,0 0 31,0 0-127,3-4-32,2 0-800,0 0 256,4-4 160,1 4-192,3-4-96,9-4-320,2 4-128,-2 0-96,10-1-64,-4 0-96,8 6 32,-4 3-64,0 3 64,5 11 0,-16-7 32,-2 1 0,-6 9 64,1 3-32,-14-3 0,-3-5-96,-13-1-64,3-2 32,4-9 32,4 0-96,2 0-64,-2 0-32,5-5 96,0 1 0,13 1 32,-4-2 0,9 5 0,1 0 0,4 12 0,13 2 0,-13-8 64,-4 2 32,-2 12 32,1 18 64,-13-18 96,0 0 160,-15 17 96,5-5 64,-17 17 96,-1-5-192,-13 13-32,-22 12-288,2-17-128,11-15-384,8-26-192,20-19-2016,12-12-800,13-12-4288</inkml:trace>
-          <inkml:trace contextRef="#ctx0" brushRef="#br0" timeOffset="-1754">4924 15145 5632,'-3'-8'2176,"3"4"-1152,0-4-64,0 8 896,0-5-96,0 2 0,0 3-257,0-4-95,0 4-768,0 0 64,0 4-32,0-1 0,3 5-32,3 1-64,-2 11 32,0 0-192,11 12-96,-6-3-32,4 11 32,0-3-96,6-1 32,-6-3-160,11 16 0,-8-9-32,3 1-64,-6-6 32,3 5-32,-3 1 64,0-4 32,-4-9-32,1-4-64,-1-4 96,-5 0 0,0-3-32,1-5-64,0-4 32,0-11-32,-2-2 64,3-7 32,-2 4-32,5-21 32,-4 6 0,3-9 96,-2 3 32,2-20 32,2 5-64,4-9-32,-6 9 32,6-5 32,-4 9-96,3-6-96,-4 11 0,4-17 32,-3 6-32,3-2-32,-4 7 96,1 6 64,-1 1 0,1 6 64,-2 4-192,-3 4-32,-2 3-64,7 2 0,-4 3-288,2-1-160,0-2-736,-3-2-320,6 8-1024,-9 9-352,4 17-2943</inkml:trace>
-          <inkml:trace contextRef="#ctx0" brushRef="#br0" timeOffset="-400">5695 15004 10112,'-14'-8'3776,"4"2"-2048,5-34-1248,5 36 991,5-4-223,0 0 32,9 4-160,-1 1-32,6-6-608,-6 5-64,6-3 0,-1 2-160,4 1-64,-4-4-32,1 20 32,3 0-736,1-4-256,-1 8-1600,-3-16-672,4 0-2559</inkml:trace>
-          <inkml:trace contextRef="#ctx0" brushRef="#br0" timeOffset="-632">5695 15310 7552,'-23'-7'2816,"17"7"-1536,3-14-448,6 11 928,-3 0-384,0-6-1,6 1 1,4-1 64,-2 1-768,-3 1 256,8 2 128,-4 2-192,10 3-32,-6 0-416,10 0-160,-6 0-96,6 0-32,5-5-64,-2 2-64,-2-6 32,-10 6-32,-1-2-992,-3 1-384,-1-1-992,-5 2-352,-4 3-2847</inkml:trace>
-          <inkml:trace contextRef="#ctx0" brushRef="#br0" timeOffset="-918">5698 15076 5888,'-8'-4'2272,"13"4"-1216,-15-5-96,10 5 896,0 0-352,-4 5-96,4-5-320,4 7-129,-4-14-511,0-1 224,5 3 160,-5 2 32,0 11 128,0 7-256,0 2-128,0-5-288,0 16-64,0-4-128,0 21-32,0 13-32,0-23 32,0-7-64,0 4-32,0-6 32,5-3-32,-2-3 64,2 1 96,0-5-64,-2 0 0,-3-3 32,6-1 64,-1-4 32,0 1 96,-2-6 128,7 0 32,-1 2-64,1-1 0,-2 1-96,5-5-32,1 0-96,-1-5 32,1 1-128,1-1 0,-2 2-32,1 0-64,-6-2 96,6 1 0,-4-1-320,-2 2-160,2-2-1024,-1 5-416,-1-4-1120,-3 1-480,0-2-2239</inkml:trace>
+          <inkml:trace contextRef="#ctx0" brushRef="#br0">5665 14924 8064,'-3'-3'2976,"3"-5"-1600,0-22-608,0 22 928,3 8-224,-3 0-65,7 11-191,-2 5-32,0-8-640,-2-2 224,4 26 128,-2-9-224,0 15-32,2 28-256,-2-1-64,2-4-288,-2-26 0,-2-5-32,-1-3 64,1 3-96,0-5 0,-3-11-480,0-14-192,0-6-992,0-10-448,-3-3-2879,10-5-2145</inkml:trace>
+          <inkml:trace contextRef="#ctx0" brushRef="#br0" timeOffset="485">5689 14916 10880,'-7'-30'4032,"7"8"-2177,0 6-1311,3 13 1056,1-6-416,-1 2 32,2-5-320,0 1-160,7-4-416,-3-2-64,8 6-32,-3 3-32,6 5 32,-3 3-64,6 3 0,-2 2-96,-1 3 32,-3-2 0,-2 2 32,-2 1 0,-1 6 0,-4-4-64,-2 8 32,-3-5 0,-9 22 32,-8-1-160,-3-8-32,0-4 96,2-23 32,3 0-160,-1 8 0,-4 6 32,2-6 96,6 0 64,4-16 320,5 8-32,0 0 32,5 0 32,1 0-32,5 8 0,1-5-32,3 10 0,-1-1-128,2-2-96,0 1-64,-3 6 0,-1-6 64,2 5 64,-2-5-384,2 5-192,3 3-896,-3-4-320,0-5-1600,-5-5-608,1-10-2527</inkml:trace>
+          <inkml:trace contextRef="#ctx0" brushRef="#br0" timeOffset="931">6109 14807 8704,'-6'-9'3232,"6"12"-1728,0-3-352,0 0 1151,0 0-383,4 9-64,-2-1-288,3 0-128,1 11-768,4 6 160,-2 15 64,1-1-224,-4-20-32,2 0-256,-2 12-64,6 14-192,-5-11-32,0-7-32,-1 3 32,4 10-64,-6-17 64,0-4-352,3-8-64,-1 1-544,1-8-256,-1-8-800,1-8-384,0-2-992,0-6-383,2 1-1345</inkml:trace>
+          <inkml:trace contextRef="#ctx0" brushRef="#br0" timeOffset="1617">6130 14749 7552,'-10'-5'2816,"10"5"-1536,-2 0-448,2 0 992,0 0-256,0 0 31,0 0-127,2-4-32,1 0-800,0 1 256,3-5 160,0 4-192,3-3-96,4-5-320,3 5-128,-3-1-96,7-1-64,-2 1-96,5 5 32,-3 3-64,0 3 64,3 10 0,-9-6 32,-3 0 0,-2 10 64,-1 2-32,-8-3 0,-1-5-96,-10 0-64,3-3 32,3-8 32,2 0-96,1 0-64,-2 0-32,4-5 96,0 2 0,9 0 32,-4-2 0,7 5 0,0 0 0,2 11 0,9 3 0,-9-9 64,-2 3 32,-1 11 32,0 17 64,-8-17 96,0 0 160,-9 16 96,3-4 64,-11 15 96,0-4-192,-9 12-32,-13 12-288,0-17-128,8-14-384,5-24-192,12-19-2016,8-11-800,8-11-4288</inkml:trace>
+          <inkml:trace contextRef="#ctx0" brushRef="#br0" timeOffset="-1754">4923 15121 5632,'-2'-7'2176,"2"3"-1152,0-4-64,0 8 896,0-5-96,0 3 0,0 2-257,0-4-95,0 4-768,0 0 64,0 4-32,0-2 0,2 6-32,2 1-64,-2 10 32,1 0-192,6 11-96,-3-3-32,2 11 32,0-2-96,4-2 32,-4-3-160,7 16 0,-5-9-32,2 1-64,-3-6 32,1 5-32,-2 1 64,0-4 32,-2-8-32,0-5-64,0-3 96,-4 0 0,1-2-32,0-6-64,0-3 32,0-11-32,-1-2 64,2-6 32,-2 3-32,4-20 32,-3 7 0,2-10 96,-1 4 32,1-20 32,1 5-64,3-8-32,-4 8 32,4-4 32,-3 8-96,2-6-96,-2 11 0,2-17 32,-2 7-32,3-3-32,-4 7 96,2 6 64,-2 0 0,2 7 64,-2 3-192,-2 4-32,-1 3-64,4 2 0,-2 2-288,1 0-160,0-2-736,-2-3-320,4 9-1024,-6 8-352,3 16-2943</inkml:trace>
+          <inkml:trace contextRef="#ctx0" brushRef="#br0" timeOffset="-400">5408 14987 10112,'-9'-7'3776,"3"1"-2048,3-32-1248,3 34 991,3-4-223,0 1 32,6 3-160,-1 1-32,4-5-608,-4 4-64,4-3 0,-1 2-160,3 2-64,-2-5-32,0 19 32,1 1-736,2-5-256,-1 9-1600,-2-16-672,2 0-2559</inkml:trace>
+          <inkml:trace contextRef="#ctx0" brushRef="#br0" timeOffset="-632">5408 15278 7552,'-15'-7'2816,"12"7"-1536,1-13-448,4 10 928,-2 0-384,0-5-1,3 0 1,4 0 64,-2 0-768,-2 1 256,5 3 128,-2 1-192,6 3-32,-4 0-416,6 0-160,-3 0-96,4 0-32,2-5-64,0 2-64,-2-5 32,-7 5-32,1-2-992,-3 1-384,0-1-992,-4 3-352,-2 2-2847</inkml:trace>
+          <inkml:trace contextRef="#ctx0" brushRef="#br0" timeOffset="-918">5410 15056 5888,'-5'-4'2272,"8"4"-1216,-9-5-96,6 5 896,0 0-352,-3 5-96,3-5-320,3 6-129,-3-12-511,0-2 224,3 3 160,-3 3 32,0 9 128,0 7-256,0 3-128,0-6-288,0 16-64,0-5-128,0 21-32,0 12-32,0-22 32,0-6-64,0 3-32,0-5 32,3-3-32,-1-3 64,1 1 96,0-5-64,-1 0 0,-2-2 32,4-2 64,-1-3 32,0 0 96,-1-5 128,4 0 32,0 2-64,0-1 0,-1 0-96,3-4-32,1 0-96,-1-4 32,1 0-128,1-1 0,-2 2-32,1 0-64,-4-1 96,3 0 0,-1-1-320,-2 2-160,1-2-1024,0 5-416,-1-3-1120,-2 0-480,0-2-2239</inkml:trace>
         </inkml:traceGroup>
       </inkml:traceGroup>
     </inkml:traceGroup>
@@ -6341,12 +6448,12 @@
               </emma:one-of>
             </emma:emma>
           </inkml:annotationXML>
-          <inkml:trace contextRef="#ctx0" brushRef="#br0" timeOffset="2872">5772 15969 9216,'-13'-15'3520,"8"10"-1920,-5 2-544,10 3 1215,-4 0-479,0 0-160,-2 11-384,3-2-64,3 11-672,0 0 64,0 9 0,0-6-192,3 6-64,3-4-32,2-1-32,-3-4-64,5 20-32,-1-3-32,3-1 0,2 1-64,0-5-64,-4-4 32,3-3 32,0-4-96,1-1 0,0-5 96,4 2 32,0-6-128,4-2-32,-3-6 32,8-3 0,-3 0 32,2-3 0,-2 3 0,3-20 0,-6 3 0,3-15 64,-6 8-32,4-4 64,-3 3-64,-6-7-32,1 0 160,-4-5 32,-2 5 128,2-5 32,-1 5-32,-9-5-32,0 10-160,0-7-32,0 7-32,-5-1 32,1 2-64,0-2 64,-2 4-288,3 1-32,-2 2-736,0-4-256,0 5-928,5 8-320,10 0-1312,8 4-543,0 8-737</inkml:trace>
-          <inkml:trace contextRef="#ctx0" brushRef="#br0" timeOffset="4054">6574 15966 7680,'-28'-17'2880,"10"2"-1536,8-10-288,10 13 992,0-3-417,10-2-95,-5-12-96,-2 6-32,7-3-768,4-14 192,-6 8 128,2 3-160,8 1 0,0 4-320,9-1-64,2 2-160,6 6 0,10-7-160,-7 12 0,-7 1 32,6 6 64,9 5-96,-6 8-64,-8-5 64,-8 6 0,-8 3 32,-6-4 0,-1-3-64,-9 19-64,-5 16 32,-9-11 32,-2-9-32,0-17 64,3 2-128,-6 10 0,-11 5 32,2-6 64,0-2-96,10-17 0,4 1 32,1 13 0,-6 2 0,11-11 64,4 0-32,-2 0 128,6 4 32,0 1 64,0 3 64,0-1-96,10 1 32,-6 1-96,11 3 0,6 8-192,7 0 32,0 5 288,-1-5 96,-5 1-32,10 7-32,-3-4-128,1 4-32,-2-4-96,4 1-64,-4-5 32,-7-5-32,-2 2 0,-1-5 64,-4-4-256,-1 1-32,0-1-640,-3-4-320,-1-4-1504,1-4-608,-7-4-3200,7-9-2047,-14-3 3775</inkml:trace>
-          <inkml:trace contextRef="#ctx0" brushRef="#br0" timeOffset="3389">6560 15772 9472,'0'-4'3584,"0"0"-1920,0 4-1952,0 0 3807,0 8-1215,0 0-480,0 0-384,4-4-928,-4 0 64,4 13 0,2 12-128,-2 6 0,0 10-192,1-13 0,0-3-160,-1 3 0,0-3 32,2-1 64,-2-4-96,0 8 0,1-4-192,0 4 0,3 14-384,-2-11-96,-3 2-288,2-12 0,0-4-128,-5-21-1408,0-9-96,0-8-2751,5-7-1665,3-12 3168</inkml:trace>
-          <inkml:trace contextRef="#ctx0" brushRef="#br0" timeOffset="4738">7315 15476 8576,'-5'-3'3232,"5"6"-1728,0-3-704,0 0 992,0 0 31,0 9 161,0-6-320,0 5-64,0 4-896,0 5 160,5 15 32,-5 13-224,5-24-32,-1-6-192,0 19-32,2 12-224,-3 0-128,2-2-32,0-10-32,0-11 64,-1 6 32,0 3-32,2-12 32,-6 0-64,3-3-32,2-6 32,0 1-32,8 5 64,1-5 96,0 0 0,-1-4 0,0-5 32,5-6 96,2 3 0,3-11 0,-6-1 32,11-8 32,-6-1-32,10 0 32,-5 0-192,5 6-96,-3-2-32,1 2 32,17-2-32,-12 9-32,-3-1-544,-8 6-192,-8 3-1696,-16 0-6848</inkml:trace>
-          <inkml:trace contextRef="#ctx0" brushRef="#br0" timeOffset="5423">5103 16407 9216,'-10'-9'3520,"15"6"-1920,0-14-960,0 14 959,3-1-95,1-1 64,1-7-320,-2 1-128,6-6-608,4-3-96,-4 5-64,-1 7-192,6-1-96,-1 1 32,6-1 64,3 1-288,-5 1-128,1-1-928,-4-1-448,-6 6-1184,1 10-3775</inkml:trace>
-          <inkml:trace contextRef="#ctx0" brushRef="#br0" timeOffset="5776">5202 16092 6656,'-3'-5'2528,"3"2"-1344,0 3-192,0 0 1024,0 8-64,3-1 95,2 6-287,0-1-128,-1 0-896,1 0-96,0 8 32,0-4-256,3 16-64,1-2-288,1 6-32,-2-4-192,2-3-32,4 0-2016,-1-18-864,1-2-2719</inkml:trace>
+          <inkml:trace contextRef="#ctx0" brushRef="#br0" timeOffset="2872">5456 15904 9216,'-8'-14'3520,"5"9"-1920,-3 2-544,6 3 1215,-3 0-479,1 0-160,-2 11-384,2-3-64,2 11-672,0 0 64,0 9 0,0-7-192,2 7-64,2-4-32,1-1-32,-2-4-64,3 19-32,0-3-32,1-1 0,2 1-64,0-5-64,-3-3 32,3-3 32,-1-4-96,1-1 0,-1-5 96,4 2 32,-1-5-128,3-3-32,-2-5 32,5-3 0,-2 0 32,1-3 0,-1 3 0,2-19 0,-4 3 0,3-14 64,-5 7-32,3-4 64,-2 3-64,-4-6-32,1 0 160,-3-5 32,-1 4 128,1-4 32,0 5-32,-6-6-32,0 11-160,0-8-32,0 8-32,-3-2 32,0 3-64,1-3 64,-2 4-288,2 1-32,-1 2-736,0-3-256,0 4-928,3 7-320,6 1-1312,5 3-543,1 8-737</inkml:trace>
+          <inkml:trace contextRef="#ctx0" brushRef="#br0" timeOffset="4054">5961 15901 7680,'-18'-16'2880,"7"2"-1536,5-10-288,6 13 992,0-4-417,6-1-95,-3-11-96,-1 5-32,4-3-768,3-13 192,-4 8 128,1 2-160,6 1 0,-1 5-320,6-2-64,1 2-160,4 6 0,7-7-160,-5 12 0,-5 0 32,4 7 64,6 4-96,-4 7-64,-4-4 64,-6 6 0,-5 2 32,-4-3 0,0-4-64,-6 19-64,-3 15 32,-6-10 32,-1-9-32,0-17 64,1 3-128,-2 9 0,-8 5 32,1-5 64,0-3-96,7-16 0,2 2 32,1 11 0,-4 3 0,7-11 64,3 0-32,-2 0 128,4 3 32,0 2 64,0 3 64,0-2-96,6 2 32,-3 1-96,6 2 0,4 8-192,5 0 32,0 5 288,-1-5 96,-4 1-32,7 6-32,-1-3-128,0 4-32,-2-5-96,3 2-64,-2-5 32,-5-5-32,-1 3 0,-1-6 64,-2-3-256,-1 0-32,1 0-640,-3-4-320,0-4-1504,0-4-608,-4-4-3200,4-8-2047,-8-3 3775</inkml:trace>
+          <inkml:trace contextRef="#ctx0" brushRef="#br0" timeOffset="3389">5952 15717 9472,'0'-4'3584,"0"0"-1920,0 4-1952,0 0 3807,0 8-1215,0-1-480,0 1-384,3-4-928,-3 0 64,2 12 0,2 11-128,-2 7 0,1 8-192,0-11 0,0-4-160,0 4 0,-1-4 32,2 0 64,-1-4-96,-1 7 0,1-3-192,0 3 0,2 14-384,-1-11-96,-2 2-288,1-11 0,0-4-128,-3-20-1408,0-9-96,0-7-2751,4-7-1665,1-11 3168</inkml:trace>
+          <inkml:trace contextRef="#ctx0" brushRef="#br0" timeOffset="4738">6427 15436 8576,'-3'-3'3232,"3"6"-1728,0-3-704,0 0 992,0 0 31,0 8 161,0-5-320,0 5-64,0 3-896,0 5 160,3 15 32,-3 11-224,3-22-32,0-6-192,-1 19-32,2 10-224,-2 1-128,1-2-32,0-10-32,0-10 64,0 6 32,-1 2-32,2-11 32,-4 0-64,2-3-32,1-5 32,0 0-32,6 5 64,-1-4 96,1-1 0,-1-3 0,1-6 32,2-4 96,1 2 0,3-11 0,-4 0 32,6-8 32,-3-1-32,6 0 32,-3 0-192,3 6-96,-1-2-32,-1 1 32,12-1-32,-8 9-32,-2-2-544,-5 6-192,-5 3-1696,-10 0-6848</inkml:trace>
+          <inkml:trace contextRef="#ctx0" brushRef="#br0" timeOffset="5423">5036 16320 9216,'-7'-9'3520,"10"7"-1920,1-15-960,-1 15 959,2-2-95,0-1 64,2-6-320,-2 0-128,3-5-608,4-3-96,-3 5-64,-1 6-192,4 0-96,-1 0 32,4 0 64,2 0-288,-3 1-128,0 0-928,-2-2-448,-3 6-1184,-1 10-3775</inkml:trace>
+          <inkml:trace contextRef="#ctx0" brushRef="#br0" timeOffset="5776">5098 16021 6656,'-2'-5'2528,"2"2"-1344,0 3-192,0 0 1024,0 8-64,2-2 95,1 7-287,0-2-128,0 1-896,0-1-96,0 8 32,0-4-256,2 16-64,1-3-288,0 6-32,-1-3-192,1-4-32,3 1-2016,-1-18-864,1-1-2719</inkml:trace>
         </inkml:traceGroup>
       </inkml:traceGroup>
     </inkml:traceGroup>
@@ -8029,7 +8136,7 @@
           <a:p>
             <a:fld id="{C7B437E4-9023-4C30-BD7A-7EB9AF5FB2DE}" type="datetimeFigureOut">
               <a:rPr lang="en-US" smtClean="0"/>
-              <a:t>16-Nov-16</a:t>
+              <a:t>18-Nov-16</a:t>
             </a:fld>
             <a:endParaRPr lang="en-US"/>
           </a:p>
@@ -8197,7 +8304,7 @@
           <a:p>
             <a:fld id="{C7B437E4-9023-4C30-BD7A-7EB9AF5FB2DE}" type="datetimeFigureOut">
               <a:rPr lang="en-US" smtClean="0"/>
-              <a:t>16-Nov-16</a:t>
+              <a:t>18-Nov-16</a:t>
             </a:fld>
             <a:endParaRPr lang="en-US"/>
           </a:p>
@@ -8375,7 +8482,7 @@
           <a:p>
             <a:fld id="{C7B437E4-9023-4C30-BD7A-7EB9AF5FB2DE}" type="datetimeFigureOut">
               <a:rPr lang="en-US" smtClean="0"/>
-              <a:t>16-Nov-16</a:t>
+              <a:t>18-Nov-16</a:t>
             </a:fld>
             <a:endParaRPr lang="en-US"/>
           </a:p>
@@ -8543,7 +8650,7 @@
           <a:p>
             <a:fld id="{C7B437E4-9023-4C30-BD7A-7EB9AF5FB2DE}" type="datetimeFigureOut">
               <a:rPr lang="en-US" smtClean="0"/>
-              <a:t>16-Nov-16</a:t>
+              <a:t>18-Nov-16</a:t>
             </a:fld>
             <a:endParaRPr lang="en-US"/>
           </a:p>
@@ -8788,7 +8895,7 @@
           <a:p>
             <a:fld id="{C7B437E4-9023-4C30-BD7A-7EB9AF5FB2DE}" type="datetimeFigureOut">
               <a:rPr lang="en-US" smtClean="0"/>
-              <a:t>16-Nov-16</a:t>
+              <a:t>18-Nov-16</a:t>
             </a:fld>
             <a:endParaRPr lang="en-US"/>
           </a:p>
@@ -9017,7 +9124,7 @@
           <a:p>
             <a:fld id="{C7B437E4-9023-4C30-BD7A-7EB9AF5FB2DE}" type="datetimeFigureOut">
               <a:rPr lang="en-US" smtClean="0"/>
-              <a:t>16-Nov-16</a:t>
+              <a:t>18-Nov-16</a:t>
             </a:fld>
             <a:endParaRPr lang="en-US"/>
           </a:p>
@@ -9381,7 +9488,7 @@
           <a:p>
             <a:fld id="{C7B437E4-9023-4C30-BD7A-7EB9AF5FB2DE}" type="datetimeFigureOut">
               <a:rPr lang="en-US" smtClean="0"/>
-              <a:t>16-Nov-16</a:t>
+              <a:t>18-Nov-16</a:t>
             </a:fld>
             <a:endParaRPr lang="en-US"/>
           </a:p>
@@ -9498,7 +9605,7 @@
           <a:p>
             <a:fld id="{C7B437E4-9023-4C30-BD7A-7EB9AF5FB2DE}" type="datetimeFigureOut">
               <a:rPr lang="en-US" smtClean="0"/>
-              <a:t>16-Nov-16</a:t>
+              <a:t>18-Nov-16</a:t>
             </a:fld>
             <a:endParaRPr lang="en-US"/>
           </a:p>
@@ -9593,7 +9700,7 @@
           <a:p>
             <a:fld id="{C7B437E4-9023-4C30-BD7A-7EB9AF5FB2DE}" type="datetimeFigureOut">
               <a:rPr lang="en-US" smtClean="0"/>
-              <a:t>16-Nov-16</a:t>
+              <a:t>18-Nov-16</a:t>
             </a:fld>
             <a:endParaRPr lang="en-US"/>
           </a:p>
@@ -9868,7 +9975,7 @@
           <a:p>
             <a:fld id="{C7B437E4-9023-4C30-BD7A-7EB9AF5FB2DE}" type="datetimeFigureOut">
               <a:rPr lang="en-US" smtClean="0"/>
-              <a:t>16-Nov-16</a:t>
+              <a:t>18-Nov-16</a:t>
             </a:fld>
             <a:endParaRPr lang="en-US"/>
           </a:p>
@@ -10120,7 +10227,7 @@
           <a:p>
             <a:fld id="{C7B437E4-9023-4C30-BD7A-7EB9AF5FB2DE}" type="datetimeFigureOut">
               <a:rPr lang="en-US" smtClean="0"/>
-              <a:t>16-Nov-16</a:t>
+              <a:t>18-Nov-16</a:t>
             </a:fld>
             <a:endParaRPr lang="en-US"/>
           </a:p>
@@ -10331,7 +10438,7 @@
           <a:p>
             <a:fld id="{C7B437E4-9023-4C30-BD7A-7EB9AF5FB2DE}" type="datetimeFigureOut">
               <a:rPr lang="en-US" smtClean="0"/>
-              <a:t>16-Nov-16</a:t>
+              <a:t>18-Nov-16</a:t>
             </a:fld>
             <a:endParaRPr lang="en-US"/>
           </a:p>
@@ -11573,6 +11680,165 @@
             <p:ph type="title"/>
           </p:nvPr>
         </p:nvSpPr>
+        <p:spPr/>
+        <p:txBody>
+          <a:bodyPr/>
+          <a:lstStyle/>
+          <a:p>
+            <a:r>
+              <a:rPr lang="nb-NO" dirty="0"/>
+              <a:t>Komme i gang: ASP.NET </a:t>
+            </a:r>
+            <a:r>
+              <a:rPr lang="nb-NO" dirty="0" err="1"/>
+              <a:t>Core</a:t>
+            </a:r>
+            <a:endParaRPr lang="en-US" dirty="0"/>
+          </a:p>
+        </p:txBody>
+      </p:sp>
+      <p:sp>
+        <p:nvSpPr>
+          <p:cNvPr id="3" name="TextBox 2"/>
+          <p:cNvSpPr txBox="1"/>
+          <p:nvPr/>
+        </p:nvSpPr>
+        <p:spPr>
+          <a:xfrm>
+            <a:off x="838200" y="2014167"/>
+            <a:ext cx="8120333" cy="1938992"/>
+          </a:xfrm>
+          <a:prstGeom prst="rect">
+            <a:avLst/>
+          </a:prstGeom>
+          <a:noFill/>
+        </p:spPr>
+        <p:txBody>
+          <a:bodyPr wrap="square" rtlCol="0">
+            <a:spAutoFit/>
+          </a:bodyPr>
+          <a:lstStyle/>
+          <a:p>
+            <a:pPr marL="285750" indent="-285750">
+              <a:buFont typeface="Arial" panose="020B0604020202020204" pitchFamily="34" charset="0"/>
+              <a:buChar char="•"/>
+            </a:pPr>
+            <a:r>
+              <a:rPr lang="nb-NO" sz="2400" dirty="0" err="1"/>
+              <a:t>Yeoman</a:t>
+            </a:r>
+            <a:r>
+              <a:rPr lang="nb-NO" sz="2400" dirty="0"/>
+              <a:t> (Generator: «</a:t>
+            </a:r>
+            <a:r>
+              <a:rPr lang="nb-NO" sz="2400" dirty="0" err="1"/>
+              <a:t>aspnet</a:t>
+            </a:r>
+            <a:r>
+              <a:rPr lang="nb-NO" sz="2400" dirty="0"/>
+              <a:t>»)</a:t>
+            </a:r>
+          </a:p>
+          <a:p>
+            <a:pPr marL="285750" indent="-285750">
+              <a:buFont typeface="Arial" panose="020B0604020202020204" pitchFamily="34" charset="0"/>
+              <a:buChar char="•"/>
+            </a:pPr>
+            <a:r>
+              <a:rPr lang="nb-NO" sz="2400" dirty="0" err="1"/>
+              <a:t>yo</a:t>
+            </a:r>
+            <a:r>
+              <a:rPr lang="nb-NO" sz="2400" dirty="0"/>
+              <a:t> </a:t>
+            </a:r>
+            <a:r>
+              <a:rPr lang="nb-NO" sz="2400" dirty="0" err="1"/>
+              <a:t>aspnet</a:t>
+            </a:r>
+            <a:r>
+              <a:rPr lang="nb-NO" sz="2400" dirty="0"/>
+              <a:t> </a:t>
+            </a:r>
+            <a:r>
+              <a:rPr lang="nb-NO" sz="2400" dirty="0" err="1"/>
+              <a:t>webapi</a:t>
+            </a:r>
+            <a:endParaRPr lang="nb-NO" sz="2400" dirty="0"/>
+          </a:p>
+          <a:p>
+            <a:pPr marL="285750" indent="-285750">
+              <a:buFont typeface="Arial" panose="020B0604020202020204" pitchFamily="34" charset="0"/>
+              <a:buChar char="•"/>
+            </a:pPr>
+            <a:r>
+              <a:rPr lang="nb-NO" sz="2400" dirty="0"/>
+              <a:t>Veldig enkel og grei</a:t>
+            </a:r>
+          </a:p>
+          <a:p>
+            <a:pPr marL="285750" indent="-285750">
+              <a:buFont typeface="Arial" panose="020B0604020202020204" pitchFamily="34" charset="0"/>
+              <a:buChar char="•"/>
+            </a:pPr>
+            <a:r>
+              <a:rPr lang="nb-NO" sz="2400" dirty="0"/>
+              <a:t>Lett å forstå</a:t>
+            </a:r>
+          </a:p>
+          <a:p>
+            <a:pPr marL="285750" indent="-285750">
+              <a:buFont typeface="Arial" panose="020B0604020202020204" pitchFamily="34" charset="0"/>
+              <a:buChar char="•"/>
+            </a:pPr>
+            <a:r>
+              <a:rPr lang="nb-NO" sz="2400" dirty="0"/>
+              <a:t>Kjempefin å jobbe ut i fra</a:t>
+            </a:r>
+          </a:p>
+        </p:txBody>
+      </p:sp>
+    </p:spTree>
+    <p:extLst>
+      <p:ext uri="{BB962C8B-B14F-4D97-AF65-F5344CB8AC3E}">
+        <p14:creationId xmlns:p14="http://schemas.microsoft.com/office/powerpoint/2010/main" val="143732061"/>
+      </p:ext>
+    </p:extLst>
+  </p:cSld>
+  <p:clrMapOvr>
+    <a:masterClrMapping/>
+  </p:clrMapOvr>
+</p:sld>
+</file>
+
+<file path=ppt/slides/slide11.xml><?xml version="1.0" encoding="utf-8"?>
+<p:sld xmlns:a="http://schemas.openxmlformats.org/drawingml/2006/main" xmlns:r="http://schemas.openxmlformats.org/officeDocument/2006/relationships" xmlns:p="http://schemas.openxmlformats.org/presentationml/2006/main">
+  <p:cSld>
+    <p:spTree>
+      <p:nvGrpSpPr>
+        <p:cNvPr id="1" name=""/>
+        <p:cNvGrpSpPr/>
+        <p:nvPr/>
+      </p:nvGrpSpPr>
+      <p:grpSpPr>
+        <a:xfrm>
+          <a:off x="0" y="0"/>
+          <a:ext cx="0" cy="0"/>
+          <a:chOff x="0" y="0"/>
+          <a:chExt cx="0" cy="0"/>
+        </a:xfrm>
+      </p:grpSpPr>
+      <p:sp>
+        <p:nvSpPr>
+          <p:cNvPr id="2" name="Title 1"/>
+          <p:cNvSpPr>
+            <a:spLocks noGrp="1"/>
+          </p:cNvSpPr>
+          <p:nvPr>
+            <p:ph type="title"/>
+          </p:nvPr>
+        </p:nvSpPr>
         <p:spPr>
           <a:xfrm>
             <a:off x="0" y="0"/>
@@ -11726,7 +11992,7 @@
 </p:sld>
 </file>
 
-<file path=ppt/slides/slide11.xml><?xml version="1.0" encoding="utf-8"?>
+<file path=ppt/slides/slide12.xml><?xml version="1.0" encoding="utf-8"?>
 <p:sld xmlns:a="http://schemas.openxmlformats.org/drawingml/2006/main" xmlns:r="http://schemas.openxmlformats.org/officeDocument/2006/relationships" xmlns:p="http://schemas.openxmlformats.org/presentationml/2006/main">
   <p:cSld>
     <p:spTree>
@@ -12426,7 +12692,7 @@
 </p:sld>
 </file>
 
-<file path=ppt/slides/slide12.xml><?xml version="1.0" encoding="utf-8"?>
+<file path=ppt/slides/slide13.xml><?xml version="1.0" encoding="utf-8"?>
 <p:sld xmlns:a="http://schemas.openxmlformats.org/drawingml/2006/main" xmlns:r="http://schemas.openxmlformats.org/officeDocument/2006/relationships" xmlns:p="http://schemas.openxmlformats.org/presentationml/2006/main">
   <p:cSld>
     <p:spTree>
@@ -12602,7 +12868,7 @@
 </p:sld>
 </file>
 
-<file path=ppt/slides/slide13.xml><?xml version="1.0" encoding="utf-8"?>
+<file path=ppt/slides/slide14.xml><?xml version="1.0" encoding="utf-8"?>
 <p:sld xmlns:a="http://schemas.openxmlformats.org/drawingml/2006/main" xmlns:r="http://schemas.openxmlformats.org/officeDocument/2006/relationships" xmlns:p="http://schemas.openxmlformats.org/presentationml/2006/main">
   <p:cSld>
     <p:spTree>
@@ -12775,7 +13041,7 @@
 </p:sld>
 </file>
 
-<file path=ppt/slides/slide14.xml><?xml version="1.0" encoding="utf-8"?>
+<file path=ppt/slides/slide15.xml><?xml version="1.0" encoding="utf-8"?>
 <p:sld xmlns:a="http://schemas.openxmlformats.org/drawingml/2006/main" xmlns:r="http://schemas.openxmlformats.org/officeDocument/2006/relationships" xmlns:p="http://schemas.openxmlformats.org/presentationml/2006/main">
   <p:cSld>
     <p:spTree>
@@ -12951,162 +13217,6 @@
 </p:sld>
 </file>
 
-<file path=ppt/slides/slide15.xml><?xml version="1.0" encoding="utf-8"?>
-<p:sld xmlns:a="http://schemas.openxmlformats.org/drawingml/2006/main" xmlns:r="http://schemas.openxmlformats.org/officeDocument/2006/relationships" xmlns:p="http://schemas.openxmlformats.org/presentationml/2006/main">
-  <p:cSld>
-    <p:spTree>
-      <p:nvGrpSpPr>
-        <p:cNvPr id="1" name=""/>
-        <p:cNvGrpSpPr/>
-        <p:nvPr/>
-      </p:nvGrpSpPr>
-      <p:grpSpPr>
-        <a:xfrm>
-          <a:off x="0" y="0"/>
-          <a:ext cx="0" cy="0"/>
-          <a:chOff x="0" y="0"/>
-          <a:chExt cx="0" cy="0"/>
-        </a:xfrm>
-      </p:grpSpPr>
-      <p:sp>
-        <p:nvSpPr>
-          <p:cNvPr id="2" name="Title 1"/>
-          <p:cNvSpPr>
-            <a:spLocks noGrp="1"/>
-          </p:cNvSpPr>
-          <p:nvPr>
-            <p:ph type="title"/>
-          </p:nvPr>
-        </p:nvSpPr>
-        <p:spPr/>
-        <p:txBody>
-          <a:bodyPr/>
-          <a:lstStyle/>
-          <a:p>
-            <a:r>
-              <a:rPr lang="nb-NO" dirty="0"/>
-              <a:t>Hva med produksjon?</a:t>
-            </a:r>
-            <a:endParaRPr lang="en-US" dirty="0"/>
-          </a:p>
-        </p:txBody>
-      </p:sp>
-      <p:sp>
-        <p:nvSpPr>
-          <p:cNvPr id="3" name="TextBox 2"/>
-          <p:cNvSpPr txBox="1"/>
-          <p:nvPr/>
-        </p:nvSpPr>
-        <p:spPr>
-          <a:xfrm>
-            <a:off x="838200" y="2014167"/>
-            <a:ext cx="8120333" cy="3046988"/>
-          </a:xfrm>
-          <a:prstGeom prst="rect">
-            <a:avLst/>
-          </a:prstGeom>
-          <a:noFill/>
-        </p:spPr>
-        <p:txBody>
-          <a:bodyPr wrap="square" rtlCol="0">
-            <a:spAutoFit/>
-          </a:bodyPr>
-          <a:lstStyle/>
-          <a:p>
-            <a:pPr marL="285750" indent="-285750">
-              <a:buFont typeface="Arial" panose="020B0604020202020204" pitchFamily="34" charset="0"/>
-              <a:buChar char="•"/>
-            </a:pPr>
-            <a:r>
-              <a:rPr lang="nb-NO" sz="2400" dirty="0"/>
-              <a:t>.NET</a:t>
-            </a:r>
-          </a:p>
-          <a:p>
-            <a:pPr marL="742950" lvl="1" indent="-285750">
-              <a:buFont typeface="Arial" panose="020B0604020202020204" pitchFamily="34" charset="0"/>
-              <a:buChar char="•"/>
-            </a:pPr>
-            <a:r>
-              <a:rPr lang="nb-NO" sz="2400" dirty="0" err="1"/>
-              <a:t>dotnet</a:t>
-            </a:r>
-            <a:r>
-              <a:rPr lang="nb-NO" sz="2400" dirty="0"/>
-              <a:t> kommando</a:t>
-            </a:r>
-          </a:p>
-          <a:p>
-            <a:pPr marL="742950" lvl="1" indent="-285750">
-              <a:buFont typeface="Arial" panose="020B0604020202020204" pitchFamily="34" charset="0"/>
-              <a:buChar char="•"/>
-            </a:pPr>
-            <a:r>
-              <a:rPr lang="nb-NO" sz="2400" dirty="0" err="1"/>
-              <a:t>Heroku</a:t>
-            </a:r>
-            <a:endParaRPr lang="nb-NO" sz="2400" dirty="0"/>
-          </a:p>
-          <a:p>
-            <a:pPr marL="285750" indent="-285750">
-              <a:buFont typeface="Arial" panose="020B0604020202020204" pitchFamily="34" charset="0"/>
-              <a:buChar char="•"/>
-            </a:pPr>
-            <a:r>
-              <a:rPr lang="nb-NO" sz="2400" dirty="0"/>
-              <a:t>Node</a:t>
-            </a:r>
-          </a:p>
-          <a:p>
-            <a:pPr marL="742950" lvl="1" indent="-285750">
-              <a:buFont typeface="Arial" panose="020B0604020202020204" pitchFamily="34" charset="0"/>
-              <a:buChar char="•"/>
-            </a:pPr>
-            <a:r>
-              <a:rPr lang="nb-NO" sz="2400" dirty="0"/>
-              <a:t>node kommando</a:t>
-            </a:r>
-          </a:p>
-          <a:p>
-            <a:pPr marL="742950" lvl="1" indent="-285750">
-              <a:buFont typeface="Arial" panose="020B0604020202020204" pitchFamily="34" charset="0"/>
-              <a:buChar char="•"/>
-            </a:pPr>
-            <a:r>
-              <a:rPr lang="nb-NO" sz="2400" dirty="0" err="1"/>
-              <a:t>Heroku</a:t>
-            </a:r>
-            <a:endParaRPr lang="nb-NO" sz="2400" dirty="0"/>
-          </a:p>
-          <a:p>
-            <a:pPr marL="742950" lvl="1" indent="-285750">
-              <a:buFont typeface="Arial" panose="020B0604020202020204" pitchFamily="34" charset="0"/>
-              <a:buChar char="•"/>
-            </a:pPr>
-            <a:endParaRPr lang="nb-NO" sz="2400" dirty="0"/>
-          </a:p>
-          <a:p>
-            <a:pPr marL="285750" indent="-285750">
-              <a:buFont typeface="Arial" panose="020B0604020202020204" pitchFamily="34" charset="0"/>
-              <a:buChar char="•"/>
-            </a:pPr>
-            <a:endParaRPr lang="en-US" sz="2400" dirty="0"/>
-          </a:p>
-        </p:txBody>
-      </p:sp>
-    </p:spTree>
-    <p:extLst>
-      <p:ext uri="{BB962C8B-B14F-4D97-AF65-F5344CB8AC3E}">
-        <p14:creationId xmlns:p14="http://schemas.microsoft.com/office/powerpoint/2010/main" val="3355440752"/>
-      </p:ext>
-    </p:extLst>
-  </p:cSld>
-  <p:clrMapOvr>
-    <a:masterClrMapping/>
-  </p:clrMapOvr>
-</p:sld>
-</file>
-
 <file path=ppt/slides/slide16.xml><?xml version="1.0" encoding="utf-8"?>
 <p:sld xmlns:a="http://schemas.openxmlformats.org/drawingml/2006/main" xmlns:r="http://schemas.openxmlformats.org/officeDocument/2006/relationships" xmlns:p="http://schemas.openxmlformats.org/presentationml/2006/main">
   <p:cSld>
@@ -13141,6 +13251,162 @@
           <a:p>
             <a:r>
               <a:rPr lang="nb-NO" dirty="0"/>
+              <a:t>Hva med produksjon?</a:t>
+            </a:r>
+            <a:endParaRPr lang="en-US" dirty="0"/>
+          </a:p>
+        </p:txBody>
+      </p:sp>
+      <p:sp>
+        <p:nvSpPr>
+          <p:cNvPr id="3" name="TextBox 2"/>
+          <p:cNvSpPr txBox="1"/>
+          <p:nvPr/>
+        </p:nvSpPr>
+        <p:spPr>
+          <a:xfrm>
+            <a:off x="838200" y="2014167"/>
+            <a:ext cx="8120333" cy="3046988"/>
+          </a:xfrm>
+          <a:prstGeom prst="rect">
+            <a:avLst/>
+          </a:prstGeom>
+          <a:noFill/>
+        </p:spPr>
+        <p:txBody>
+          <a:bodyPr wrap="square" rtlCol="0">
+            <a:spAutoFit/>
+          </a:bodyPr>
+          <a:lstStyle/>
+          <a:p>
+            <a:pPr marL="285750" indent="-285750">
+              <a:buFont typeface="Arial" panose="020B0604020202020204" pitchFamily="34" charset="0"/>
+              <a:buChar char="•"/>
+            </a:pPr>
+            <a:r>
+              <a:rPr lang="nb-NO" sz="2400" dirty="0"/>
+              <a:t>.NET</a:t>
+            </a:r>
+          </a:p>
+          <a:p>
+            <a:pPr marL="742950" lvl="1" indent="-285750">
+              <a:buFont typeface="Arial" panose="020B0604020202020204" pitchFamily="34" charset="0"/>
+              <a:buChar char="•"/>
+            </a:pPr>
+            <a:r>
+              <a:rPr lang="nb-NO" sz="2400" dirty="0" err="1"/>
+              <a:t>dotnet</a:t>
+            </a:r>
+            <a:r>
+              <a:rPr lang="nb-NO" sz="2400" dirty="0"/>
+              <a:t> kommando</a:t>
+            </a:r>
+          </a:p>
+          <a:p>
+            <a:pPr marL="742950" lvl="1" indent="-285750">
+              <a:buFont typeface="Arial" panose="020B0604020202020204" pitchFamily="34" charset="0"/>
+              <a:buChar char="•"/>
+            </a:pPr>
+            <a:r>
+              <a:rPr lang="nb-NO" sz="2400" dirty="0" err="1"/>
+              <a:t>Heroku</a:t>
+            </a:r>
+            <a:endParaRPr lang="nb-NO" sz="2400" dirty="0"/>
+          </a:p>
+          <a:p>
+            <a:pPr marL="285750" indent="-285750">
+              <a:buFont typeface="Arial" panose="020B0604020202020204" pitchFamily="34" charset="0"/>
+              <a:buChar char="•"/>
+            </a:pPr>
+            <a:r>
+              <a:rPr lang="nb-NO" sz="2400" dirty="0"/>
+              <a:t>Node</a:t>
+            </a:r>
+          </a:p>
+          <a:p>
+            <a:pPr marL="742950" lvl="1" indent="-285750">
+              <a:buFont typeface="Arial" panose="020B0604020202020204" pitchFamily="34" charset="0"/>
+              <a:buChar char="•"/>
+            </a:pPr>
+            <a:r>
+              <a:rPr lang="nb-NO" sz="2400" dirty="0"/>
+              <a:t>node kommando</a:t>
+            </a:r>
+          </a:p>
+          <a:p>
+            <a:pPr marL="742950" lvl="1" indent="-285750">
+              <a:buFont typeface="Arial" panose="020B0604020202020204" pitchFamily="34" charset="0"/>
+              <a:buChar char="•"/>
+            </a:pPr>
+            <a:r>
+              <a:rPr lang="nb-NO" sz="2400" dirty="0" err="1"/>
+              <a:t>Heroku</a:t>
+            </a:r>
+            <a:endParaRPr lang="nb-NO" sz="2400" dirty="0"/>
+          </a:p>
+          <a:p>
+            <a:pPr marL="742950" lvl="1" indent="-285750">
+              <a:buFont typeface="Arial" panose="020B0604020202020204" pitchFamily="34" charset="0"/>
+              <a:buChar char="•"/>
+            </a:pPr>
+            <a:endParaRPr lang="nb-NO" sz="2400" dirty="0"/>
+          </a:p>
+          <a:p>
+            <a:pPr marL="285750" indent="-285750">
+              <a:buFont typeface="Arial" panose="020B0604020202020204" pitchFamily="34" charset="0"/>
+              <a:buChar char="•"/>
+            </a:pPr>
+            <a:endParaRPr lang="en-US" sz="2400" dirty="0"/>
+          </a:p>
+        </p:txBody>
+      </p:sp>
+    </p:spTree>
+    <p:extLst>
+      <p:ext uri="{BB962C8B-B14F-4D97-AF65-F5344CB8AC3E}">
+        <p14:creationId xmlns:p14="http://schemas.microsoft.com/office/powerpoint/2010/main" val="3355440752"/>
+      </p:ext>
+    </p:extLst>
+  </p:cSld>
+  <p:clrMapOvr>
+    <a:masterClrMapping/>
+  </p:clrMapOvr>
+</p:sld>
+</file>
+
+<file path=ppt/slides/slide17.xml><?xml version="1.0" encoding="utf-8"?>
+<p:sld xmlns:a="http://schemas.openxmlformats.org/drawingml/2006/main" xmlns:r="http://schemas.openxmlformats.org/officeDocument/2006/relationships" xmlns:p="http://schemas.openxmlformats.org/presentationml/2006/main">
+  <p:cSld>
+    <p:spTree>
+      <p:nvGrpSpPr>
+        <p:cNvPr id="1" name=""/>
+        <p:cNvGrpSpPr/>
+        <p:nvPr/>
+      </p:nvGrpSpPr>
+      <p:grpSpPr>
+        <a:xfrm>
+          <a:off x="0" y="0"/>
+          <a:ext cx="0" cy="0"/>
+          <a:chOff x="0" y="0"/>
+          <a:chExt cx="0" cy="0"/>
+        </a:xfrm>
+      </p:grpSpPr>
+      <p:sp>
+        <p:nvSpPr>
+          <p:cNvPr id="2" name="Title 1"/>
+          <p:cNvSpPr>
+            <a:spLocks noGrp="1"/>
+          </p:cNvSpPr>
+          <p:nvPr>
+            <p:ph type="title"/>
+          </p:nvPr>
+        </p:nvSpPr>
+        <p:spPr/>
+        <p:txBody>
+          <a:bodyPr/>
+          <a:lstStyle/>
+          <a:p>
+            <a:r>
+              <a:rPr lang="nb-NO" dirty="0"/>
               <a:t>Validering</a:t>
             </a:r>
             <a:endParaRPr lang="en-US" dirty="0"/>
@@ -13270,7 +13536,183 @@
 </p:sld>
 </file>
 
-<file path=ppt/slides/slide17.xml><?xml version="1.0" encoding="utf-8"?>
+<file path=ppt/slides/slide18.xml><?xml version="1.0" encoding="utf-8"?>
+<p:sld xmlns:a="http://schemas.openxmlformats.org/drawingml/2006/main" xmlns:r="http://schemas.openxmlformats.org/officeDocument/2006/relationships" xmlns:p="http://schemas.openxmlformats.org/presentationml/2006/main">
+  <p:cSld>
+    <p:spTree>
+      <p:nvGrpSpPr>
+        <p:cNvPr id="1" name=""/>
+        <p:cNvGrpSpPr/>
+        <p:nvPr/>
+      </p:nvGrpSpPr>
+      <p:grpSpPr>
+        <a:xfrm>
+          <a:off x="0" y="0"/>
+          <a:ext cx="0" cy="0"/>
+          <a:chOff x="0" y="0"/>
+          <a:chExt cx="0" cy="0"/>
+        </a:xfrm>
+      </p:grpSpPr>
+      <p:sp>
+        <p:nvSpPr>
+          <p:cNvPr id="2" name="Title 1"/>
+          <p:cNvSpPr>
+            <a:spLocks noGrp="1"/>
+          </p:cNvSpPr>
+          <p:nvPr>
+            <p:ph type="title"/>
+          </p:nvPr>
+        </p:nvSpPr>
+        <p:spPr>
+          <a:xfrm>
+            <a:off x="0" y="0"/>
+            <a:ext cx="12192000" cy="6858000"/>
+          </a:xfrm>
+        </p:spPr>
+        <p:txBody>
+          <a:bodyPr/>
+          <a:lstStyle/>
+          <a:p>
+            <a:pPr algn="ctr"/>
+            <a:r>
+              <a:rPr lang="nb-NO" dirty="0"/>
+              <a:t>DEMO: Validering</a:t>
+            </a:r>
+            <a:endParaRPr lang="en-US" dirty="0"/>
+          </a:p>
+        </p:txBody>
+      </p:sp>
+      <mc:AlternateContent xmlns:mc="http://schemas.openxmlformats.org/markup-compatibility/2006" xmlns:p14="http://schemas.microsoft.com/office/powerpoint/2010/main">
+        <mc:Choice Requires="p14">
+          <p:contentPart p14:bwMode="auto" r:id="rId2">
+            <p14:nvContentPartPr>
+              <p14:cNvPr id="3" name="Ink 2"/>
+              <p14:cNvContentPartPr/>
+              <p14:nvPr/>
+            </p14:nvContentPartPr>
+            <p14:xfrm>
+              <a:off x="5082234" y="4567055"/>
+              <a:ext cx="2891160" cy="1442160"/>
+            </p14:xfrm>
+          </p:contentPart>
+        </mc:Choice>
+        <mc:Fallback xmlns="">
+          <p:pic>
+            <p:nvPicPr>
+              <p:cNvPr id="3" name="Ink 2"/>
+              <p:cNvPicPr/>
+              <p:nvPr/>
+            </p:nvPicPr>
+            <p:blipFill>
+              <a:blip r:embed="rId3"/>
+              <a:stretch>
+                <a:fillRect/>
+              </a:stretch>
+            </p:blipFill>
+            <p:spPr>
+              <a:xfrm>
+                <a:off x="5073955" y="4555175"/>
+                <a:ext cx="2907718" cy="1462680"/>
+              </a:xfrm>
+              <a:prstGeom prst="rect">
+                <a:avLst/>
+              </a:prstGeom>
+            </p:spPr>
+          </p:pic>
+        </mc:Fallback>
+      </mc:AlternateContent>
+      <mc:AlternateContent xmlns:mc="http://schemas.openxmlformats.org/markup-compatibility/2006" xmlns:p14="http://schemas.microsoft.com/office/powerpoint/2010/main">
+        <mc:Choice Requires="p14">
+          <p:contentPart p14:bwMode="auto" r:id="rId4">
+            <p14:nvContentPartPr>
+              <p14:cNvPr id="4" name="Ink 3"/>
+              <p14:cNvContentPartPr/>
+              <p14:nvPr/>
+            </p14:nvContentPartPr>
+            <p14:xfrm>
+              <a:off x="5518194" y="5477135"/>
+              <a:ext cx="57600" cy="117360"/>
+            </p14:xfrm>
+          </p:contentPart>
+        </mc:Choice>
+        <mc:Fallback xmlns="">
+          <p:pic>
+            <p:nvPicPr>
+              <p:cNvPr id="4" name="Ink 3"/>
+              <p:cNvPicPr/>
+              <p:nvPr/>
+            </p:nvPicPr>
+            <p:blipFill>
+              <a:blip r:embed="rId5"/>
+              <a:stretch>
+                <a:fillRect/>
+              </a:stretch>
+            </p:blipFill>
+            <p:spPr>
+              <a:xfrm>
+                <a:off x="5508892" y="5464175"/>
+                <a:ext cx="80497" cy="141480"/>
+              </a:xfrm>
+              <a:prstGeom prst="rect">
+                <a:avLst/>
+              </a:prstGeom>
+            </p:spPr>
+          </p:pic>
+        </mc:Fallback>
+      </mc:AlternateContent>
+      <mc:AlternateContent xmlns:mc="http://schemas.openxmlformats.org/markup-compatibility/2006" xmlns:p14="http://schemas.microsoft.com/office/powerpoint/2010/main">
+        <mc:Choice Requires="p14">
+          <p:contentPart p14:bwMode="auto" r:id="rId6">
+            <p14:nvContentPartPr>
+              <p14:cNvPr id="5" name="Ink 4"/>
+              <p14:cNvContentPartPr/>
+              <p14:nvPr/>
+            </p14:nvContentPartPr>
+            <p14:xfrm>
+              <a:off x="4694154" y="6020015"/>
+              <a:ext cx="917280" cy="308520"/>
+            </p14:xfrm>
+          </p:contentPart>
+        </mc:Choice>
+        <mc:Fallback xmlns="">
+          <p:pic>
+            <p:nvPicPr>
+              <p:cNvPr id="5" name="Ink 4"/>
+              <p:cNvPicPr/>
+              <p:nvPr/>
+            </p:nvPicPr>
+            <p:blipFill>
+              <a:blip r:embed="rId7"/>
+              <a:stretch>
+                <a:fillRect/>
+              </a:stretch>
+            </p:blipFill>
+            <p:spPr>
+              <a:xfrm>
+                <a:off x="4683718" y="6005615"/>
+                <a:ext cx="945349" cy="338040"/>
+              </a:xfrm>
+              <a:prstGeom prst="rect">
+                <a:avLst/>
+              </a:prstGeom>
+            </p:spPr>
+          </p:pic>
+        </mc:Fallback>
+      </mc:AlternateContent>
+    </p:spTree>
+    <p:extLst>
+      <p:ext uri="{BB962C8B-B14F-4D97-AF65-F5344CB8AC3E}">
+        <p14:creationId xmlns:p14="http://schemas.microsoft.com/office/powerpoint/2010/main" val="555357773"/>
+      </p:ext>
+    </p:extLst>
+  </p:cSld>
+  <p:clrMapOvr>
+    <a:masterClrMapping/>
+  </p:clrMapOvr>
+</p:sld>
+</file>
+
+<file path=ppt/slides/slide19.xml><?xml version="1.0" encoding="utf-8"?>
 <p:sld xmlns:a="http://schemas.openxmlformats.org/drawingml/2006/main" xmlns:r="http://schemas.openxmlformats.org/officeDocument/2006/relationships" xmlns:p="http://schemas.openxmlformats.org/presentationml/2006/main">
   <p:cSld>
     <p:spTree>
@@ -13367,7 +13809,7 @@
         <p:spPr>
           <a:xfrm>
             <a:off x="838200" y="2014167"/>
-            <a:ext cx="8120333" cy="1938992"/>
+            <a:ext cx="8120333" cy="2677656"/>
           </a:xfrm>
           <a:prstGeom prst="rect">
             <a:avLst/>
@@ -13410,6 +13852,26 @@
             </a:r>
           </a:p>
           <a:p>
+            <a:pPr marL="285750" indent="-285750">
+              <a:buFont typeface="Arial" panose="020B0604020202020204" pitchFamily="34" charset="0"/>
+              <a:buChar char="•"/>
+            </a:pPr>
+            <a:r>
+              <a:rPr lang="nb-NO" sz="2400" dirty="0"/>
+              <a:t>Ikke like modent som Node for dette bruket</a:t>
+            </a:r>
+          </a:p>
+          <a:p>
+            <a:pPr marL="742950" lvl="1" indent="-285750">
+              <a:buFont typeface="Arial" panose="020B0604020202020204" pitchFamily="34" charset="0"/>
+              <a:buChar char="•"/>
+            </a:pPr>
+            <a:r>
+              <a:rPr lang="nb-NO" sz="2400" dirty="0"/>
+              <a:t>Men i noen tilfeller likevel bedre</a:t>
+            </a:r>
+          </a:p>
+          <a:p>
             <a:pPr marL="742950" lvl="1" indent="-285750">
               <a:buFont typeface="Arial" panose="020B0604020202020204" pitchFamily="34" charset="0"/>
               <a:buChar char="•"/>
@@ -13429,167 +13891,6 @@
     <p:extLst>
       <p:ext uri="{BB962C8B-B14F-4D97-AF65-F5344CB8AC3E}">
         <p14:creationId xmlns:p14="http://schemas.microsoft.com/office/powerpoint/2010/main" val="563831913"/>
-      </p:ext>
-    </p:extLst>
-  </p:cSld>
-  <p:clrMapOvr>
-    <a:masterClrMapping/>
-  </p:clrMapOvr>
-</p:sld>
-</file>
-
-<file path=ppt/slides/slide18.xml><?xml version="1.0" encoding="utf-8"?>
-<p:sld xmlns:a="http://schemas.openxmlformats.org/drawingml/2006/main" xmlns:r="http://schemas.openxmlformats.org/officeDocument/2006/relationships" xmlns:p="http://schemas.openxmlformats.org/presentationml/2006/main">
-  <p:cSld>
-    <p:spTree>
-      <p:nvGrpSpPr>
-        <p:cNvPr id="1" name=""/>
-        <p:cNvGrpSpPr/>
-        <p:nvPr/>
-      </p:nvGrpSpPr>
-      <p:grpSpPr>
-        <a:xfrm>
-          <a:off x="0" y="0"/>
-          <a:ext cx="0" cy="0"/>
-          <a:chOff x="0" y="0"/>
-          <a:chExt cx="0" cy="0"/>
-        </a:xfrm>
-      </p:grpSpPr>
-      <p:sp>
-        <p:nvSpPr>
-          <p:cNvPr id="2" name="Title 1"/>
-          <p:cNvSpPr>
-            <a:spLocks noGrp="1"/>
-          </p:cNvSpPr>
-          <p:nvPr>
-            <p:ph type="title"/>
-          </p:nvPr>
-        </p:nvSpPr>
-        <p:spPr/>
-        <p:txBody>
-          <a:bodyPr/>
-          <a:lstStyle/>
-          <a:p>
-            <a:r>
-              <a:rPr lang="nb-NO" dirty="0"/>
-              <a:t>Takk for meg</a:t>
-            </a:r>
-            <a:endParaRPr lang="en-US" dirty="0"/>
-          </a:p>
-        </p:txBody>
-      </p:sp>
-      <p:sp>
-        <p:nvSpPr>
-          <p:cNvPr id="126" name="TextBox 125"/>
-          <p:cNvSpPr txBox="1"/>
-          <p:nvPr/>
-        </p:nvSpPr>
-        <p:spPr>
-          <a:xfrm>
-            <a:off x="322053" y="6022826"/>
-            <a:ext cx="3180271" cy="461665"/>
-          </a:xfrm>
-          <a:prstGeom prst="rect">
-            <a:avLst/>
-          </a:prstGeom>
-          <a:noFill/>
-        </p:spPr>
-        <p:txBody>
-          <a:bodyPr wrap="square" rtlCol="0">
-            <a:spAutoFit/>
-          </a:bodyPr>
-          <a:lstStyle/>
-          <a:p>
-            <a:r>
-              <a:rPr lang="nb-NO" sz="2400" dirty="0">
-                <a:hlinkClick r:id="rId2"/>
-              </a:rPr>
-              <a:t>@</a:t>
-            </a:r>
-            <a:r>
-              <a:rPr lang="nb-NO" sz="2400" dirty="0" err="1">
-                <a:hlinkClick r:id="rId2"/>
-              </a:rPr>
-              <a:t>gjermundbjaanes</a:t>
-            </a:r>
-            <a:endParaRPr lang="en-US" sz="2400" dirty="0"/>
-          </a:p>
-        </p:txBody>
-      </p:sp>
-      <p:sp>
-        <p:nvSpPr>
-          <p:cNvPr id="127" name="TextBox 126"/>
-          <p:cNvSpPr txBox="1"/>
-          <p:nvPr/>
-        </p:nvSpPr>
-        <p:spPr>
-          <a:xfrm>
-            <a:off x="3917005" y="6022825"/>
-            <a:ext cx="3694794" cy="461665"/>
-          </a:xfrm>
-          <a:prstGeom prst="rect">
-            <a:avLst/>
-          </a:prstGeom>
-          <a:noFill/>
-        </p:spPr>
-        <p:txBody>
-          <a:bodyPr wrap="none" rtlCol="0">
-            <a:spAutoFit/>
-          </a:bodyPr>
-          <a:lstStyle/>
-          <a:p>
-            <a:r>
-              <a:rPr lang="nb-NO" sz="2400" dirty="0">
-                <a:hlinkClick r:id="rId3"/>
-              </a:rPr>
-              <a:t>www.gjermundbjaanes.com</a:t>
-            </a:r>
-            <a:endParaRPr lang="en-US" sz="2400" dirty="0"/>
-          </a:p>
-        </p:txBody>
-      </p:sp>
-      <p:sp>
-        <p:nvSpPr>
-          <p:cNvPr id="128" name="TextBox 127"/>
-          <p:cNvSpPr txBox="1"/>
-          <p:nvPr/>
-        </p:nvSpPr>
-        <p:spPr>
-          <a:xfrm>
-            <a:off x="8669411" y="6022827"/>
-            <a:ext cx="2684389" cy="461665"/>
-          </a:xfrm>
-          <a:prstGeom prst="rect">
-            <a:avLst/>
-          </a:prstGeom>
-          <a:noFill/>
-        </p:spPr>
-        <p:txBody>
-          <a:bodyPr wrap="none" rtlCol="0">
-            <a:spAutoFit/>
-          </a:bodyPr>
-          <a:lstStyle/>
-          <a:p>
-            <a:r>
-              <a:rPr lang="nb-NO" sz="2400" dirty="0">
-                <a:hlinkClick r:id="rId4"/>
-              </a:rPr>
-              <a:t>github.com/</a:t>
-            </a:r>
-            <a:r>
-              <a:rPr lang="nb-NO" sz="2400" dirty="0" err="1">
-                <a:hlinkClick r:id="rId4"/>
-              </a:rPr>
-              <a:t>bjaanes</a:t>
-            </a:r>
-            <a:endParaRPr lang="en-US" sz="2400" dirty="0"/>
-          </a:p>
-        </p:txBody>
-      </p:sp>
-    </p:spTree>
-    <p:extLst>
-      <p:ext uri="{BB962C8B-B14F-4D97-AF65-F5344CB8AC3E}">
-        <p14:creationId xmlns:p14="http://schemas.microsoft.com/office/powerpoint/2010/main" val="4272557608"/>
       </p:ext>
     </p:extLst>
   </p:cSld>
@@ -13959,6 +14260,167 @@
     <p:extLst>
       <p:ext uri="{BB962C8B-B14F-4D97-AF65-F5344CB8AC3E}">
         <p14:creationId xmlns:p14="http://schemas.microsoft.com/office/powerpoint/2010/main" val="532315870"/>
+      </p:ext>
+    </p:extLst>
+  </p:cSld>
+  <p:clrMapOvr>
+    <a:masterClrMapping/>
+  </p:clrMapOvr>
+</p:sld>
+</file>
+
+<file path=ppt/slides/slide20.xml><?xml version="1.0" encoding="utf-8"?>
+<p:sld xmlns:a="http://schemas.openxmlformats.org/drawingml/2006/main" xmlns:r="http://schemas.openxmlformats.org/officeDocument/2006/relationships" xmlns:p="http://schemas.openxmlformats.org/presentationml/2006/main">
+  <p:cSld>
+    <p:spTree>
+      <p:nvGrpSpPr>
+        <p:cNvPr id="1" name=""/>
+        <p:cNvGrpSpPr/>
+        <p:nvPr/>
+      </p:nvGrpSpPr>
+      <p:grpSpPr>
+        <a:xfrm>
+          <a:off x="0" y="0"/>
+          <a:ext cx="0" cy="0"/>
+          <a:chOff x="0" y="0"/>
+          <a:chExt cx="0" cy="0"/>
+        </a:xfrm>
+      </p:grpSpPr>
+      <p:sp>
+        <p:nvSpPr>
+          <p:cNvPr id="2" name="Title 1"/>
+          <p:cNvSpPr>
+            <a:spLocks noGrp="1"/>
+          </p:cNvSpPr>
+          <p:nvPr>
+            <p:ph type="title"/>
+          </p:nvPr>
+        </p:nvSpPr>
+        <p:spPr/>
+        <p:txBody>
+          <a:bodyPr/>
+          <a:lstStyle/>
+          <a:p>
+            <a:r>
+              <a:rPr lang="nb-NO" dirty="0"/>
+              <a:t>Takk for meg</a:t>
+            </a:r>
+            <a:endParaRPr lang="en-US" dirty="0"/>
+          </a:p>
+        </p:txBody>
+      </p:sp>
+      <p:sp>
+        <p:nvSpPr>
+          <p:cNvPr id="126" name="TextBox 125"/>
+          <p:cNvSpPr txBox="1"/>
+          <p:nvPr/>
+        </p:nvSpPr>
+        <p:spPr>
+          <a:xfrm>
+            <a:off x="322053" y="6022826"/>
+            <a:ext cx="3180271" cy="461665"/>
+          </a:xfrm>
+          <a:prstGeom prst="rect">
+            <a:avLst/>
+          </a:prstGeom>
+          <a:noFill/>
+        </p:spPr>
+        <p:txBody>
+          <a:bodyPr wrap="square" rtlCol="0">
+            <a:spAutoFit/>
+          </a:bodyPr>
+          <a:lstStyle/>
+          <a:p>
+            <a:r>
+              <a:rPr lang="nb-NO" sz="2400" dirty="0">
+                <a:hlinkClick r:id="rId2"/>
+              </a:rPr>
+              <a:t>@</a:t>
+            </a:r>
+            <a:r>
+              <a:rPr lang="nb-NO" sz="2400" dirty="0" err="1">
+                <a:hlinkClick r:id="rId2"/>
+              </a:rPr>
+              <a:t>gjermundbjaanes</a:t>
+            </a:r>
+            <a:endParaRPr lang="en-US" sz="2400" dirty="0"/>
+          </a:p>
+        </p:txBody>
+      </p:sp>
+      <p:sp>
+        <p:nvSpPr>
+          <p:cNvPr id="127" name="TextBox 126"/>
+          <p:cNvSpPr txBox="1"/>
+          <p:nvPr/>
+        </p:nvSpPr>
+        <p:spPr>
+          <a:xfrm>
+            <a:off x="3917005" y="6022825"/>
+            <a:ext cx="3694794" cy="461665"/>
+          </a:xfrm>
+          <a:prstGeom prst="rect">
+            <a:avLst/>
+          </a:prstGeom>
+          <a:noFill/>
+        </p:spPr>
+        <p:txBody>
+          <a:bodyPr wrap="none" rtlCol="0">
+            <a:spAutoFit/>
+          </a:bodyPr>
+          <a:lstStyle/>
+          <a:p>
+            <a:r>
+              <a:rPr lang="nb-NO" sz="2400" dirty="0">
+                <a:hlinkClick r:id="rId3"/>
+              </a:rPr>
+              <a:t>www.gjermundbjaanes.com</a:t>
+            </a:r>
+            <a:endParaRPr lang="en-US" sz="2400" dirty="0"/>
+          </a:p>
+        </p:txBody>
+      </p:sp>
+      <p:sp>
+        <p:nvSpPr>
+          <p:cNvPr id="128" name="TextBox 127"/>
+          <p:cNvSpPr txBox="1"/>
+          <p:nvPr/>
+        </p:nvSpPr>
+        <p:spPr>
+          <a:xfrm>
+            <a:off x="8669411" y="6022827"/>
+            <a:ext cx="2684389" cy="461665"/>
+          </a:xfrm>
+          <a:prstGeom prst="rect">
+            <a:avLst/>
+          </a:prstGeom>
+          <a:noFill/>
+        </p:spPr>
+        <p:txBody>
+          <a:bodyPr wrap="none" rtlCol="0">
+            <a:spAutoFit/>
+          </a:bodyPr>
+          <a:lstStyle/>
+          <a:p>
+            <a:r>
+              <a:rPr lang="nb-NO" sz="2400" dirty="0">
+                <a:hlinkClick r:id="rId4"/>
+              </a:rPr>
+              <a:t>github.com/</a:t>
+            </a:r>
+            <a:r>
+              <a:rPr lang="nb-NO" sz="2400" dirty="0" err="1">
+                <a:hlinkClick r:id="rId4"/>
+              </a:rPr>
+              <a:t>bjaanes</a:t>
+            </a:r>
+            <a:endParaRPr lang="en-US" sz="2400" dirty="0"/>
+          </a:p>
+        </p:txBody>
+      </p:sp>
+    </p:spTree>
+    <p:extLst>
+      <p:ext uri="{BB962C8B-B14F-4D97-AF65-F5344CB8AC3E}">
+        <p14:creationId xmlns:p14="http://schemas.microsoft.com/office/powerpoint/2010/main" val="4272557608"/>
       </p:ext>
     </p:extLst>
   </p:cSld>
@@ -15871,6 +16333,66 @@
           <a:chExt cx="0" cy="0"/>
         </a:xfrm>
       </p:grpSpPr>
+      <p:pic>
+        <p:nvPicPr>
+          <p:cNvPr id="4" name="Picture 3"/>
+          <p:cNvPicPr>
+            <a:picLocks noChangeAspect="1"/>
+          </p:cNvPicPr>
+          <p:nvPr/>
+        </p:nvPicPr>
+        <p:blipFill>
+          <a:blip r:embed="rId2">
+            <a:extLst>
+              <a:ext uri="{28A0092B-C50C-407E-A947-70E740481C1C}">
+                <a14:useLocalDpi xmlns:a14="http://schemas.microsoft.com/office/drawing/2010/main" val="0"/>
+              </a:ext>
+            </a:extLst>
+          </a:blip>
+          <a:stretch>
+            <a:fillRect/>
+          </a:stretch>
+        </p:blipFill>
+        <p:spPr>
+          <a:xfrm>
+            <a:off x="3344779" y="401053"/>
+            <a:ext cx="5502442" cy="5502442"/>
+          </a:xfrm>
+          <a:prstGeom prst="rect">
+            <a:avLst/>
+          </a:prstGeom>
+        </p:spPr>
+      </p:pic>
+    </p:spTree>
+    <p:extLst>
+      <p:ext uri="{BB962C8B-B14F-4D97-AF65-F5344CB8AC3E}">
+        <p14:creationId xmlns:p14="http://schemas.microsoft.com/office/powerpoint/2010/main" val="2992964695"/>
+      </p:ext>
+    </p:extLst>
+  </p:cSld>
+  <p:clrMapOvr>
+    <a:masterClrMapping/>
+  </p:clrMapOvr>
+</p:sld>
+</file>
+
+<file path=ppt/slides/slide5.xml><?xml version="1.0" encoding="utf-8"?>
+<p:sld xmlns:a="http://schemas.openxmlformats.org/drawingml/2006/main" xmlns:r="http://schemas.openxmlformats.org/officeDocument/2006/relationships" xmlns:p="http://schemas.openxmlformats.org/presentationml/2006/main">
+  <p:cSld>
+    <p:spTree>
+      <p:nvGrpSpPr>
+        <p:cNvPr id="1" name=""/>
+        <p:cNvGrpSpPr/>
+        <p:nvPr/>
+      </p:nvGrpSpPr>
+      <p:grpSpPr>
+        <a:xfrm>
+          <a:off x="0" y="0"/>
+          <a:ext cx="0" cy="0"/>
+          <a:chOff x="0" y="0"/>
+          <a:chExt cx="0" cy="0"/>
+        </a:xfrm>
+      </p:grpSpPr>
       <p:sp>
         <p:nvSpPr>
           <p:cNvPr id="2" name="Title 1"/>
@@ -15888,7 +16410,15 @@
           <a:p>
             <a:r>
               <a:rPr lang="nb-NO" dirty="0"/>
-              <a:t>Hva er egentlig REST </a:t>
+              <a:t>Hva er egentlig </a:t>
+            </a:r>
+            <a:r>
+              <a:rPr lang="nb-NO" dirty="0" err="1"/>
+              <a:t>RESTful</a:t>
+            </a:r>
+            <a:r>
+              <a:rPr lang="nb-NO" dirty="0"/>
+              <a:t> </a:t>
             </a:r>
             <a:r>
               <a:rPr lang="nb-NO" dirty="0" err="1"/>
@@ -15910,8 +16440,8 @@
         </p:nvSpPr>
         <p:spPr>
           <a:xfrm>
-            <a:off x="838200" y="2014167"/>
-            <a:ext cx="8120333" cy="1754326"/>
+            <a:off x="518303" y="1477890"/>
+            <a:ext cx="8120333" cy="2308324"/>
           </a:xfrm>
           <a:prstGeom prst="rect">
             <a:avLst/>
@@ -15929,8 +16459,12 @@
               <a:buChar char="•"/>
             </a:pPr>
             <a:r>
+              <a:rPr lang="nb-NO" dirty="0" err="1"/>
+              <a:t>Representational</a:t>
+            </a:r>
+            <a:r>
               <a:rPr lang="nb-NO" dirty="0"/>
-              <a:t>En del «regler»</a:t>
+              <a:t> State Transfer Application Programming Interface</a:t>
             </a:r>
           </a:p>
           <a:p>
@@ -15942,6 +16476,27 @@
               <a:rPr lang="nb-NO" dirty="0"/>
               <a:t>HTTP</a:t>
             </a:r>
+          </a:p>
+          <a:p>
+            <a:pPr marL="285750" indent="-285750">
+              <a:buFont typeface="Arial" panose="020B0604020202020204" pitchFamily="34" charset="0"/>
+              <a:buChar char="•"/>
+            </a:pPr>
+            <a:r>
+              <a:rPr lang="nb-NO" dirty="0"/>
+              <a:t>Klient-Server</a:t>
+            </a:r>
+          </a:p>
+          <a:p>
+            <a:pPr marL="285750" indent="-285750">
+              <a:buFont typeface="Arial" panose="020B0604020202020204" pitchFamily="34" charset="0"/>
+              <a:buChar char="•"/>
+            </a:pPr>
+            <a:r>
+              <a:rPr lang="nb-NO" dirty="0" err="1"/>
+              <a:t>Stateless</a:t>
+            </a:r>
+            <a:endParaRPr lang="nb-NO" dirty="0"/>
           </a:p>
           <a:p>
             <a:pPr marL="285750" indent="-285750">
@@ -16013,8 +16568,8 @@
               <p14:nvPr/>
             </p14:nvContentPartPr>
             <p14:xfrm>
-              <a:off x="2478016" y="3883630"/>
-              <a:ext cx="3787920" cy="937080"/>
+              <a:off x="2478016" y="3930316"/>
+              <a:ext cx="2382742" cy="890394"/>
             </p14:xfrm>
           </p:contentPart>
         </mc:Choice>
@@ -16033,8 +16588,8 @@
             </p:blipFill>
             <p:spPr>
               <a:xfrm>
-                <a:off x="2469376" y="3868156"/>
-                <a:ext cx="3811320" cy="962270"/>
+                <a:off x="2469376" y="3914840"/>
+                <a:ext cx="2406141" cy="915587"/>
               </a:xfrm>
               <a:prstGeom prst="rect">
                 <a:avLst/>
@@ -16052,8 +16607,8 @@
               <p14:nvPr/>
             </p14:nvContentPartPr>
             <p14:xfrm>
-              <a:off x="2493136" y="5491750"/>
-              <a:ext cx="3747960" cy="84960"/>
+              <a:off x="2493136" y="5495982"/>
+              <a:ext cx="2357606" cy="80727"/>
             </p14:xfrm>
           </p:contentPart>
         </mc:Choice>
@@ -16072,8 +16627,8 @@
             </p:blipFill>
             <p:spPr>
               <a:xfrm>
-                <a:off x="2483057" y="5475260"/>
-                <a:ext cx="3768118" cy="115072"/>
+                <a:off x="2483058" y="5479478"/>
+                <a:ext cx="2377763" cy="110865"/>
               </a:xfrm>
               <a:prstGeom prst="rect">
                 <a:avLst/>
@@ -16091,8 +16646,8 @@
               <p14:nvPr/>
             </p14:nvContentPartPr>
             <p14:xfrm>
-              <a:off x="2499256" y="5583550"/>
-              <a:ext cx="3807360" cy="1221120"/>
+              <a:off x="2499256" y="5644386"/>
+              <a:ext cx="2394970" cy="1160283"/>
             </p14:xfrm>
           </p:contentPart>
         </mc:Choice>
@@ -16111,8 +16666,8 @@
             </p:blipFill>
             <p:spPr>
               <a:xfrm>
-                <a:off x="2482338" y="5572030"/>
-                <a:ext cx="3844436" cy="1249920"/>
+                <a:off x="2482339" y="5632866"/>
+                <a:ext cx="2432043" cy="1189083"/>
               </a:xfrm>
               <a:prstGeom prst="rect">
                 <a:avLst/>
@@ -16130,8 +16685,8 @@
               <p14:nvPr/>
             </p14:nvContentPartPr>
             <p14:xfrm>
-              <a:off x="4829896" y="4712710"/>
-              <a:ext cx="1260360" cy="708120"/>
+              <a:off x="3868999" y="4782517"/>
+              <a:ext cx="792813" cy="672841"/>
             </p14:xfrm>
           </p:contentPart>
         </mc:Choice>
@@ -16150,8 +16705,8 @@
             </p:blipFill>
             <p:spPr>
               <a:xfrm>
-                <a:off x="4817300" y="4704430"/>
-                <a:ext cx="1280874" cy="733320"/>
+                <a:off x="3856403" y="4774237"/>
+                <a:ext cx="813326" cy="698041"/>
               </a:xfrm>
               <a:prstGeom prst="rect">
                 <a:avLst/>
@@ -16169,8 +16724,8 @@
               <p14:nvPr/>
             </p14:nvContentPartPr>
             <p14:xfrm>
-              <a:off x="2544256" y="4026550"/>
-              <a:ext cx="3721680" cy="2635200"/>
+              <a:off x="2544256" y="4157838"/>
+              <a:ext cx="2341075" cy="2503912"/>
             </p14:xfrm>
           </p:contentPart>
         </mc:Choice>
@@ -16189,8 +16744,8 @@
             </p:blipFill>
             <p:spPr>
               <a:xfrm>
-                <a:off x="2538136" y="4007110"/>
-                <a:ext cx="3744000" cy="2674800"/>
+                <a:off x="2536336" y="4138397"/>
+                <a:ext cx="2365555" cy="2543514"/>
               </a:xfrm>
               <a:prstGeom prst="rect">
                 <a:avLst/>
@@ -16208,8 +16763,8 @@
               <p14:nvPr/>
             </p14:nvContentPartPr>
             <p14:xfrm>
-              <a:off x="1685296" y="4853830"/>
-              <a:ext cx="1064880" cy="655560"/>
+              <a:off x="1685296" y="4886490"/>
+              <a:ext cx="669849" cy="622900"/>
             </p14:xfrm>
           </p:contentPart>
         </mc:Choice>
@@ -16228,8 +16783,8 @@
             </p:blipFill>
             <p:spPr>
               <a:xfrm>
-                <a:off x="1670896" y="4836550"/>
-                <a:ext cx="1097640" cy="690840"/>
+                <a:off x="1670898" y="4869207"/>
+                <a:ext cx="702604" cy="658186"/>
               </a:xfrm>
               <a:prstGeom prst="rect">
                 <a:avLst/>
@@ -16511,7 +17066,7 @@
 </p:sld>
 </file>
 
-<file path=ppt/slides/slide5.xml><?xml version="1.0" encoding="utf-8"?>
+<file path=ppt/slides/slide6.xml><?xml version="1.0" encoding="utf-8"?>
 <p:sld xmlns:a="http://schemas.openxmlformats.org/drawingml/2006/main" xmlns:r="http://schemas.openxmlformats.org/officeDocument/2006/relationships" xmlns:p="http://schemas.openxmlformats.org/presentationml/2006/main">
   <p:cSld>
     <p:spTree>
@@ -16679,7 +17234,7 @@
 </p:sld>
 </file>
 
-<file path=ppt/slides/slide6.xml><?xml version="1.0" encoding="utf-8"?>
+<file path=ppt/slides/slide7.xml><?xml version="1.0" encoding="utf-8"?>
 <p:sld xmlns:a="http://schemas.openxmlformats.org/drawingml/2006/main" xmlns:r="http://schemas.openxmlformats.org/officeDocument/2006/relationships" xmlns:p="http://schemas.openxmlformats.org/presentationml/2006/main">
   <p:cSld>
     <p:spTree>
@@ -17694,7 +18249,7 @@
 </p:sld>
 </file>
 
-<file path=ppt/slides/slide7.xml><?xml version="1.0" encoding="utf-8"?>
+<file path=ppt/slides/slide8.xml><?xml version="1.0" encoding="utf-8"?>
 <p:sld xmlns:a="http://schemas.openxmlformats.org/drawingml/2006/main" xmlns:r="http://schemas.openxmlformats.org/officeDocument/2006/relationships" xmlns:p="http://schemas.openxmlformats.org/presentationml/2006/main">
   <p:cSld>
     <p:spTree>
@@ -18094,7 +18649,7 @@
         <p:spPr>
           <a:xfrm>
             <a:off x="838200" y="2014167"/>
-            <a:ext cx="8120333" cy="2677656"/>
+            <a:ext cx="8120333" cy="3046988"/>
           </a:xfrm>
           <a:prstGeom prst="rect">
             <a:avLst/>
@@ -18188,6 +18743,16 @@
             <a:r>
               <a:rPr lang="nb-NO" sz="2400" dirty="0"/>
               <a:t> hjelper deg i stedet)</a:t>
+            </a:r>
+          </a:p>
+          <a:p>
+            <a:pPr marL="285750" indent="-285750">
+              <a:buFont typeface="Arial" panose="020B0604020202020204" pitchFamily="34" charset="0"/>
+              <a:buChar char="•"/>
+            </a:pPr>
+            <a:r>
+              <a:rPr lang="nb-NO" sz="2400" dirty="0"/>
+              <a:t>Prøvd meg frem og eksperimentert</a:t>
             </a:r>
           </a:p>
         </p:txBody>
@@ -18205,7 +18770,7 @@
 </p:sld>
 </file>
 
-<file path=ppt/slides/slide8.xml><?xml version="1.0" encoding="utf-8"?>
+<file path=ppt/slides/slide9.xml><?xml version="1.0" encoding="utf-8"?>
 <p:sld xmlns:a="http://schemas.openxmlformats.org/drawingml/2006/main" xmlns:r="http://schemas.openxmlformats.org/officeDocument/2006/relationships" xmlns:p="http://schemas.openxmlformats.org/presentationml/2006/main">
   <p:cSld>
     <p:spTree>
@@ -18254,7 +18819,7 @@
         <p:spPr>
           <a:xfrm>
             <a:off x="838200" y="2014167"/>
-            <a:ext cx="8120333" cy="1569660"/>
+            <a:ext cx="8120333" cy="2308324"/>
           </a:xfrm>
           <a:prstGeom prst="rect">
             <a:avLst/>
@@ -18275,6 +18840,36 @@
               <a:rPr lang="nb-NO" sz="2400" dirty="0" err="1"/>
               <a:t>Yeoman</a:t>
             </a:r>
+            <a:r>
+              <a:rPr lang="nb-NO" sz="2400" dirty="0"/>
+              <a:t> (Generator: «</a:t>
+            </a:r>
+            <a:r>
+              <a:rPr lang="nb-NO" sz="2400" dirty="0" err="1"/>
+              <a:t>api</a:t>
+            </a:r>
+            <a:r>
+              <a:rPr lang="nb-NO" sz="2400" dirty="0"/>
+              <a:t>»)</a:t>
+            </a:r>
+          </a:p>
+          <a:p>
+            <a:pPr marL="742950" lvl="1" indent="-285750">
+              <a:buFont typeface="Arial" panose="020B0604020202020204" pitchFamily="34" charset="0"/>
+              <a:buChar char="•"/>
+            </a:pPr>
+            <a:r>
+              <a:rPr lang="en-US" sz="2400" dirty="0"/>
+              <a:t>Yeoman generator for creating RESTful </a:t>
+            </a:r>
+            <a:r>
+              <a:rPr lang="en-US" sz="2400" dirty="0" err="1"/>
+              <a:t>NodeJS</a:t>
+            </a:r>
+            <a:r>
+              <a:rPr lang="en-US" sz="2400" dirty="0"/>
+              <a:t> APIs, using ES6, Mongoose and Express</a:t>
+            </a:r>
             <a:endParaRPr lang="nb-NO" sz="2400" dirty="0"/>
           </a:p>
           <a:p>
@@ -18283,6 +18878,10 @@
               <a:buChar char="•"/>
             </a:pPr>
             <a:r>
+              <a:rPr lang="nb-NO" sz="2400" dirty="0"/>
+              <a:t>Skrier bare «</a:t>
+            </a:r>
+            <a:r>
               <a:rPr lang="nb-NO" sz="2400" dirty="0" err="1"/>
               <a:t>yo</a:t>
             </a:r>
@@ -18294,7 +18893,10 @@
               <a:rPr lang="nb-NO" sz="2400" dirty="0" err="1"/>
               <a:t>api</a:t>
             </a:r>
-            <a:endParaRPr lang="nb-NO" sz="2400" dirty="0"/>
+            <a:r>
+              <a:rPr lang="nb-NO" sz="2400" dirty="0"/>
+              <a:t>» i terminalen</a:t>
+            </a:r>
           </a:p>
           <a:p>
             <a:pPr marL="285750" indent="-285750">
@@ -18303,7 +18905,7 @@
             </a:pPr>
             <a:r>
               <a:rPr lang="nb-NO" sz="2400" dirty="0"/>
-              <a:t>Noe kompleks løsning</a:t>
+              <a:t>Solid, men noe kompleks løsning</a:t>
             </a:r>
           </a:p>
           <a:p>
@@ -18374,146 +18976,6 @@
     <p:extLst>
       <p:ext uri="{BB962C8B-B14F-4D97-AF65-F5344CB8AC3E}">
         <p14:creationId xmlns:p14="http://schemas.microsoft.com/office/powerpoint/2010/main" val="2607743447"/>
-      </p:ext>
-    </p:extLst>
-  </p:cSld>
-  <p:clrMapOvr>
-    <a:masterClrMapping/>
-  </p:clrMapOvr>
-</p:sld>
-</file>
-
-<file path=ppt/slides/slide9.xml><?xml version="1.0" encoding="utf-8"?>
-<p:sld xmlns:a="http://schemas.openxmlformats.org/drawingml/2006/main" xmlns:r="http://schemas.openxmlformats.org/officeDocument/2006/relationships" xmlns:p="http://schemas.openxmlformats.org/presentationml/2006/main">
-  <p:cSld>
-    <p:spTree>
-      <p:nvGrpSpPr>
-        <p:cNvPr id="1" name=""/>
-        <p:cNvGrpSpPr/>
-        <p:nvPr/>
-      </p:nvGrpSpPr>
-      <p:grpSpPr>
-        <a:xfrm>
-          <a:off x="0" y="0"/>
-          <a:ext cx="0" cy="0"/>
-          <a:chOff x="0" y="0"/>
-          <a:chExt cx="0" cy="0"/>
-        </a:xfrm>
-      </p:grpSpPr>
-      <p:sp>
-        <p:nvSpPr>
-          <p:cNvPr id="2" name="Title 1"/>
-          <p:cNvSpPr>
-            <a:spLocks noGrp="1"/>
-          </p:cNvSpPr>
-          <p:nvPr>
-            <p:ph type="title"/>
-          </p:nvPr>
-        </p:nvSpPr>
-        <p:spPr/>
-        <p:txBody>
-          <a:bodyPr/>
-          <a:lstStyle/>
-          <a:p>
-            <a:r>
-              <a:rPr lang="nb-NO" dirty="0"/>
-              <a:t>Komme i gang: ASP.NET </a:t>
-            </a:r>
-            <a:r>
-              <a:rPr lang="nb-NO" dirty="0" err="1"/>
-              <a:t>Core</a:t>
-            </a:r>
-            <a:endParaRPr lang="en-US" dirty="0"/>
-          </a:p>
-        </p:txBody>
-      </p:sp>
-      <p:sp>
-        <p:nvSpPr>
-          <p:cNvPr id="3" name="TextBox 2"/>
-          <p:cNvSpPr txBox="1"/>
-          <p:nvPr/>
-        </p:nvSpPr>
-        <p:spPr>
-          <a:xfrm>
-            <a:off x="838200" y="2014167"/>
-            <a:ext cx="8120333" cy="1938992"/>
-          </a:xfrm>
-          <a:prstGeom prst="rect">
-            <a:avLst/>
-          </a:prstGeom>
-          <a:noFill/>
-        </p:spPr>
-        <p:txBody>
-          <a:bodyPr wrap="square" rtlCol="0">
-            <a:spAutoFit/>
-          </a:bodyPr>
-          <a:lstStyle/>
-          <a:p>
-            <a:pPr marL="285750" indent="-285750">
-              <a:buFont typeface="Arial" panose="020B0604020202020204" pitchFamily="34" charset="0"/>
-              <a:buChar char="•"/>
-            </a:pPr>
-            <a:r>
-              <a:rPr lang="nb-NO" sz="2400" dirty="0" err="1"/>
-              <a:t>Yeoman</a:t>
-            </a:r>
-            <a:endParaRPr lang="nb-NO" sz="2400" dirty="0"/>
-          </a:p>
-          <a:p>
-            <a:pPr marL="285750" indent="-285750">
-              <a:buFont typeface="Arial" panose="020B0604020202020204" pitchFamily="34" charset="0"/>
-              <a:buChar char="•"/>
-            </a:pPr>
-            <a:r>
-              <a:rPr lang="nb-NO" sz="2400" dirty="0" err="1"/>
-              <a:t>yo</a:t>
-            </a:r>
-            <a:r>
-              <a:rPr lang="nb-NO" sz="2400" dirty="0"/>
-              <a:t> </a:t>
-            </a:r>
-            <a:r>
-              <a:rPr lang="nb-NO" sz="2400" dirty="0" err="1"/>
-              <a:t>aspnet</a:t>
-            </a:r>
-            <a:endParaRPr lang="nb-NO" sz="2400" dirty="0"/>
-          </a:p>
-          <a:p>
-            <a:pPr marL="285750" indent="-285750">
-              <a:buFont typeface="Arial" panose="020B0604020202020204" pitchFamily="34" charset="0"/>
-              <a:buChar char="•"/>
-            </a:pPr>
-            <a:r>
-              <a:rPr lang="nb-NO" sz="2400" dirty="0"/>
-              <a:t>Velg Web API</a:t>
-            </a:r>
-          </a:p>
-          <a:p>
-            <a:pPr marL="285750" indent="-285750">
-              <a:buFont typeface="Arial" panose="020B0604020202020204" pitchFamily="34" charset="0"/>
-              <a:buChar char="•"/>
-            </a:pPr>
-            <a:r>
-              <a:rPr lang="nb-NO" sz="2400" dirty="0"/>
-              <a:t>Veldig enkel og grei</a:t>
-            </a:r>
-          </a:p>
-          <a:p>
-            <a:pPr marL="285750" indent="-285750">
-              <a:buFont typeface="Arial" panose="020B0604020202020204" pitchFamily="34" charset="0"/>
-              <a:buChar char="•"/>
-            </a:pPr>
-            <a:r>
-              <a:rPr lang="nb-NO" sz="2400" dirty="0"/>
-              <a:t>Kjempefin å jobbe ut i fra </a:t>
-            </a:r>
-          </a:p>
-        </p:txBody>
-      </p:sp>
-    </p:spTree>
-    <p:extLst>
-      <p:ext uri="{BB962C8B-B14F-4D97-AF65-F5344CB8AC3E}">
-        <p14:creationId xmlns:p14="http://schemas.microsoft.com/office/powerpoint/2010/main" val="143732061"/>
       </p:ext>
     </p:extLst>
   </p:cSld>

</xml_diff>

<commit_message>
Cleaned up presentation more
</commit_message>
<xml_diff>
--- a/dotnet-core-foredrag.pptx
+++ b/dotnet-core-foredrag.pptx
@@ -12516,6 +12516,10 @@
               <a:buChar char="•"/>
             </a:pPr>
             <a:r>
+              <a:rPr lang="nb-NO" sz="2400" dirty="0"/>
+              <a:t>Skriv «</a:t>
+            </a:r>
+            <a:r>
               <a:rPr lang="nb-NO" sz="2400" dirty="0" err="1"/>
               <a:t>yo</a:t>
             </a:r>
@@ -12529,13 +12533,8 @@
             </a:r>
             <a:r>
               <a:rPr lang="nb-NO" sz="2400" dirty="0"/>
-              <a:t> </a:t>
-            </a:r>
-            <a:r>
-              <a:rPr lang="nb-NO" sz="2400" dirty="0" err="1"/>
-              <a:t>webapi</a:t>
-            </a:r>
-            <a:endParaRPr lang="nb-NO" sz="2400" dirty="0"/>
+              <a:t>» i terminal -&gt; Velg «Web API»</a:t>
+            </a:r>
           </a:p>
           <a:p>
             <a:pPr marL="285750" indent="-285750">
@@ -12544,7 +12543,7 @@
             </a:pPr>
             <a:r>
               <a:rPr lang="nb-NO" sz="2400" dirty="0"/>
-              <a:t>Veldig enkel og grei</a:t>
+              <a:t>Enkel og grei</a:t>
             </a:r>
           </a:p>
           <a:p>
@@ -15009,6 +15008,108 @@
               </a:rPr>
               <a:t>bjaanes</a:t>
             </a:r>
+            <a:endParaRPr lang="en-US" sz="2400" dirty="0"/>
+          </a:p>
+        </p:txBody>
+      </p:sp>
+      <p:sp>
+        <p:nvSpPr>
+          <p:cNvPr id="6" name="TextBox 5"/>
+          <p:cNvSpPr txBox="1"/>
+          <p:nvPr/>
+        </p:nvSpPr>
+        <p:spPr>
+          <a:xfrm>
+            <a:off x="838200" y="2014167"/>
+            <a:ext cx="8120333" cy="3046988"/>
+          </a:xfrm>
+          <a:prstGeom prst="rect">
+            <a:avLst/>
+          </a:prstGeom>
+          <a:noFill/>
+        </p:spPr>
+        <p:txBody>
+          <a:bodyPr wrap="square" rtlCol="0">
+            <a:spAutoFit/>
+          </a:bodyPr>
+          <a:lstStyle/>
+          <a:p>
+            <a:pPr marL="285750" indent="-285750">
+              <a:buFont typeface="Arial" panose="020B0604020202020204" pitchFamily="34" charset="0"/>
+              <a:buChar char="•"/>
+            </a:pPr>
+            <a:r>
+              <a:rPr lang="nb-NO" sz="2400" dirty="0"/>
+              <a:t>All koden ligger på </a:t>
+            </a:r>
+            <a:r>
+              <a:rPr lang="nb-NO" sz="2400" dirty="0" err="1"/>
+              <a:t>Github</a:t>
+            </a:r>
+            <a:endParaRPr lang="nb-NO" sz="2400" dirty="0"/>
+          </a:p>
+          <a:p>
+            <a:pPr marL="742950" lvl="1" indent="-285750">
+              <a:buFont typeface="Arial" panose="020B0604020202020204" pitchFamily="34" charset="0"/>
+              <a:buChar char="•"/>
+            </a:pPr>
+            <a:r>
+              <a:rPr lang="nb-NO" sz="2400" dirty="0">
+                <a:hlinkClick r:id="rId5"/>
+              </a:rPr>
+              <a:t>https://github.com/bjaanes/dotnet-core-api-talk</a:t>
+            </a:r>
+            <a:endParaRPr lang="nb-NO" sz="2400" dirty="0"/>
+          </a:p>
+          <a:p>
+            <a:pPr marL="285750" indent="-285750">
+              <a:buFont typeface="Arial" panose="020B0604020202020204" pitchFamily="34" charset="0"/>
+              <a:buChar char="•"/>
+            </a:pPr>
+            <a:r>
+              <a:rPr lang="nb-NO" sz="2400" dirty="0"/>
+              <a:t>En bloggpost om temaet ligger på bloggen min</a:t>
+            </a:r>
+          </a:p>
+          <a:p>
+            <a:pPr marL="742950" lvl="1" indent="-285750">
+              <a:buFont typeface="Arial" panose="020B0604020202020204" pitchFamily="34" charset="0"/>
+              <a:buChar char="•"/>
+            </a:pPr>
+            <a:r>
+              <a:rPr lang="nb-NO" sz="2400" dirty="0">
+                <a:hlinkClick r:id="rId6"/>
+              </a:rPr>
+              <a:t>http://www.gjermundbjaanes.com/donet-something</a:t>
+            </a:r>
+            <a:endParaRPr lang="nb-NO" sz="2400" dirty="0"/>
+          </a:p>
+          <a:p>
+            <a:pPr marL="742950" lvl="1" indent="-285750">
+              <a:buFont typeface="Arial" panose="020B0604020202020204" pitchFamily="34" charset="0"/>
+              <a:buChar char="•"/>
+            </a:pPr>
+            <a:endParaRPr lang="nb-NO" sz="2400" dirty="0"/>
+          </a:p>
+          <a:p>
+            <a:pPr marL="285750" indent="-285750">
+              <a:buFont typeface="Arial" panose="020B0604020202020204" pitchFamily="34" charset="0"/>
+              <a:buChar char="•"/>
+            </a:pPr>
+            <a:endParaRPr lang="nb-NO" sz="2400" dirty="0"/>
+          </a:p>
+          <a:p>
+            <a:pPr marL="742950" lvl="1" indent="-285750">
+              <a:buFont typeface="Arial" panose="020B0604020202020204" pitchFamily="34" charset="0"/>
+              <a:buChar char="•"/>
+            </a:pPr>
+            <a:endParaRPr lang="nb-NO" sz="2400" dirty="0"/>
+          </a:p>
+          <a:p>
+            <a:pPr marL="285750" indent="-285750">
+              <a:buFont typeface="Arial" panose="020B0604020202020204" pitchFamily="34" charset="0"/>
+              <a:buChar char="•"/>
+            </a:pPr>
             <a:endParaRPr lang="en-US" sz="2400" dirty="0"/>
           </a:p>
         </p:txBody>
@@ -18119,7 +18220,7 @@
         <p:spPr>
           <a:xfrm>
             <a:off x="838200" y="2164389"/>
-            <a:ext cx="8120333" cy="2246769"/>
+            <a:ext cx="8120333" cy="2677656"/>
           </a:xfrm>
           <a:prstGeom prst="rect">
             <a:avLst/>
@@ -18175,6 +18276,16 @@
             <a:r>
               <a:rPr lang="nb-NO" sz="2800" dirty="0"/>
               <a:t>Nåværende løsninger (Node, Java)</a:t>
+            </a:r>
+          </a:p>
+          <a:p>
+            <a:pPr marL="742950" lvl="1" indent="-285750">
+              <a:buFont typeface="Arial" panose="020B0604020202020204" pitchFamily="34" charset="0"/>
+              <a:buChar char="•"/>
+            </a:pPr>
+            <a:r>
+              <a:rPr lang="nb-NO" sz="2800" dirty="0"/>
+              <a:t>Særlig fokus på mindre applikasjoner</a:t>
             </a:r>
           </a:p>
           <a:p>

</xml_diff>

<commit_message>
Upadated REST API slide to be more clear
</commit_message>
<xml_diff>
--- a/dotnet-core-foredrag.pptx
+++ b/dotnet-core-foredrag.pptx
@@ -17579,7 +17579,21 @@
             </a:pPr>
             <a:r>
               <a:rPr lang="nb-NO" dirty="0"/>
-              <a:t>HTTP</a:t>
+              <a:t>En del prinsipper og «regler» som f.eks.</a:t>
+            </a:r>
+          </a:p>
+          <a:p>
+            <a:pPr marL="742950" lvl="1" indent="-285750">
+              <a:buFont typeface="Arial" panose="020B0604020202020204" pitchFamily="34" charset="0"/>
+              <a:buChar char="•"/>
+            </a:pPr>
+            <a:r>
+              <a:rPr lang="nb-NO" dirty="0" err="1"/>
+              <a:t>Stateless</a:t>
+            </a:r>
+            <a:r>
+              <a:rPr lang="nb-NO" dirty="0"/>
+              <a:t> er gjerne en av de vi vil følge</a:t>
             </a:r>
           </a:p>
           <a:p>
@@ -17589,7 +17603,7 @@
             </a:pPr>
             <a:r>
               <a:rPr lang="nb-NO" dirty="0"/>
-              <a:t>Klient-Server</a:t>
+              <a:t>HTTP</a:t>
             </a:r>
           </a:p>
           <a:p>
@@ -17598,25 +17612,9 @@
               <a:buChar char="•"/>
             </a:pPr>
             <a:r>
-              <a:rPr lang="nb-NO" dirty="0" err="1"/>
-              <a:t>Stateless</a:t>
-            </a:r>
-            <a:endParaRPr lang="nb-NO" dirty="0"/>
-          </a:p>
-          <a:p>
-            <a:pPr marL="285750" indent="-285750">
-              <a:buFont typeface="Arial" panose="020B0604020202020204" pitchFamily="34" charset="0"/>
-              <a:buChar char="•"/>
-            </a:pPr>
-            <a:r>
               <a:rPr lang="nb-NO" dirty="0"/>
-              <a:t>VERB på </a:t>
-            </a:r>
-            <a:r>
-              <a:rPr lang="nb-NO" dirty="0" err="1"/>
-              <a:t>URI’er</a:t>
-            </a:r>
-            <a:endParaRPr lang="nb-NO" dirty="0"/>
+              <a:t>VERB på URI / Ressurser</a:t>
+            </a:r>
           </a:p>
           <a:p>
             <a:pPr marL="742950" lvl="1" indent="-285750">

</xml_diff>

<commit_message>
Clean up in presentation
</commit_message>
<xml_diff>
--- a/dotnet-core-foredrag.pptx
+++ b/dotnet-core-foredrag.pptx
@@ -14386,7 +14386,7 @@
         <p:spPr>
           <a:xfrm>
             <a:off x="838200" y="2014167"/>
-            <a:ext cx="8120333" cy="2677656"/>
+            <a:ext cx="9391650" cy="2677656"/>
           </a:xfrm>
           <a:prstGeom prst="rect">
             <a:avLst/>
@@ -14468,7 +14468,7 @@
             </a:pPr>
             <a:r>
               <a:rPr lang="nb-NO" sz="2400" dirty="0"/>
-              <a:t>Finnes en drøss med pakker som kan gjøre det for deg</a:t>
+              <a:t>Finnes mange forskjellige pakker som kan gjøre det for deg</a:t>
             </a:r>
           </a:p>
           <a:p>

</xml_diff>

<commit_message>
Added new slide for coding conclusion
</commit_message>
<xml_diff>
--- a/dotnet-core-foredrag.pptx
+++ b/dotnet-core-foredrag.pptx
@@ -18,12 +18,13 @@
     <p:sldId id="273" r:id="rId12"/>
     <p:sldId id="268" r:id="rId13"/>
     <p:sldId id="272" r:id="rId14"/>
-    <p:sldId id="270" r:id="rId15"/>
-    <p:sldId id="271" r:id="rId16"/>
-    <p:sldId id="278" r:id="rId17"/>
-    <p:sldId id="279" r:id="rId18"/>
-    <p:sldId id="276" r:id="rId19"/>
-    <p:sldId id="277" r:id="rId20"/>
+    <p:sldId id="281" r:id="rId15"/>
+    <p:sldId id="270" r:id="rId16"/>
+    <p:sldId id="271" r:id="rId17"/>
+    <p:sldId id="278" r:id="rId18"/>
+    <p:sldId id="279" r:id="rId19"/>
+    <p:sldId id="276" r:id="rId20"/>
+    <p:sldId id="277" r:id="rId21"/>
   </p:sldIdLst>
   <p:sldSz cx="12192000" cy="6858000"/>
   <p:notesSz cx="6858000" cy="9144000"/>
@@ -1963,8 +1964,8 @@
       <emma:emma xmlns:emma="http://www.w3.org/2003/04/emma" version="1.0">
         <emma:interpretation id="{54F57D52-241E-40E7-B042-A81A0DB0BB28}" emma:medium="tactile" emma:mode="ink">
           <msink:context xmlns:msink="http://schemas.microsoft.com/ink/2010/main" type="inkDrawing" rotatedBoundingBox="25460,16913 25829,15380 25864,15388 25495,16921" semanticType="callout" shapeName="Other">
+            <msink:sourceLink direction="with" ref="{78C4245C-9A22-4BA1-ACA8-8424146C3798}"/>
             <msink:sourceLink direction="with" ref="{259B13FE-760B-4EC4-B907-5E9FA2C98F18}"/>
-            <msink:sourceLink direction="with" ref="{78C4245C-9A22-4BA1-ACA8-8424146C3798}"/>
           </msink:context>
         </emma:interpretation>
       </emma:emma>
@@ -2002,8 +2003,8 @@
       <emma:emma xmlns:emma="http://www.w3.org/2003/04/emma" version="1.0">
         <emma:interpretation id="{78C4245C-9A22-4BA1-ACA8-8424146C3798}" emma:medium="tactile" emma:mode="ink">
           <msink:context xmlns:msink="http://schemas.microsoft.com/ink/2010/main" type="inkDrawing" rotatedBoundingBox="25900,15393 26096,16661 26084,16662 25887,15395" semanticType="callout" shapeName="Line">
+            <msink:destinationLink direction="with" ref="{54F57D52-241E-40E7-B042-A81A0DB0BB28}"/>
             <msink:destinationLink direction="with" ref="{E9862F63-960C-46DD-A57D-3C7BF3BB13DA}"/>
-            <msink:destinationLink direction="with" ref="{54F57D52-241E-40E7-B042-A81A0DB0BB28}"/>
           </msink:context>
         </emma:interpretation>
       </emma:emma>
@@ -2079,8 +2080,8 @@
       <emma:emma xmlns:emma="http://www.w3.org/2003/04/emma" version="1.0">
         <emma:interpretation id="{5739B0B6-93DB-4460-BC61-DCAE2E08AB43}" emma:medium="tactile" emma:mode="ink">
           <msink:context xmlns:msink="http://schemas.microsoft.com/ink/2010/main" type="inkDrawing" rotatedBoundingBox="25710,13813 25963,15387 25887,15399 25634,13826" semanticType="verticalRange" shapeName="Other">
+            <msink:sourceLink direction="with" ref="{FC14C35F-EB30-4AE4-898D-02DF0F732229}"/>
             <msink:sourceLink direction="with" ref="{24B1926B-DA8A-4DE0-86B6-186EDB7EEEEB}"/>
-            <msink:sourceLink direction="with" ref="{FC14C35F-EB30-4AE4-898D-02DF0F732229}"/>
           </msink:context>
         </emma:interpretation>
       </emma:emma>
@@ -8906,7 +8907,7 @@
           <a:p>
             <a:fld id="{C7B437E4-9023-4C30-BD7A-7EB9AF5FB2DE}" type="datetimeFigureOut">
               <a:rPr lang="en-US" smtClean="0"/>
-              <a:t>18-Nov-16</a:t>
+              <a:t>23-Nov-16</a:t>
             </a:fld>
             <a:endParaRPr lang="en-US"/>
           </a:p>
@@ -9074,7 +9075,7 @@
           <a:p>
             <a:fld id="{C7B437E4-9023-4C30-BD7A-7EB9AF5FB2DE}" type="datetimeFigureOut">
               <a:rPr lang="en-US" smtClean="0"/>
-              <a:t>18-Nov-16</a:t>
+              <a:t>23-Nov-16</a:t>
             </a:fld>
             <a:endParaRPr lang="en-US"/>
           </a:p>
@@ -9252,7 +9253,7 @@
           <a:p>
             <a:fld id="{C7B437E4-9023-4C30-BD7A-7EB9AF5FB2DE}" type="datetimeFigureOut">
               <a:rPr lang="en-US" smtClean="0"/>
-              <a:t>18-Nov-16</a:t>
+              <a:t>23-Nov-16</a:t>
             </a:fld>
             <a:endParaRPr lang="en-US"/>
           </a:p>
@@ -9420,7 +9421,7 @@
           <a:p>
             <a:fld id="{C7B437E4-9023-4C30-BD7A-7EB9AF5FB2DE}" type="datetimeFigureOut">
               <a:rPr lang="en-US" smtClean="0"/>
-              <a:t>18-Nov-16</a:t>
+              <a:t>23-Nov-16</a:t>
             </a:fld>
             <a:endParaRPr lang="en-US"/>
           </a:p>
@@ -9665,7 +9666,7 @@
           <a:p>
             <a:fld id="{C7B437E4-9023-4C30-BD7A-7EB9AF5FB2DE}" type="datetimeFigureOut">
               <a:rPr lang="en-US" smtClean="0"/>
-              <a:t>18-Nov-16</a:t>
+              <a:t>23-Nov-16</a:t>
             </a:fld>
             <a:endParaRPr lang="en-US"/>
           </a:p>
@@ -9894,7 +9895,7 @@
           <a:p>
             <a:fld id="{C7B437E4-9023-4C30-BD7A-7EB9AF5FB2DE}" type="datetimeFigureOut">
               <a:rPr lang="en-US" smtClean="0"/>
-              <a:t>18-Nov-16</a:t>
+              <a:t>23-Nov-16</a:t>
             </a:fld>
             <a:endParaRPr lang="en-US"/>
           </a:p>
@@ -10258,7 +10259,7 @@
           <a:p>
             <a:fld id="{C7B437E4-9023-4C30-BD7A-7EB9AF5FB2DE}" type="datetimeFigureOut">
               <a:rPr lang="en-US" smtClean="0"/>
-              <a:t>18-Nov-16</a:t>
+              <a:t>23-Nov-16</a:t>
             </a:fld>
             <a:endParaRPr lang="en-US"/>
           </a:p>
@@ -10375,7 +10376,7 @@
           <a:p>
             <a:fld id="{C7B437E4-9023-4C30-BD7A-7EB9AF5FB2DE}" type="datetimeFigureOut">
               <a:rPr lang="en-US" smtClean="0"/>
-              <a:t>18-Nov-16</a:t>
+              <a:t>23-Nov-16</a:t>
             </a:fld>
             <a:endParaRPr lang="en-US"/>
           </a:p>
@@ -10470,7 +10471,7 @@
           <a:p>
             <a:fld id="{C7B437E4-9023-4C30-BD7A-7EB9AF5FB2DE}" type="datetimeFigureOut">
               <a:rPr lang="en-US" smtClean="0"/>
-              <a:t>18-Nov-16</a:t>
+              <a:t>23-Nov-16</a:t>
             </a:fld>
             <a:endParaRPr lang="en-US"/>
           </a:p>
@@ -10745,7 +10746,7 @@
           <a:p>
             <a:fld id="{C7B437E4-9023-4C30-BD7A-7EB9AF5FB2DE}" type="datetimeFigureOut">
               <a:rPr lang="en-US" smtClean="0"/>
-              <a:t>18-Nov-16</a:t>
+              <a:t>23-Nov-16</a:t>
             </a:fld>
             <a:endParaRPr lang="en-US"/>
           </a:p>
@@ -10997,7 +10998,7 @@
           <a:p>
             <a:fld id="{C7B437E4-9023-4C30-BD7A-7EB9AF5FB2DE}" type="datetimeFigureOut">
               <a:rPr lang="en-US" smtClean="0"/>
-              <a:t>18-Nov-16</a:t>
+              <a:t>23-Nov-16</a:t>
             </a:fld>
             <a:endParaRPr lang="en-US"/>
           </a:p>
@@ -11208,7 +11209,7 @@
           <a:p>
             <a:fld id="{C7B437E4-9023-4C30-BD7A-7EB9AF5FB2DE}" type="datetimeFigureOut">
               <a:rPr lang="en-US" smtClean="0"/>
-              <a:t>18-Nov-16</a:t>
+              <a:t>23-Nov-16</a:t>
             </a:fld>
             <a:endParaRPr lang="en-US"/>
           </a:p>
@@ -12568,8 +12569,8 @@
           </a:p>
         </p:txBody>
       </p:sp>
-      <mc:AlternateContent xmlns:mc="http://schemas.openxmlformats.org/markup-compatibility/2006">
-        <mc:Choice xmlns:p14="http://schemas.microsoft.com/office/powerpoint/2010/main" Requires="p14">
+      <mc:AlternateContent xmlns:mc="http://schemas.openxmlformats.org/markup-compatibility/2006" xmlns:p14="http://schemas.microsoft.com/office/powerpoint/2010/main">
+        <mc:Choice Requires="p14">
           <p:contentPart p14:bwMode="auto" r:id="rId2">
             <p14:nvContentPartPr>
               <p14:cNvPr id="13" name="Ink 12"/>
@@ -12582,7 +12583,7 @@
             </p14:xfrm>
           </p:contentPart>
         </mc:Choice>
-        <mc:Fallback>
+        <mc:Fallback xmlns="">
           <p:pic>
             <p:nvPicPr>
               <p:cNvPr id="13" name="Ink 12"/>
@@ -12607,8 +12608,8 @@
           </p:pic>
         </mc:Fallback>
       </mc:AlternateContent>
-      <mc:AlternateContent xmlns:mc="http://schemas.openxmlformats.org/markup-compatibility/2006">
-        <mc:Choice xmlns:p14="http://schemas.microsoft.com/office/powerpoint/2010/main" Requires="p14">
+      <mc:AlternateContent xmlns:mc="http://schemas.openxmlformats.org/markup-compatibility/2006" xmlns:p14="http://schemas.microsoft.com/office/powerpoint/2010/main">
+        <mc:Choice Requires="p14">
           <p:contentPart p14:bwMode="auto" r:id="rId4">
             <p14:nvContentPartPr>
               <p14:cNvPr id="14" name="Ink 13"/>
@@ -12621,7 +12622,7 @@
             </p14:xfrm>
           </p:contentPart>
         </mc:Choice>
-        <mc:Fallback>
+        <mc:Fallback xmlns="">
           <p:pic>
             <p:nvPicPr>
               <p:cNvPr id="14" name="Ink 13"/>
@@ -12646,8 +12647,8 @@
           </p:pic>
         </mc:Fallback>
       </mc:AlternateContent>
-      <mc:AlternateContent xmlns:mc="http://schemas.openxmlformats.org/markup-compatibility/2006">
-        <mc:Choice xmlns:p14="http://schemas.microsoft.com/office/powerpoint/2010/main" Requires="p14">
+      <mc:AlternateContent xmlns:mc="http://schemas.openxmlformats.org/markup-compatibility/2006" xmlns:p14="http://schemas.microsoft.com/office/powerpoint/2010/main">
+        <mc:Choice Requires="p14">
           <p:contentPart p14:bwMode="auto" r:id="rId6">
             <p14:nvContentPartPr>
               <p14:cNvPr id="15" name="Ink 14"/>
@@ -12660,7 +12661,7 @@
             </p14:xfrm>
           </p:contentPart>
         </mc:Choice>
-        <mc:Fallback>
+        <mc:Fallback xmlns="">
           <p:pic>
             <p:nvPicPr>
               <p:cNvPr id="15" name="Ink 14"/>
@@ -12685,8 +12686,8 @@
           </p:pic>
         </mc:Fallback>
       </mc:AlternateContent>
-      <mc:AlternateContent xmlns:mc="http://schemas.openxmlformats.org/markup-compatibility/2006">
-        <mc:Choice xmlns:p14="http://schemas.microsoft.com/office/powerpoint/2010/main" Requires="p14">
+      <mc:AlternateContent xmlns:mc="http://schemas.openxmlformats.org/markup-compatibility/2006" xmlns:p14="http://schemas.microsoft.com/office/powerpoint/2010/main">
+        <mc:Choice Requires="p14">
           <p:contentPart p14:bwMode="auto" r:id="rId8">
             <p14:nvContentPartPr>
               <p14:cNvPr id="16" name="Ink 15"/>
@@ -12699,7 +12700,7 @@
             </p14:xfrm>
           </p:contentPart>
         </mc:Choice>
-        <mc:Fallback>
+        <mc:Fallback xmlns="">
           <p:pic>
             <p:nvPicPr>
               <p:cNvPr id="16" name="Ink 15"/>
@@ -12724,8 +12725,8 @@
           </p:pic>
         </mc:Fallback>
       </mc:AlternateContent>
-      <mc:AlternateContent xmlns:mc="http://schemas.openxmlformats.org/markup-compatibility/2006">
-        <mc:Choice xmlns:p14="http://schemas.microsoft.com/office/powerpoint/2010/main" Requires="p14">
+      <mc:AlternateContent xmlns:mc="http://schemas.openxmlformats.org/markup-compatibility/2006" xmlns:p14="http://schemas.microsoft.com/office/powerpoint/2010/main">
+        <mc:Choice Requires="p14">
           <p:contentPart p14:bwMode="auto" r:id="rId10">
             <p14:nvContentPartPr>
               <p14:cNvPr id="17" name="Ink 16"/>
@@ -12738,7 +12739,7 @@
             </p14:xfrm>
           </p:contentPart>
         </mc:Choice>
-        <mc:Fallback>
+        <mc:Fallback xmlns="">
           <p:pic>
             <p:nvPicPr>
               <p:cNvPr id="17" name="Ink 16"/>
@@ -12763,8 +12764,8 @@
           </p:pic>
         </mc:Fallback>
       </mc:AlternateContent>
-      <mc:AlternateContent xmlns:mc="http://schemas.openxmlformats.org/markup-compatibility/2006">
-        <mc:Choice xmlns:p14="http://schemas.microsoft.com/office/powerpoint/2010/main" Requires="p14">
+      <mc:AlternateContent xmlns:mc="http://schemas.openxmlformats.org/markup-compatibility/2006" xmlns:p14="http://schemas.microsoft.com/office/powerpoint/2010/main">
+        <mc:Choice Requires="p14">
           <p:contentPart p14:bwMode="auto" r:id="rId12">
             <p14:nvContentPartPr>
               <p14:cNvPr id="18" name="Ink 17"/>
@@ -12777,7 +12778,7 @@
             </p14:xfrm>
           </p:contentPart>
         </mc:Choice>
-        <mc:Fallback>
+        <mc:Fallback xmlns="">
           <p:pic>
             <p:nvPicPr>
               <p:cNvPr id="18" name="Ink 17"/>
@@ -12802,8 +12803,8 @@
           </p:pic>
         </mc:Fallback>
       </mc:AlternateContent>
-      <mc:AlternateContent xmlns:mc="http://schemas.openxmlformats.org/markup-compatibility/2006">
-        <mc:Choice xmlns:p14="http://schemas.microsoft.com/office/powerpoint/2010/main" Requires="p14">
+      <mc:AlternateContent xmlns:mc="http://schemas.openxmlformats.org/markup-compatibility/2006" xmlns:p14="http://schemas.microsoft.com/office/powerpoint/2010/main">
+        <mc:Choice Requires="p14">
           <p:contentPart p14:bwMode="auto" r:id="rId14">
             <p14:nvContentPartPr>
               <p14:cNvPr id="19" name="Ink 18"/>
@@ -12816,7 +12817,7 @@
             </p14:xfrm>
           </p:contentPart>
         </mc:Choice>
-        <mc:Fallback>
+        <mc:Fallback xmlns="">
           <p:pic>
             <p:nvPicPr>
               <p:cNvPr id="19" name="Ink 18"/>
@@ -12841,8 +12842,8 @@
           </p:pic>
         </mc:Fallback>
       </mc:AlternateContent>
-      <mc:AlternateContent xmlns:mc="http://schemas.openxmlformats.org/markup-compatibility/2006">
-        <mc:Choice xmlns:p14="http://schemas.microsoft.com/office/powerpoint/2010/main" Requires="p14">
+      <mc:AlternateContent xmlns:mc="http://schemas.openxmlformats.org/markup-compatibility/2006" xmlns:p14="http://schemas.microsoft.com/office/powerpoint/2010/main">
+        <mc:Choice Requires="p14">
           <p:contentPart p14:bwMode="auto" r:id="rId16">
             <p14:nvContentPartPr>
               <p14:cNvPr id="20" name="Ink 19"/>
@@ -12855,7 +12856,7 @@
             </p14:xfrm>
           </p:contentPart>
         </mc:Choice>
-        <mc:Fallback>
+        <mc:Fallback xmlns="">
           <p:pic>
             <p:nvPicPr>
               <p:cNvPr id="20" name="Ink 19"/>
@@ -12880,8 +12881,8 @@
           </p:pic>
         </mc:Fallback>
       </mc:AlternateContent>
-      <mc:AlternateContent xmlns:mc="http://schemas.openxmlformats.org/markup-compatibility/2006">
-        <mc:Choice xmlns:p14="http://schemas.microsoft.com/office/powerpoint/2010/main" Requires="p14">
+      <mc:AlternateContent xmlns:mc="http://schemas.openxmlformats.org/markup-compatibility/2006" xmlns:p14="http://schemas.microsoft.com/office/powerpoint/2010/main">
+        <mc:Choice Requires="p14">
           <p:contentPart p14:bwMode="auto" r:id="rId18">
             <p14:nvContentPartPr>
               <p14:cNvPr id="21" name="Ink 20"/>
@@ -12894,7 +12895,7 @@
             </p14:xfrm>
           </p:contentPart>
         </mc:Choice>
-        <mc:Fallback>
+        <mc:Fallback xmlns="">
           <p:pic>
             <p:nvPicPr>
               <p:cNvPr id="21" name="Ink 20"/>
@@ -14022,6 +14023,111 @@
           <a:p>
             <a:r>
               <a:rPr lang="nb-NO" dirty="0"/>
+              <a:t>Hvordan det var å implementere (Node </a:t>
+            </a:r>
+            <a:r>
+              <a:rPr lang="nb-NO" dirty="0" err="1"/>
+              <a:t>vs</a:t>
+            </a:r>
+            <a:r>
+              <a:rPr lang="nb-NO" dirty="0"/>
+              <a:t> ASP.NET)</a:t>
+            </a:r>
+            <a:endParaRPr lang="en-US" dirty="0"/>
+          </a:p>
+        </p:txBody>
+      </p:sp>
+      <p:sp>
+        <p:nvSpPr>
+          <p:cNvPr id="3" name="TextBox 2"/>
+          <p:cNvSpPr txBox="1"/>
+          <p:nvPr/>
+        </p:nvSpPr>
+        <p:spPr>
+          <a:xfrm>
+            <a:off x="838200" y="2014167"/>
+            <a:ext cx="8120333" cy="830997"/>
+          </a:xfrm>
+          <a:prstGeom prst="rect">
+            <a:avLst/>
+          </a:prstGeom>
+          <a:noFill/>
+        </p:spPr>
+        <p:txBody>
+          <a:bodyPr wrap="square" rtlCol="0">
+            <a:spAutoFit/>
+          </a:bodyPr>
+          <a:lstStyle/>
+          <a:p>
+            <a:pPr marL="285750" indent="-285750">
+              <a:buFont typeface="Arial" panose="020B0604020202020204" pitchFamily="34" charset="0"/>
+              <a:buChar char="•"/>
+            </a:pPr>
+            <a:r>
+              <a:rPr lang="nb-NO" sz="2400" dirty="0"/>
+              <a:t>Forventet at Node skulle være raskere og lettere</a:t>
+            </a:r>
+          </a:p>
+          <a:p>
+            <a:pPr marL="742950" lvl="1" indent="-285750">
+              <a:buFont typeface="Arial" panose="020B0604020202020204" pitchFamily="34" charset="0"/>
+              <a:buChar char="•"/>
+            </a:pPr>
+            <a:r>
+              <a:rPr lang="nb-NO" sz="2400" dirty="0"/>
+              <a:t>Bare *litt* tilfelle</a:t>
+            </a:r>
+            <a:endParaRPr lang="en-US" sz="2400" dirty="0"/>
+          </a:p>
+        </p:txBody>
+      </p:sp>
+    </p:spTree>
+    <p:extLst>
+      <p:ext uri="{BB962C8B-B14F-4D97-AF65-F5344CB8AC3E}">
+        <p14:creationId xmlns:p14="http://schemas.microsoft.com/office/powerpoint/2010/main" val="1260702298"/>
+      </p:ext>
+    </p:extLst>
+  </p:cSld>
+  <p:clrMapOvr>
+    <a:masterClrMapping/>
+  </p:clrMapOvr>
+</p:sld>
+</file>
+
+<file path=ppt/slides/slide15.xml><?xml version="1.0" encoding="utf-8"?>
+<p:sld xmlns:a="http://schemas.openxmlformats.org/drawingml/2006/main" xmlns:r="http://schemas.openxmlformats.org/officeDocument/2006/relationships" xmlns:p="http://schemas.openxmlformats.org/presentationml/2006/main">
+  <p:cSld>
+    <p:spTree>
+      <p:nvGrpSpPr>
+        <p:cNvPr id="1" name=""/>
+        <p:cNvGrpSpPr/>
+        <p:nvPr/>
+      </p:nvGrpSpPr>
+      <p:grpSpPr>
+        <a:xfrm>
+          <a:off x="0" y="0"/>
+          <a:ext cx="0" cy="0"/>
+          <a:chOff x="0" y="0"/>
+          <a:chExt cx="0" cy="0"/>
+        </a:xfrm>
+      </p:grpSpPr>
+      <p:sp>
+        <p:nvSpPr>
+          <p:cNvPr id="2" name="Title 1"/>
+          <p:cNvSpPr>
+            <a:spLocks noGrp="1"/>
+          </p:cNvSpPr>
+          <p:nvPr>
+            <p:ph type="title"/>
+          </p:nvPr>
+        </p:nvSpPr>
+        <p:spPr/>
+        <p:txBody>
+          <a:bodyPr/>
+          <a:lstStyle/>
+          <a:p>
+            <a:r>
+              <a:rPr lang="nb-NO" dirty="0"/>
               <a:t>Hva skal til for å legge til nye endepunkt?</a:t>
             </a:r>
             <a:endParaRPr lang="en-US" dirty="0"/>
@@ -14161,7 +14267,7 @@
 </p:sld>
 </file>
 
-<file path=ppt/slides/slide15.xml><?xml version="1.0" encoding="utf-8"?>
+<file path=ppt/slides/slide16.xml><?xml version="1.0" encoding="utf-8"?>
 <p:sld xmlns:a="http://schemas.openxmlformats.org/drawingml/2006/main" xmlns:r="http://schemas.openxmlformats.org/officeDocument/2006/relationships" xmlns:p="http://schemas.openxmlformats.org/presentationml/2006/main">
   <p:cSld>
     <p:spTree>
@@ -14337,7 +14443,7 @@
 </p:sld>
 </file>
 
-<file path=ppt/slides/slide16.xml><?xml version="1.0" encoding="utf-8"?>
+<file path=ppt/slides/slide17.xml><?xml version="1.0" encoding="utf-8"?>
 <p:sld xmlns:a="http://schemas.openxmlformats.org/drawingml/2006/main" xmlns:r="http://schemas.openxmlformats.org/officeDocument/2006/relationships" xmlns:p="http://schemas.openxmlformats.org/presentationml/2006/main">
   <p:cSld>
     <p:spTree>
@@ -14500,7 +14606,7 @@
 </p:sld>
 </file>
 
-<file path=ppt/slides/slide17.xml><?xml version="1.0" encoding="utf-8"?>
+<file path=ppt/slides/slide18.xml><?xml version="1.0" encoding="utf-8"?>
 <p:sld xmlns:a="http://schemas.openxmlformats.org/drawingml/2006/main" xmlns:r="http://schemas.openxmlformats.org/officeDocument/2006/relationships" xmlns:p="http://schemas.openxmlformats.org/presentationml/2006/main">
   <p:cSld>
     <p:spTree>
@@ -14676,7 +14782,7 @@
 </p:sld>
 </file>
 
-<file path=ppt/slides/slide18.xml><?xml version="1.0" encoding="utf-8"?>
+<file path=ppt/slides/slide19.xml><?xml version="1.0" encoding="utf-8"?>
 <p:sld xmlns:a="http://schemas.openxmlformats.org/drawingml/2006/main" xmlns:r="http://schemas.openxmlformats.org/officeDocument/2006/relationships" xmlns:p="http://schemas.openxmlformats.org/presentationml/2006/main">
   <p:cSld>
     <p:spTree>
@@ -14855,269 +14961,6 @@
     <p:extLst>
       <p:ext uri="{BB962C8B-B14F-4D97-AF65-F5344CB8AC3E}">
         <p14:creationId xmlns:p14="http://schemas.microsoft.com/office/powerpoint/2010/main" val="563831913"/>
-      </p:ext>
-    </p:extLst>
-  </p:cSld>
-  <p:clrMapOvr>
-    <a:masterClrMapping/>
-  </p:clrMapOvr>
-</p:sld>
-</file>
-
-<file path=ppt/slides/slide19.xml><?xml version="1.0" encoding="utf-8"?>
-<p:sld xmlns:a="http://schemas.openxmlformats.org/drawingml/2006/main" xmlns:r="http://schemas.openxmlformats.org/officeDocument/2006/relationships" xmlns:p="http://schemas.openxmlformats.org/presentationml/2006/main">
-  <p:cSld>
-    <p:spTree>
-      <p:nvGrpSpPr>
-        <p:cNvPr id="1" name=""/>
-        <p:cNvGrpSpPr/>
-        <p:nvPr/>
-      </p:nvGrpSpPr>
-      <p:grpSpPr>
-        <a:xfrm>
-          <a:off x="0" y="0"/>
-          <a:ext cx="0" cy="0"/>
-          <a:chOff x="0" y="0"/>
-          <a:chExt cx="0" cy="0"/>
-        </a:xfrm>
-      </p:grpSpPr>
-      <p:sp>
-        <p:nvSpPr>
-          <p:cNvPr id="2" name="Title 1"/>
-          <p:cNvSpPr>
-            <a:spLocks noGrp="1"/>
-          </p:cNvSpPr>
-          <p:nvPr>
-            <p:ph type="title"/>
-          </p:nvPr>
-        </p:nvSpPr>
-        <p:spPr/>
-        <p:txBody>
-          <a:bodyPr/>
-          <a:lstStyle/>
-          <a:p>
-            <a:r>
-              <a:rPr lang="nb-NO" dirty="0"/>
-              <a:t>Takk for meg</a:t>
-            </a:r>
-            <a:endParaRPr lang="en-US" dirty="0"/>
-          </a:p>
-        </p:txBody>
-      </p:sp>
-      <p:sp>
-        <p:nvSpPr>
-          <p:cNvPr id="126" name="TextBox 125"/>
-          <p:cNvSpPr txBox="1"/>
-          <p:nvPr/>
-        </p:nvSpPr>
-        <p:spPr>
-          <a:xfrm>
-            <a:off x="322053" y="6022826"/>
-            <a:ext cx="3180271" cy="461665"/>
-          </a:xfrm>
-          <a:prstGeom prst="rect">
-            <a:avLst/>
-          </a:prstGeom>
-          <a:noFill/>
-        </p:spPr>
-        <p:txBody>
-          <a:bodyPr wrap="square" rtlCol="0">
-            <a:spAutoFit/>
-          </a:bodyPr>
-          <a:lstStyle/>
-          <a:p>
-            <a:r>
-              <a:rPr lang="nb-NO" sz="2400" dirty="0">
-                <a:hlinkClick r:id="rId2"/>
-              </a:rPr>
-              <a:t>@</a:t>
-            </a:r>
-            <a:r>
-              <a:rPr lang="nb-NO" sz="2400" dirty="0" err="1">
-                <a:hlinkClick r:id="rId2"/>
-              </a:rPr>
-              <a:t>gjermundbjaanes</a:t>
-            </a:r>
-            <a:endParaRPr lang="en-US" sz="2400" dirty="0"/>
-          </a:p>
-        </p:txBody>
-      </p:sp>
-      <p:sp>
-        <p:nvSpPr>
-          <p:cNvPr id="127" name="TextBox 126"/>
-          <p:cNvSpPr txBox="1"/>
-          <p:nvPr/>
-        </p:nvSpPr>
-        <p:spPr>
-          <a:xfrm>
-            <a:off x="3917005" y="6022825"/>
-            <a:ext cx="3694794" cy="461665"/>
-          </a:xfrm>
-          <a:prstGeom prst="rect">
-            <a:avLst/>
-          </a:prstGeom>
-          <a:noFill/>
-        </p:spPr>
-        <p:txBody>
-          <a:bodyPr wrap="none" rtlCol="0">
-            <a:spAutoFit/>
-          </a:bodyPr>
-          <a:lstStyle/>
-          <a:p>
-            <a:r>
-              <a:rPr lang="nb-NO" sz="2400" dirty="0">
-                <a:hlinkClick r:id="rId3"/>
-              </a:rPr>
-              <a:t>www.gjermundbjaanes.com</a:t>
-            </a:r>
-            <a:endParaRPr lang="en-US" sz="2400" dirty="0"/>
-          </a:p>
-        </p:txBody>
-      </p:sp>
-      <p:sp>
-        <p:nvSpPr>
-          <p:cNvPr id="128" name="TextBox 127"/>
-          <p:cNvSpPr txBox="1"/>
-          <p:nvPr/>
-        </p:nvSpPr>
-        <p:spPr>
-          <a:xfrm>
-            <a:off x="8669411" y="6022827"/>
-            <a:ext cx="2684389" cy="461665"/>
-          </a:xfrm>
-          <a:prstGeom prst="rect">
-            <a:avLst/>
-          </a:prstGeom>
-          <a:noFill/>
-        </p:spPr>
-        <p:txBody>
-          <a:bodyPr wrap="none" rtlCol="0">
-            <a:spAutoFit/>
-          </a:bodyPr>
-          <a:lstStyle/>
-          <a:p>
-            <a:r>
-              <a:rPr lang="nb-NO" sz="2400" dirty="0">
-                <a:hlinkClick r:id="rId4"/>
-              </a:rPr>
-              <a:t>github.com/</a:t>
-            </a:r>
-            <a:r>
-              <a:rPr lang="nb-NO" sz="2400" dirty="0" err="1">
-                <a:hlinkClick r:id="rId4"/>
-              </a:rPr>
-              <a:t>bjaanes</a:t>
-            </a:r>
-            <a:endParaRPr lang="en-US" sz="2400" dirty="0"/>
-          </a:p>
-        </p:txBody>
-      </p:sp>
-      <p:sp>
-        <p:nvSpPr>
-          <p:cNvPr id="6" name="TextBox 5"/>
-          <p:cNvSpPr txBox="1"/>
-          <p:nvPr/>
-        </p:nvSpPr>
-        <p:spPr>
-          <a:xfrm>
-            <a:off x="838200" y="2014167"/>
-            <a:ext cx="8120333" cy="3046988"/>
-          </a:xfrm>
-          <a:prstGeom prst="rect">
-            <a:avLst/>
-          </a:prstGeom>
-          <a:noFill/>
-        </p:spPr>
-        <p:txBody>
-          <a:bodyPr wrap="square" rtlCol="0">
-            <a:spAutoFit/>
-          </a:bodyPr>
-          <a:lstStyle/>
-          <a:p>
-            <a:pPr marL="285750" indent="-285750">
-              <a:buFont typeface="Arial" panose="020B0604020202020204" pitchFamily="34" charset="0"/>
-              <a:buChar char="•"/>
-            </a:pPr>
-            <a:r>
-              <a:rPr lang="nb-NO" sz="2400" dirty="0"/>
-              <a:t>All koden ligger på </a:t>
-            </a:r>
-            <a:r>
-              <a:rPr lang="nb-NO" sz="2400" dirty="0" err="1"/>
-              <a:t>Github</a:t>
-            </a:r>
-            <a:endParaRPr lang="nb-NO" sz="2400" dirty="0"/>
-          </a:p>
-          <a:p>
-            <a:pPr marL="742950" lvl="1" indent="-285750">
-              <a:buFont typeface="Arial" panose="020B0604020202020204" pitchFamily="34" charset="0"/>
-              <a:buChar char="•"/>
-            </a:pPr>
-            <a:r>
-              <a:rPr lang="nb-NO" sz="2400" dirty="0">
-                <a:hlinkClick r:id="rId5"/>
-              </a:rPr>
-              <a:t>https://github.com/bjaanes/dotnet-core-api-talk</a:t>
-            </a:r>
-            <a:endParaRPr lang="nb-NO" sz="2400" dirty="0"/>
-          </a:p>
-          <a:p>
-            <a:pPr marL="285750" indent="-285750">
-              <a:buFont typeface="Arial" panose="020B0604020202020204" pitchFamily="34" charset="0"/>
-              <a:buChar char="•"/>
-            </a:pPr>
-            <a:r>
-              <a:rPr lang="nb-NO" sz="2400" dirty="0"/>
-              <a:t>En bloggpost om temaet ligger på bloggen min</a:t>
-            </a:r>
-          </a:p>
-          <a:p>
-            <a:pPr marL="742950" lvl="1" indent="-285750">
-              <a:buFont typeface="Arial" panose="020B0604020202020204" pitchFamily="34" charset="0"/>
-              <a:buChar char="•"/>
-            </a:pPr>
-            <a:r>
-              <a:rPr lang="nb-NO" sz="2400" dirty="0">
-                <a:hlinkClick r:id="rId6"/>
-              </a:rPr>
-              <a:t>http://www.gjermundbjaanes.com/donet-something</a:t>
-            </a:r>
-            <a:endParaRPr lang="nb-NO" sz="2400" dirty="0"/>
-          </a:p>
-          <a:p>
-            <a:pPr marL="742950" lvl="1" indent="-285750">
-              <a:buFont typeface="Arial" panose="020B0604020202020204" pitchFamily="34" charset="0"/>
-              <a:buChar char="•"/>
-            </a:pPr>
-            <a:endParaRPr lang="nb-NO" sz="2400" dirty="0"/>
-          </a:p>
-          <a:p>
-            <a:pPr marL="285750" indent="-285750">
-              <a:buFont typeface="Arial" panose="020B0604020202020204" pitchFamily="34" charset="0"/>
-              <a:buChar char="•"/>
-            </a:pPr>
-            <a:endParaRPr lang="nb-NO" sz="2400" dirty="0"/>
-          </a:p>
-          <a:p>
-            <a:pPr marL="742950" lvl="1" indent="-285750">
-              <a:buFont typeface="Arial" panose="020B0604020202020204" pitchFamily="34" charset="0"/>
-              <a:buChar char="•"/>
-            </a:pPr>
-            <a:endParaRPr lang="nb-NO" sz="2400" dirty="0"/>
-          </a:p>
-          <a:p>
-            <a:pPr marL="285750" indent="-285750">
-              <a:buFont typeface="Arial" panose="020B0604020202020204" pitchFamily="34" charset="0"/>
-              <a:buChar char="•"/>
-            </a:pPr>
-            <a:endParaRPr lang="en-US" sz="2400" dirty="0"/>
-          </a:p>
-        </p:txBody>
-      </p:sp>
-    </p:spTree>
-    <p:extLst>
-      <p:ext uri="{BB962C8B-B14F-4D97-AF65-F5344CB8AC3E}">
-        <p14:creationId xmlns:p14="http://schemas.microsoft.com/office/powerpoint/2010/main" val="4272557608"/>
       </p:ext>
     </p:extLst>
   </p:cSld>
@@ -15487,6 +15330,269 @@
     <p:extLst>
       <p:ext uri="{BB962C8B-B14F-4D97-AF65-F5344CB8AC3E}">
         <p14:creationId xmlns:p14="http://schemas.microsoft.com/office/powerpoint/2010/main" val="532315870"/>
+      </p:ext>
+    </p:extLst>
+  </p:cSld>
+  <p:clrMapOvr>
+    <a:masterClrMapping/>
+  </p:clrMapOvr>
+</p:sld>
+</file>
+
+<file path=ppt/slides/slide20.xml><?xml version="1.0" encoding="utf-8"?>
+<p:sld xmlns:a="http://schemas.openxmlformats.org/drawingml/2006/main" xmlns:r="http://schemas.openxmlformats.org/officeDocument/2006/relationships" xmlns:p="http://schemas.openxmlformats.org/presentationml/2006/main">
+  <p:cSld>
+    <p:spTree>
+      <p:nvGrpSpPr>
+        <p:cNvPr id="1" name=""/>
+        <p:cNvGrpSpPr/>
+        <p:nvPr/>
+      </p:nvGrpSpPr>
+      <p:grpSpPr>
+        <a:xfrm>
+          <a:off x="0" y="0"/>
+          <a:ext cx="0" cy="0"/>
+          <a:chOff x="0" y="0"/>
+          <a:chExt cx="0" cy="0"/>
+        </a:xfrm>
+      </p:grpSpPr>
+      <p:sp>
+        <p:nvSpPr>
+          <p:cNvPr id="2" name="Title 1"/>
+          <p:cNvSpPr>
+            <a:spLocks noGrp="1"/>
+          </p:cNvSpPr>
+          <p:nvPr>
+            <p:ph type="title"/>
+          </p:nvPr>
+        </p:nvSpPr>
+        <p:spPr/>
+        <p:txBody>
+          <a:bodyPr/>
+          <a:lstStyle/>
+          <a:p>
+            <a:r>
+              <a:rPr lang="nb-NO" dirty="0"/>
+              <a:t>Takk for meg</a:t>
+            </a:r>
+            <a:endParaRPr lang="en-US" dirty="0"/>
+          </a:p>
+        </p:txBody>
+      </p:sp>
+      <p:sp>
+        <p:nvSpPr>
+          <p:cNvPr id="126" name="TextBox 125"/>
+          <p:cNvSpPr txBox="1"/>
+          <p:nvPr/>
+        </p:nvSpPr>
+        <p:spPr>
+          <a:xfrm>
+            <a:off x="322053" y="6022826"/>
+            <a:ext cx="3180271" cy="461665"/>
+          </a:xfrm>
+          <a:prstGeom prst="rect">
+            <a:avLst/>
+          </a:prstGeom>
+          <a:noFill/>
+        </p:spPr>
+        <p:txBody>
+          <a:bodyPr wrap="square" rtlCol="0">
+            <a:spAutoFit/>
+          </a:bodyPr>
+          <a:lstStyle/>
+          <a:p>
+            <a:r>
+              <a:rPr lang="nb-NO" sz="2400" dirty="0">
+                <a:hlinkClick r:id="rId2"/>
+              </a:rPr>
+              <a:t>@</a:t>
+            </a:r>
+            <a:r>
+              <a:rPr lang="nb-NO" sz="2400" dirty="0" err="1">
+                <a:hlinkClick r:id="rId2"/>
+              </a:rPr>
+              <a:t>gjermundbjaanes</a:t>
+            </a:r>
+            <a:endParaRPr lang="en-US" sz="2400" dirty="0"/>
+          </a:p>
+        </p:txBody>
+      </p:sp>
+      <p:sp>
+        <p:nvSpPr>
+          <p:cNvPr id="127" name="TextBox 126"/>
+          <p:cNvSpPr txBox="1"/>
+          <p:nvPr/>
+        </p:nvSpPr>
+        <p:spPr>
+          <a:xfrm>
+            <a:off x="3917005" y="6022825"/>
+            <a:ext cx="3694794" cy="461665"/>
+          </a:xfrm>
+          <a:prstGeom prst="rect">
+            <a:avLst/>
+          </a:prstGeom>
+          <a:noFill/>
+        </p:spPr>
+        <p:txBody>
+          <a:bodyPr wrap="none" rtlCol="0">
+            <a:spAutoFit/>
+          </a:bodyPr>
+          <a:lstStyle/>
+          <a:p>
+            <a:r>
+              <a:rPr lang="nb-NO" sz="2400" dirty="0">
+                <a:hlinkClick r:id="rId3"/>
+              </a:rPr>
+              <a:t>www.gjermundbjaanes.com</a:t>
+            </a:r>
+            <a:endParaRPr lang="en-US" sz="2400" dirty="0"/>
+          </a:p>
+        </p:txBody>
+      </p:sp>
+      <p:sp>
+        <p:nvSpPr>
+          <p:cNvPr id="128" name="TextBox 127"/>
+          <p:cNvSpPr txBox="1"/>
+          <p:nvPr/>
+        </p:nvSpPr>
+        <p:spPr>
+          <a:xfrm>
+            <a:off x="8669411" y="6022827"/>
+            <a:ext cx="2684389" cy="461665"/>
+          </a:xfrm>
+          <a:prstGeom prst="rect">
+            <a:avLst/>
+          </a:prstGeom>
+          <a:noFill/>
+        </p:spPr>
+        <p:txBody>
+          <a:bodyPr wrap="none" rtlCol="0">
+            <a:spAutoFit/>
+          </a:bodyPr>
+          <a:lstStyle/>
+          <a:p>
+            <a:r>
+              <a:rPr lang="nb-NO" sz="2400" dirty="0">
+                <a:hlinkClick r:id="rId4"/>
+              </a:rPr>
+              <a:t>github.com/</a:t>
+            </a:r>
+            <a:r>
+              <a:rPr lang="nb-NO" sz="2400" dirty="0" err="1">
+                <a:hlinkClick r:id="rId4"/>
+              </a:rPr>
+              <a:t>bjaanes</a:t>
+            </a:r>
+            <a:endParaRPr lang="en-US" sz="2400" dirty="0"/>
+          </a:p>
+        </p:txBody>
+      </p:sp>
+      <p:sp>
+        <p:nvSpPr>
+          <p:cNvPr id="6" name="TextBox 5"/>
+          <p:cNvSpPr txBox="1"/>
+          <p:nvPr/>
+        </p:nvSpPr>
+        <p:spPr>
+          <a:xfrm>
+            <a:off x="838200" y="2014167"/>
+            <a:ext cx="8120333" cy="3046988"/>
+          </a:xfrm>
+          <a:prstGeom prst="rect">
+            <a:avLst/>
+          </a:prstGeom>
+          <a:noFill/>
+        </p:spPr>
+        <p:txBody>
+          <a:bodyPr wrap="square" rtlCol="0">
+            <a:spAutoFit/>
+          </a:bodyPr>
+          <a:lstStyle/>
+          <a:p>
+            <a:pPr marL="285750" indent="-285750">
+              <a:buFont typeface="Arial" panose="020B0604020202020204" pitchFamily="34" charset="0"/>
+              <a:buChar char="•"/>
+            </a:pPr>
+            <a:r>
+              <a:rPr lang="nb-NO" sz="2400" dirty="0"/>
+              <a:t>All koden ligger på </a:t>
+            </a:r>
+            <a:r>
+              <a:rPr lang="nb-NO" sz="2400" dirty="0" err="1"/>
+              <a:t>Github</a:t>
+            </a:r>
+            <a:endParaRPr lang="nb-NO" sz="2400" dirty="0"/>
+          </a:p>
+          <a:p>
+            <a:pPr marL="742950" lvl="1" indent="-285750">
+              <a:buFont typeface="Arial" panose="020B0604020202020204" pitchFamily="34" charset="0"/>
+              <a:buChar char="•"/>
+            </a:pPr>
+            <a:r>
+              <a:rPr lang="nb-NO" sz="2400" dirty="0">
+                <a:hlinkClick r:id="rId5"/>
+              </a:rPr>
+              <a:t>https://github.com/bjaanes/dotnet-core-api-talk</a:t>
+            </a:r>
+            <a:endParaRPr lang="nb-NO" sz="2400" dirty="0"/>
+          </a:p>
+          <a:p>
+            <a:pPr marL="285750" indent="-285750">
+              <a:buFont typeface="Arial" panose="020B0604020202020204" pitchFamily="34" charset="0"/>
+              <a:buChar char="•"/>
+            </a:pPr>
+            <a:r>
+              <a:rPr lang="nb-NO" sz="2400" dirty="0"/>
+              <a:t>En bloggpost om temaet ligger på bloggen min</a:t>
+            </a:r>
+          </a:p>
+          <a:p>
+            <a:pPr marL="742950" lvl="1" indent="-285750">
+              <a:buFont typeface="Arial" panose="020B0604020202020204" pitchFamily="34" charset="0"/>
+              <a:buChar char="•"/>
+            </a:pPr>
+            <a:r>
+              <a:rPr lang="nb-NO" sz="2400" dirty="0">
+                <a:hlinkClick r:id="rId6"/>
+              </a:rPr>
+              <a:t>http://www.gjermundbjaanes.com/donet-something</a:t>
+            </a:r>
+            <a:endParaRPr lang="nb-NO" sz="2400" dirty="0"/>
+          </a:p>
+          <a:p>
+            <a:pPr marL="742950" lvl="1" indent="-285750">
+              <a:buFont typeface="Arial" panose="020B0604020202020204" pitchFamily="34" charset="0"/>
+              <a:buChar char="•"/>
+            </a:pPr>
+            <a:endParaRPr lang="nb-NO" sz="2400" dirty="0"/>
+          </a:p>
+          <a:p>
+            <a:pPr marL="285750" indent="-285750">
+              <a:buFont typeface="Arial" panose="020B0604020202020204" pitchFamily="34" charset="0"/>
+              <a:buChar char="•"/>
+            </a:pPr>
+            <a:endParaRPr lang="nb-NO" sz="2400" dirty="0"/>
+          </a:p>
+          <a:p>
+            <a:pPr marL="742950" lvl="1" indent="-285750">
+              <a:buFont typeface="Arial" panose="020B0604020202020204" pitchFamily="34" charset="0"/>
+              <a:buChar char="•"/>
+            </a:pPr>
+            <a:endParaRPr lang="nb-NO" sz="2400" dirty="0"/>
+          </a:p>
+          <a:p>
+            <a:pPr marL="285750" indent="-285750">
+              <a:buFont typeface="Arial" panose="020B0604020202020204" pitchFamily="34" charset="0"/>
+              <a:buChar char="•"/>
+            </a:pPr>
+            <a:endParaRPr lang="en-US" sz="2400" dirty="0"/>
+          </a:p>
+        </p:txBody>
+      </p:sp>
+    </p:spTree>
+    <p:extLst>
+      <p:ext uri="{BB962C8B-B14F-4D97-AF65-F5344CB8AC3E}">
+        <p14:creationId xmlns:p14="http://schemas.microsoft.com/office/powerpoint/2010/main" val="4272557608"/>
       </p:ext>
     </p:extLst>
   </p:cSld>
@@ -17330,8 +17436,8 @@
           </p:pic>
         </mc:Fallback>
       </mc:AlternateContent>
-      <mc:AlternateContent xmlns:mc="http://schemas.openxmlformats.org/markup-compatibility/2006">
-        <mc:Choice xmlns:p14="http://schemas.microsoft.com/office/powerpoint/2010/main" Requires="p14">
+      <mc:AlternateContent xmlns:mc="http://schemas.openxmlformats.org/markup-compatibility/2006" xmlns:p14="http://schemas.microsoft.com/office/powerpoint/2010/main">
+        <mc:Choice Requires="p14">
           <p:contentPart p14:bwMode="auto" r:id="rId96">
             <p14:nvContentPartPr>
               <p14:cNvPr id="8" name="Ink 7"/>
@@ -17344,7 +17450,7 @@
             </p14:xfrm>
           </p:contentPart>
         </mc:Choice>
-        <mc:Fallback>
+        <mc:Fallback xmlns="">
           <p:pic>
             <p:nvPicPr>
               <p:cNvPr id="8" name="Ink 7"/>
@@ -17369,8 +17475,8 @@
           </p:pic>
         </mc:Fallback>
       </mc:AlternateContent>
-      <mc:AlternateContent xmlns:mc="http://schemas.openxmlformats.org/markup-compatibility/2006">
-        <mc:Choice xmlns:p14="http://schemas.microsoft.com/office/powerpoint/2010/main" Requires="p14">
+      <mc:AlternateContent xmlns:mc="http://schemas.openxmlformats.org/markup-compatibility/2006" xmlns:p14="http://schemas.microsoft.com/office/powerpoint/2010/main">
+        <mc:Choice Requires="p14">
           <p:contentPart p14:bwMode="auto" r:id="rId98">
             <p14:nvContentPartPr>
               <p14:cNvPr id="10" name="Ink 9"/>
@@ -17383,7 +17489,7 @@
             </p14:xfrm>
           </p:contentPart>
         </mc:Choice>
-        <mc:Fallback>
+        <mc:Fallback xmlns="">
           <p:pic>
             <p:nvPicPr>
               <p:cNvPr id="10" name="Ink 9"/>
@@ -17662,8 +17768,8 @@
           </a:p>
         </p:txBody>
       </p:sp>
-      <mc:AlternateContent xmlns:mc="http://schemas.openxmlformats.org/markup-compatibility/2006">
-        <mc:Choice xmlns:p14="http://schemas.microsoft.com/office/powerpoint/2010/main" Requires="p14">
+      <mc:AlternateContent xmlns:mc="http://schemas.openxmlformats.org/markup-compatibility/2006" xmlns:p14="http://schemas.microsoft.com/office/powerpoint/2010/main">
+        <mc:Choice Requires="p14">
           <p:contentPart p14:bwMode="auto" r:id="rId2">
             <p14:nvContentPartPr>
               <p14:cNvPr id="109" name="Ink 108"/>
@@ -17676,7 +17782,7 @@
             </p14:xfrm>
           </p:contentPart>
         </mc:Choice>
-        <mc:Fallback>
+        <mc:Fallback xmlns="">
           <p:pic>
             <p:nvPicPr>
               <p:cNvPr id="109" name="Ink 108"/>
@@ -17701,8 +17807,8 @@
           </p:pic>
         </mc:Fallback>
       </mc:AlternateContent>
-      <mc:AlternateContent xmlns:mc="http://schemas.openxmlformats.org/markup-compatibility/2006">
-        <mc:Choice xmlns:p14="http://schemas.microsoft.com/office/powerpoint/2010/main" Requires="p14">
+      <mc:AlternateContent xmlns:mc="http://schemas.openxmlformats.org/markup-compatibility/2006" xmlns:p14="http://schemas.microsoft.com/office/powerpoint/2010/main">
+        <mc:Choice Requires="p14">
           <p:contentPart p14:bwMode="auto" r:id="rId4">
             <p14:nvContentPartPr>
               <p14:cNvPr id="115" name="Ink 114"/>
@@ -17715,7 +17821,7 @@
             </p14:xfrm>
           </p:contentPart>
         </mc:Choice>
-        <mc:Fallback>
+        <mc:Fallback xmlns="">
           <p:pic>
             <p:nvPicPr>
               <p:cNvPr id="115" name="Ink 114"/>
@@ -17740,8 +17846,8 @@
           </p:pic>
         </mc:Fallback>
       </mc:AlternateContent>
-      <mc:AlternateContent xmlns:mc="http://schemas.openxmlformats.org/markup-compatibility/2006">
-        <mc:Choice xmlns:p14="http://schemas.microsoft.com/office/powerpoint/2010/main" Requires="p14">
+      <mc:AlternateContent xmlns:mc="http://schemas.openxmlformats.org/markup-compatibility/2006" xmlns:p14="http://schemas.microsoft.com/office/powerpoint/2010/main">
+        <mc:Choice Requires="p14">
           <p:contentPart p14:bwMode="auto" r:id="rId6">
             <p14:nvContentPartPr>
               <p14:cNvPr id="119" name="Ink 118"/>
@@ -17754,7 +17860,7 @@
             </p14:xfrm>
           </p:contentPart>
         </mc:Choice>
-        <mc:Fallback>
+        <mc:Fallback xmlns="">
           <p:pic>
             <p:nvPicPr>
               <p:cNvPr id="119" name="Ink 118"/>
@@ -17779,8 +17885,8 @@
           </p:pic>
         </mc:Fallback>
       </mc:AlternateContent>
-      <mc:AlternateContent xmlns:mc="http://schemas.openxmlformats.org/markup-compatibility/2006">
-        <mc:Choice xmlns:p14="http://schemas.microsoft.com/office/powerpoint/2010/main" Requires="p14">
+      <mc:AlternateContent xmlns:mc="http://schemas.openxmlformats.org/markup-compatibility/2006" xmlns:p14="http://schemas.microsoft.com/office/powerpoint/2010/main">
+        <mc:Choice Requires="p14">
           <p:contentPart p14:bwMode="auto" r:id="rId8">
             <p14:nvContentPartPr>
               <p14:cNvPr id="178" name="Ink 177"/>
@@ -17793,7 +17899,7 @@
             </p14:xfrm>
           </p:contentPart>
         </mc:Choice>
-        <mc:Fallback>
+        <mc:Fallback xmlns="">
           <p:pic>
             <p:nvPicPr>
               <p:cNvPr id="178" name="Ink 177"/>
@@ -17818,8 +17924,8 @@
           </p:pic>
         </mc:Fallback>
       </mc:AlternateContent>
-      <mc:AlternateContent xmlns:mc="http://schemas.openxmlformats.org/markup-compatibility/2006">
-        <mc:Choice xmlns:p14="http://schemas.microsoft.com/office/powerpoint/2010/main" Requires="p14">
+      <mc:AlternateContent xmlns:mc="http://schemas.openxmlformats.org/markup-compatibility/2006" xmlns:p14="http://schemas.microsoft.com/office/powerpoint/2010/main">
+        <mc:Choice Requires="p14">
           <p:contentPart p14:bwMode="auto" r:id="rId10">
             <p14:nvContentPartPr>
               <p14:cNvPr id="189" name="Ink 188"/>
@@ -17832,7 +17938,7 @@
             </p14:xfrm>
           </p:contentPart>
         </mc:Choice>
-        <mc:Fallback>
+        <mc:Fallback xmlns="">
           <p:pic>
             <p:nvPicPr>
               <p:cNvPr id="189" name="Ink 188"/>
@@ -17857,8 +17963,8 @@
           </p:pic>
         </mc:Fallback>
       </mc:AlternateContent>
-      <mc:AlternateContent xmlns:mc="http://schemas.openxmlformats.org/markup-compatibility/2006">
-        <mc:Choice xmlns:p14="http://schemas.microsoft.com/office/powerpoint/2010/main" Requires="p14">
+      <mc:AlternateContent xmlns:mc="http://schemas.openxmlformats.org/markup-compatibility/2006" xmlns:p14="http://schemas.microsoft.com/office/powerpoint/2010/main">
+        <mc:Choice Requires="p14">
           <p:contentPart p14:bwMode="auto" r:id="rId12">
             <p14:nvContentPartPr>
               <p14:cNvPr id="198" name="Ink 197"/>
@@ -17871,7 +17977,7 @@
             </p14:xfrm>
           </p:contentPart>
         </mc:Choice>
-        <mc:Fallback>
+        <mc:Fallback xmlns="">
           <p:pic>
             <p:nvPicPr>
               <p:cNvPr id="198" name="Ink 197"/>
@@ -20067,8 +20173,8 @@
           </p:pic>
         </mc:Fallback>
       </mc:AlternateContent>
-      <mc:AlternateContent xmlns:mc="http://schemas.openxmlformats.org/markup-compatibility/2006">
-        <mc:Choice xmlns:p14="http://schemas.microsoft.com/office/powerpoint/2010/main" Requires="p14">
+      <mc:AlternateContent xmlns:mc="http://schemas.openxmlformats.org/markup-compatibility/2006" xmlns:p14="http://schemas.microsoft.com/office/powerpoint/2010/main">
+        <mc:Choice Requires="p14">
           <p:contentPart p14:bwMode="auto" r:id="rId4">
             <p14:nvContentPartPr>
               <p14:cNvPr id="28" name="Ink 27"/>
@@ -20081,7 +20187,7 @@
             </p14:xfrm>
           </p:contentPart>
         </mc:Choice>
-        <mc:Fallback>
+        <mc:Fallback xmlns="">
           <p:pic>
             <p:nvPicPr>
               <p:cNvPr id="28" name="Ink 27"/>
@@ -20106,8 +20212,8 @@
           </p:pic>
         </mc:Fallback>
       </mc:AlternateContent>
-      <mc:AlternateContent xmlns:mc="http://schemas.openxmlformats.org/markup-compatibility/2006">
-        <mc:Choice xmlns:p14="http://schemas.microsoft.com/office/powerpoint/2010/main" Requires="p14">
+      <mc:AlternateContent xmlns:mc="http://schemas.openxmlformats.org/markup-compatibility/2006" xmlns:p14="http://schemas.microsoft.com/office/powerpoint/2010/main">
+        <mc:Choice Requires="p14">
           <p:contentPart p14:bwMode="auto" r:id="rId6">
             <p14:nvContentPartPr>
               <p14:cNvPr id="29" name="Ink 28"/>
@@ -20120,7 +20226,7 @@
             </p14:xfrm>
           </p:contentPart>
         </mc:Choice>
-        <mc:Fallback>
+        <mc:Fallback xmlns="">
           <p:pic>
             <p:nvPicPr>
               <p:cNvPr id="29" name="Ink 28"/>
@@ -20145,8 +20251,8 @@
           </p:pic>
         </mc:Fallback>
       </mc:AlternateContent>
-      <mc:AlternateContent xmlns:mc="http://schemas.openxmlformats.org/markup-compatibility/2006">
-        <mc:Choice xmlns:p14="http://schemas.microsoft.com/office/powerpoint/2010/main" Requires="p14">
+      <mc:AlternateContent xmlns:mc="http://schemas.openxmlformats.org/markup-compatibility/2006" xmlns:p14="http://schemas.microsoft.com/office/powerpoint/2010/main">
+        <mc:Choice Requires="p14">
           <p:contentPart p14:bwMode="auto" r:id="rId8">
             <p14:nvContentPartPr>
               <p14:cNvPr id="52" name="Ink 51"/>
@@ -20159,7 +20265,7 @@
             </p14:xfrm>
           </p:contentPart>
         </mc:Choice>
-        <mc:Fallback>
+        <mc:Fallback xmlns="">
           <p:pic>
             <p:nvPicPr>
               <p:cNvPr id="52" name="Ink 51"/>
@@ -20184,8 +20290,8 @@
           </p:pic>
         </mc:Fallback>
       </mc:AlternateContent>
-      <mc:AlternateContent xmlns:mc="http://schemas.openxmlformats.org/markup-compatibility/2006">
-        <mc:Choice xmlns:p14="http://schemas.microsoft.com/office/powerpoint/2010/main" Requires="p14">
+      <mc:AlternateContent xmlns:mc="http://schemas.openxmlformats.org/markup-compatibility/2006" xmlns:p14="http://schemas.microsoft.com/office/powerpoint/2010/main">
+        <mc:Choice Requires="p14">
           <p:contentPart p14:bwMode="auto" r:id="rId10">
             <p14:nvContentPartPr>
               <p14:cNvPr id="67" name="Ink 66"/>
@@ -20198,7 +20304,7 @@
             </p14:xfrm>
           </p:contentPart>
         </mc:Choice>
-        <mc:Fallback>
+        <mc:Fallback xmlns="">
           <p:pic>
             <p:nvPicPr>
               <p:cNvPr id="67" name="Ink 66"/>
@@ -20223,8 +20329,8 @@
           </p:pic>
         </mc:Fallback>
       </mc:AlternateContent>
-      <mc:AlternateContent xmlns:mc="http://schemas.openxmlformats.org/markup-compatibility/2006">
-        <mc:Choice xmlns:p14="http://schemas.microsoft.com/office/powerpoint/2010/main" Requires="p14">
+      <mc:AlternateContent xmlns:mc="http://schemas.openxmlformats.org/markup-compatibility/2006" xmlns:p14="http://schemas.microsoft.com/office/powerpoint/2010/main">
+        <mc:Choice Requires="p14">
           <p:contentPart p14:bwMode="auto" r:id="rId12">
             <p14:nvContentPartPr>
               <p14:cNvPr id="71" name="Ink 70"/>
@@ -20237,7 +20343,7 @@
             </p14:xfrm>
           </p:contentPart>
         </mc:Choice>
-        <mc:Fallback>
+        <mc:Fallback xmlns="">
           <p:pic>
             <p:nvPicPr>
               <p:cNvPr id="71" name="Ink 70"/>
@@ -20262,8 +20368,8 @@
           </p:pic>
         </mc:Fallback>
       </mc:AlternateContent>
-      <mc:AlternateContent xmlns:mc="http://schemas.openxmlformats.org/markup-compatibility/2006">
-        <mc:Choice xmlns:p14="http://schemas.microsoft.com/office/powerpoint/2010/main" Requires="p14">
+      <mc:AlternateContent xmlns:mc="http://schemas.openxmlformats.org/markup-compatibility/2006" xmlns:p14="http://schemas.microsoft.com/office/powerpoint/2010/main">
+        <mc:Choice Requires="p14">
           <p:contentPart p14:bwMode="auto" r:id="rId14">
             <p14:nvContentPartPr>
               <p14:cNvPr id="72" name="Ink 71"/>
@@ -20276,7 +20382,7 @@
             </p14:xfrm>
           </p:contentPart>
         </mc:Choice>
-        <mc:Fallback>
+        <mc:Fallback xmlns="">
           <p:pic>
             <p:nvPicPr>
               <p:cNvPr id="72" name="Ink 71"/>
@@ -20301,8 +20407,8 @@
           </p:pic>
         </mc:Fallback>
       </mc:AlternateContent>
-      <mc:AlternateContent xmlns:mc="http://schemas.openxmlformats.org/markup-compatibility/2006">
-        <mc:Choice xmlns:p14="http://schemas.microsoft.com/office/powerpoint/2010/main" Requires="p14">
+      <mc:AlternateContent xmlns:mc="http://schemas.openxmlformats.org/markup-compatibility/2006" xmlns:p14="http://schemas.microsoft.com/office/powerpoint/2010/main">
+        <mc:Choice Requires="p14">
           <p:contentPart p14:bwMode="auto" r:id="rId16">
             <p14:nvContentPartPr>
               <p14:cNvPr id="73" name="Ink 72"/>
@@ -20315,7 +20421,7 @@
             </p14:xfrm>
           </p:contentPart>
         </mc:Choice>
-        <mc:Fallback>
+        <mc:Fallback xmlns="">
           <p:pic>
             <p:nvPicPr>
               <p:cNvPr id="73" name="Ink 72"/>
@@ -20340,8 +20446,8 @@
           </p:pic>
         </mc:Fallback>
       </mc:AlternateContent>
-      <mc:AlternateContent xmlns:mc="http://schemas.openxmlformats.org/markup-compatibility/2006">
-        <mc:Choice xmlns:p14="http://schemas.microsoft.com/office/powerpoint/2010/main" Requires="p14">
+      <mc:AlternateContent xmlns:mc="http://schemas.openxmlformats.org/markup-compatibility/2006" xmlns:p14="http://schemas.microsoft.com/office/powerpoint/2010/main">
+        <mc:Choice Requires="p14">
           <p:contentPart p14:bwMode="auto" r:id="rId18">
             <p14:nvContentPartPr>
               <p14:cNvPr id="95" name="Ink 94"/>
@@ -20354,7 +20460,7 @@
             </p14:xfrm>
           </p:contentPart>
         </mc:Choice>
-        <mc:Fallback>
+        <mc:Fallback xmlns="">
           <p:pic>
             <p:nvPicPr>
               <p:cNvPr id="95" name="Ink 94"/>
@@ -20379,8 +20485,8 @@
           </p:pic>
         </mc:Fallback>
       </mc:AlternateContent>
-      <mc:AlternateContent xmlns:mc="http://schemas.openxmlformats.org/markup-compatibility/2006">
-        <mc:Choice xmlns:p14="http://schemas.microsoft.com/office/powerpoint/2010/main" Requires="p14">
+      <mc:AlternateContent xmlns:mc="http://schemas.openxmlformats.org/markup-compatibility/2006" xmlns:p14="http://schemas.microsoft.com/office/powerpoint/2010/main">
+        <mc:Choice Requires="p14">
           <p:contentPart p14:bwMode="auto" r:id="rId20">
             <p14:nvContentPartPr>
               <p14:cNvPr id="96" name="Ink 95"/>
@@ -20393,7 +20499,7 @@
             </p14:xfrm>
           </p:contentPart>
         </mc:Choice>
-        <mc:Fallback>
+        <mc:Fallback xmlns="">
           <p:pic>
             <p:nvPicPr>
               <p:cNvPr id="96" name="Ink 95"/>

</xml_diff>

<commit_message>
Last moment tweak to presentation
</commit_message>
<xml_diff>
--- a/dotnet-core-foredrag.pptx
+++ b/dotnet-core-foredrag.pptx
@@ -15572,13 +15572,7 @@
               <a:rPr lang="nb-NO" sz="2400" dirty="0">
                 <a:hlinkClick r:id="rId6"/>
               </a:rPr>
-              <a:t>http</a:t>
-            </a:r>
-            <a:r>
-              <a:rPr lang="nb-NO" sz="2400">
-                <a:hlinkClick r:id="rId6"/>
-              </a:rPr>
-              <a:t>://www.gjermundbjaanes.com/dot-net-core-for-your-web-apis</a:t>
+              <a:t>http://www.gjermundbjaanes.com/dot-net-core-for-your-web-apis</a:t>
             </a:r>
             <a:endParaRPr lang="nb-NO" sz="2400" dirty="0"/>
           </a:p>
@@ -18511,7 +18505,7 @@
         <p:spPr>
           <a:xfrm>
             <a:off x="838200" y="2014167"/>
-            <a:ext cx="8120333" cy="1569660"/>
+            <a:ext cx="8120333" cy="1938992"/>
           </a:xfrm>
           <a:prstGeom prst="rect">
             <a:avLst/>
@@ -18523,6 +18517,24 @@
             <a:spAutoFit/>
           </a:bodyPr>
           <a:lstStyle/>
+          <a:p>
+            <a:pPr marL="285750" indent="-285750">
+              <a:buFont typeface="Arial" panose="020B0604020202020204" pitchFamily="34" charset="0"/>
+              <a:buChar char="•"/>
+            </a:pPr>
+            <a:r>
+              <a:rPr lang="nb-NO" sz="2400" dirty="0"/>
+              <a:t>.NET </a:t>
+            </a:r>
+            <a:r>
+              <a:rPr lang="nb-NO" sz="2400" dirty="0" err="1"/>
+              <a:t>Core</a:t>
+            </a:r>
+            <a:r>
+              <a:rPr lang="nb-NO" sz="2400" dirty="0"/>
+              <a:t> (Nytt!)</a:t>
+            </a:r>
+          </a:p>
           <a:p>
             <a:pPr marL="285750" indent="-285750">
               <a:buFont typeface="Arial" panose="020B0604020202020204" pitchFamily="34" charset="0"/>

</xml_diff>